<commit_message>
Update README: update Results table.
</commit_message>
<xml_diff>
--- a/presentation/fraudolent_transaction.pptx
+++ b/presentation/fraudolent_transaction.pptx
@@ -32867,7 +32867,7 @@
           <p:nvPr>
             <p:extLst>
               <p:ext uri="{D42A27DB-BD31-4B8C-83A1-F6EECF244321}">
-                <p14:modId xmlns:p14="http://schemas.microsoft.com/office/powerpoint/2010/main" val="2010085065"/>
+                <p14:modId xmlns:p14="http://schemas.microsoft.com/office/powerpoint/2010/main" val="2772407263"/>
               </p:ext>
             </p:extLst>
           </p:nvPr>
@@ -33324,7 +33324,7 @@
                           <a:ea typeface="+mn-ea"/>
                           <a:cs typeface="+mn-cs"/>
                         </a:rPr>
-                        <a:t>0.977</a:t>
+                        <a:t>0.9772</a:t>
                       </a:r>
                       <a:endParaRPr lang="it-IT">
                         <a:latin typeface="Avenir Next LT Pro" panose="020B0504020202020204" pitchFamily="34" charset="0"/>
@@ -33367,7 +33367,12 @@
                     <a:lstStyle/>
                     <a:p>
                       <a:pPr algn="ctr"/>
-                      <a:endParaRPr lang="it-IT"/>
+                      <a:r>
+                        <a:rPr lang="it-IT">
+                          <a:latin typeface="Avenir Next LT Pro" panose="020B0504020202020204" pitchFamily="34" charset="0"/>
+                        </a:rPr>
+                        <a:t>0.9773</a:t>
+                      </a:r>
                     </a:p>
                   </a:txBody>
                   <a:tcPr>

</xml_diff>

<commit_message>
Update Metrics: inserted metrics for lr_cv_std_mix_features
</commit_message>
<xml_diff>
--- a/presentation/fraudolent_transaction.pptx
+++ b/presentation/fraudolent_transaction.pptx
@@ -26272,7 +26272,7 @@
             <a:pPr rtl="0"/>
             <a:fld id="{C0FA3576-2E34-44A5-91FF-3C53AC3DA648}" type="datetime1">
               <a:rPr lang="it-IT" smtClean="0"/>
-              <a:t>20/06/2022</a:t>
+              <a:t>21/06/2022</a:t>
             </a:fld>
             <a:endParaRPr lang="it-IT"/>
           </a:p>
@@ -26454,7 +26454,7 @@
             <a:fld id="{F8F21FEC-DF32-4E90-A279-29D5C0BB0773}" type="datetime1">
               <a:rPr lang="it-IT" smtClean="0"/>
               <a:pPr/>
-              <a:t>20/06/2022</a:t>
+              <a:t>21/06/2022</a:t>
             </a:fld>
             <a:endParaRPr lang="it-IT" dirty="0"/>
           </a:p>
@@ -27232,7 +27232,7 @@
             <a:pPr rtl="0"/>
             <a:fld id="{87A23933-3F77-4C59-A775-45E2435C8368}" type="datetime1">
               <a:rPr lang="it-IT" noProof="0" smtClean="0"/>
-              <a:t>20/06/2022</a:t>
+              <a:t>21/06/2022</a:t>
             </a:fld>
             <a:endParaRPr lang="it-IT" noProof="0"/>
           </a:p>
@@ -27497,7 +27497,7 @@
             <a:pPr rtl="0"/>
             <a:fld id="{4B4ECE9F-4108-4829-8F23-DFA9C926965D}" type="datetime1">
               <a:rPr lang="it-IT" noProof="0" smtClean="0"/>
-              <a:t>20/06/2022</a:t>
+              <a:t>21/06/2022</a:t>
             </a:fld>
             <a:endParaRPr lang="it-IT" noProof="0"/>
           </a:p>
@@ -27735,7 +27735,7 @@
             <a:pPr rtl="0"/>
             <a:fld id="{2AB59B6B-A2EF-4B30-AEF7-A3091D0F5449}" type="datetime1">
               <a:rPr lang="it-IT" noProof="0" smtClean="0"/>
-              <a:t>20/06/2022</a:t>
+              <a:t>21/06/2022</a:t>
             </a:fld>
             <a:endParaRPr lang="it-IT" noProof="0" dirty="0"/>
           </a:p>
@@ -27978,7 +27978,7 @@
             <a:pPr rtl="0"/>
             <a:fld id="{7F3FB14C-AC96-42E5-BE0B-73EFAA1A7EA7}" type="datetime1">
               <a:rPr lang="it-IT" noProof="0" smtClean="0"/>
-              <a:t>20/06/2022</a:t>
+              <a:t>21/06/2022</a:t>
             </a:fld>
             <a:endParaRPr lang="it-IT" noProof="0"/>
           </a:p>
@@ -28289,7 +28289,7 @@
             <a:pPr rtl="0"/>
             <a:fld id="{76327E91-20FF-43F1-A337-75953C73E7D7}" type="datetime1">
               <a:rPr lang="it-IT" noProof="0" smtClean="0"/>
-              <a:t>20/06/2022</a:t>
+              <a:t>21/06/2022</a:t>
             </a:fld>
             <a:endParaRPr lang="it-IT" noProof="0"/>
           </a:p>
@@ -28593,7 +28593,7 @@
             <a:pPr rtl="0"/>
             <a:fld id="{9EDCB701-B7F2-4988-9CFB-241C1D412354}" type="datetime1">
               <a:rPr lang="it-IT" noProof="0" smtClean="0"/>
-              <a:t>20/06/2022</a:t>
+              <a:t>21/06/2022</a:t>
             </a:fld>
             <a:endParaRPr lang="it-IT" noProof="0"/>
           </a:p>
@@ -29017,7 +29017,7 @@
             <a:pPr rtl="0"/>
             <a:fld id="{4B9B0459-76CC-4B94-A6C6-908B17D42BC8}" type="datetime1">
               <a:rPr lang="it-IT" noProof="0" smtClean="0"/>
-              <a:t>20/06/2022</a:t>
+              <a:t>21/06/2022</a:t>
             </a:fld>
             <a:endParaRPr lang="it-IT" noProof="0"/>
           </a:p>
@@ -29116,7 +29116,7 @@
             <a:pPr rtl="0"/>
             <a:fld id="{62D572E4-8572-44CF-B6FA-B15ECB2B0691}" type="datetime1">
               <a:rPr lang="it-IT" noProof="0" smtClean="0"/>
-              <a:t>20/06/2022</a:t>
+              <a:t>21/06/2022</a:t>
             </a:fld>
             <a:endParaRPr lang="it-IT" noProof="0"/>
           </a:p>
@@ -29282,7 +29282,7 @@
             <a:pPr rtl="0"/>
             <a:fld id="{5F266B29-8DDF-40ED-AC5D-ED73AC5A6521}" type="datetime1">
               <a:rPr lang="it-IT" noProof="0" smtClean="0"/>
-              <a:t>20/06/2022</a:t>
+              <a:t>21/06/2022</a:t>
             </a:fld>
             <a:endParaRPr lang="it-IT" noProof="0"/>
           </a:p>
@@ -29663,7 +29663,7 @@
             <a:pPr rtl="0"/>
             <a:fld id="{4CFC7787-2DFD-4221-B49C-354C37128239}" type="datetime1">
               <a:rPr lang="it-IT" noProof="0" smtClean="0"/>
-              <a:t>20/06/2022</a:t>
+              <a:t>21/06/2022</a:t>
             </a:fld>
             <a:endParaRPr lang="it-IT" noProof="0"/>
           </a:p>
@@ -29956,7 +29956,7 @@
             <a:pPr rtl="0"/>
             <a:fld id="{D3F07A8F-C5D3-4128-B052-E864993A59CE}" type="datetime1">
               <a:rPr lang="it-IT" noProof="0" smtClean="0"/>
-              <a:t>20/06/2022</a:t>
+              <a:t>21/06/2022</a:t>
             </a:fld>
             <a:endParaRPr lang="it-IT" noProof="0"/>
           </a:p>
@@ -30170,7 +30170,7 @@
             <a:pPr rtl="0"/>
             <a:fld id="{A36BACEF-F5E2-445B-BCCF-A68C06C41D7B}" type="datetime1">
               <a:rPr lang="it-IT" noProof="0" smtClean="0"/>
-              <a:t>20/06/2022</a:t>
+              <a:t>21/06/2022</a:t>
             </a:fld>
             <a:endParaRPr lang="it-IT" noProof="0" dirty="0"/>
           </a:p>
@@ -32867,7 +32867,7 @@
           <p:nvPr>
             <p:extLst>
               <p:ext uri="{D42A27DB-BD31-4B8C-83A1-F6EECF244321}">
-                <p14:modId xmlns:p14="http://schemas.microsoft.com/office/powerpoint/2010/main" val="2772407263"/>
+                <p14:modId xmlns:p14="http://schemas.microsoft.com/office/powerpoint/2010/main" val="4006552091"/>
               </p:ext>
             </p:extLst>
           </p:nvPr>
@@ -33503,7 +33503,12 @@
                     <a:lstStyle/>
                     <a:p>
                       <a:pPr algn="ctr"/>
-                      <a:endParaRPr lang="it-IT"/>
+                      <a:r>
+                        <a:rPr lang="it-IT">
+                          <a:latin typeface="Avenir Next LT Pro" panose="020B0504020202020204" pitchFamily="34" charset="0"/>
+                        </a:rPr>
+                        <a:t>0.974</a:t>
+                      </a:r>
                     </a:p>
                   </a:txBody>
                   <a:tcPr>

</xml_diff>

<commit_message>
Update results and presentation: add tables for F1-score, AUC ROC and Precision/Recall, and add results
</commit_message>
<xml_diff>
--- a/presentation/fraudolent_transaction.pptx
+++ b/presentation/fraudolent_transaction.pptx
@@ -5,10 +5,10 @@
     <p:sldMasterId id="2147483672" r:id="rId1"/>
   </p:sldMasterIdLst>
   <p:notesMasterIdLst>
-    <p:notesMasterId r:id="rId14"/>
+    <p:notesMasterId r:id="rId15"/>
   </p:notesMasterIdLst>
   <p:handoutMasterIdLst>
-    <p:handoutMasterId r:id="rId15"/>
+    <p:handoutMasterId r:id="rId16"/>
   </p:handoutMasterIdLst>
   <p:sldIdLst>
     <p:sldId id="256" r:id="rId2"/>
@@ -23,6 +23,7 @@
     <p:sldId id="270" r:id="rId11"/>
     <p:sldId id="271" r:id="rId12"/>
     <p:sldId id="272" r:id="rId13"/>
+    <p:sldId id="273" r:id="rId14"/>
   </p:sldIdLst>
   <p:sldSz cx="12192000" cy="6858000"/>
   <p:notesSz cx="6858000" cy="9144000"/>
@@ -32707,7 +32708,7 @@
           <a:p>
             <a:r>
               <a:rPr lang="it-IT"/>
-              <a:t>		EXPERIMENTAL RESULTS</a:t>
+              <a:t>		.1 - EXPERIMENTAL RESULTS</a:t>
             </a:r>
           </a:p>
         </p:txBody>
@@ -32867,13 +32868,2707 @@
           <p:nvPr>
             <p:extLst>
               <p:ext uri="{D42A27DB-BD31-4B8C-83A1-F6EECF244321}">
-                <p14:modId xmlns:p14="http://schemas.microsoft.com/office/powerpoint/2010/main" val="4006552091"/>
+                <p14:modId xmlns:p14="http://schemas.microsoft.com/office/powerpoint/2010/main" val="3830145681"/>
               </p:ext>
             </p:extLst>
           </p:nvPr>
         </p:nvGraphicFramePr>
         <p:xfrm>
-          <a:off x="815060" y="3422523"/>
+          <a:off x="694061" y="2174042"/>
+          <a:ext cx="10551283" cy="1844040"/>
+        </p:xfrm>
+        <a:graphic>
+          <a:graphicData uri="http://schemas.openxmlformats.org/drawingml/2006/table">
+            <a:tbl>
+              <a:tblPr firstRow="1" bandRow="1">
+                <a:tableStyleId>{3B4B98B0-60AC-42C2-AFA5-B58CD77FA1E5}</a:tableStyleId>
+              </a:tblPr>
+              <a:tblGrid>
+                <a:gridCol w="1957828">
+                  <a:extLst>
+                    <a:ext uri="{9D8B030D-6E8A-4147-A177-3AD203B41FA5}">
+                      <a16:colId xmlns:a16="http://schemas.microsoft.com/office/drawing/2014/main" val="396372187"/>
+                    </a:ext>
+                  </a:extLst>
+                </a:gridCol>
+                <a:gridCol w="1306286">
+                  <a:extLst>
+                    <a:ext uri="{9D8B030D-6E8A-4147-A177-3AD203B41FA5}">
+                      <a16:colId xmlns:a16="http://schemas.microsoft.com/office/drawing/2014/main" val="1229565216"/>
+                    </a:ext>
+                  </a:extLst>
+                </a:gridCol>
+                <a:gridCol w="1240971">
+                  <a:extLst>
+                    <a:ext uri="{9D8B030D-6E8A-4147-A177-3AD203B41FA5}">
+                      <a16:colId xmlns:a16="http://schemas.microsoft.com/office/drawing/2014/main" val="3000570086"/>
+                    </a:ext>
+                  </a:extLst>
+                </a:gridCol>
+                <a:gridCol w="1561606">
+                  <a:extLst>
+                    <a:ext uri="{9D8B030D-6E8A-4147-A177-3AD203B41FA5}">
+                      <a16:colId xmlns:a16="http://schemas.microsoft.com/office/drawing/2014/main" val="2527479792"/>
+                    </a:ext>
+                  </a:extLst>
+                </a:gridCol>
+                <a:gridCol w="1711707">
+                  <a:extLst>
+                    <a:ext uri="{9D8B030D-6E8A-4147-A177-3AD203B41FA5}">
+                      <a16:colId xmlns:a16="http://schemas.microsoft.com/office/drawing/2014/main" val="1832342877"/>
+                    </a:ext>
+                  </a:extLst>
+                </a:gridCol>
+                <a:gridCol w="1442852">
+                  <a:extLst>
+                    <a:ext uri="{9D8B030D-6E8A-4147-A177-3AD203B41FA5}">
+                      <a16:colId xmlns:a16="http://schemas.microsoft.com/office/drawing/2014/main" val="455619855"/>
+                    </a:ext>
+                  </a:extLst>
+                </a:gridCol>
+                <a:gridCol w="1330033">
+                  <a:extLst>
+                    <a:ext uri="{9D8B030D-6E8A-4147-A177-3AD203B41FA5}">
+                      <a16:colId xmlns:a16="http://schemas.microsoft.com/office/drawing/2014/main" val="842104205"/>
+                    </a:ext>
+                  </a:extLst>
+                </a:gridCol>
+              </a:tblGrid>
+              <a:tr h="357766">
+                <a:tc>
+                  <a:txBody>
+                    <a:bodyPr/>
+                    <a:lstStyle/>
+                    <a:p>
+                      <a:endParaRPr lang="it-IT">
+                        <a:solidFill>
+                          <a:schemeClr val="accent2"/>
+                        </a:solidFill>
+                      </a:endParaRPr>
+                    </a:p>
+                  </a:txBody>
+                  <a:tcPr>
+                    <a:solidFill>
+                      <a:schemeClr val="accent1"/>
+                    </a:solidFill>
+                  </a:tcPr>
+                </a:tc>
+                <a:tc gridSpan="2">
+                  <a:txBody>
+                    <a:bodyPr/>
+                    <a:lstStyle/>
+                    <a:p>
+                      <a:pPr algn="ctr"/>
+                      <a:r>
+                        <a:rPr lang="it-IT"/>
+                        <a:t>Numerical</a:t>
+                      </a:r>
+                    </a:p>
+                  </a:txBody>
+                  <a:tcPr/>
+                </a:tc>
+                <a:tc hMerge="1">
+                  <a:txBody>
+                    <a:bodyPr/>
+                    <a:lstStyle/>
+                    <a:p>
+                      <a:endParaRPr lang="it-IT"/>
+                    </a:p>
+                  </a:txBody>
+                  <a:tcPr/>
+                </a:tc>
+                <a:tc>
+                  <a:txBody>
+                    <a:bodyPr/>
+                    <a:lstStyle/>
+                    <a:p>
+                      <a:pPr algn="ctr"/>
+                      <a:r>
+                        <a:rPr lang="it-IT"/>
+                        <a:t>All Features</a:t>
+                      </a:r>
+                    </a:p>
+                  </a:txBody>
+                  <a:tcPr/>
+                </a:tc>
+                <a:tc>
+                  <a:txBody>
+                    <a:bodyPr/>
+                    <a:lstStyle/>
+                    <a:p>
+                      <a:pPr algn="ctr"/>
+                      <a:r>
+                        <a:rPr lang="it-IT"/>
+                        <a:t>Categorical</a:t>
+                      </a:r>
+                    </a:p>
+                  </a:txBody>
+                  <a:tcPr/>
+                </a:tc>
+                <a:tc gridSpan="2">
+                  <a:txBody>
+                    <a:bodyPr/>
+                    <a:lstStyle/>
+                    <a:p>
+                      <a:pPr algn="ctr"/>
+                      <a:r>
+                        <a:rPr lang="it-IT"/>
+                        <a:t>Mix</a:t>
+                      </a:r>
+                    </a:p>
+                  </a:txBody>
+                  <a:tcPr/>
+                </a:tc>
+                <a:tc hMerge="1">
+                  <a:txBody>
+                    <a:bodyPr/>
+                    <a:lstStyle/>
+                    <a:p>
+                      <a:pPr algn="ctr"/>
+                      <a:endParaRPr lang="it-IT"/>
+                    </a:p>
+                  </a:txBody>
+                  <a:tcPr/>
+                </a:tc>
+                <a:extLst>
+                  <a:ext uri="{0D108BD9-81ED-4DB2-BD59-A6C34878D82A}">
+                    <a16:rowId xmlns:a16="http://schemas.microsoft.com/office/drawing/2014/main" val="464026787"/>
+                  </a:ext>
+                </a:extLst>
+              </a:tr>
+              <a:tr h="359229">
+                <a:tc>
+                  <a:txBody>
+                    <a:bodyPr/>
+                    <a:lstStyle/>
+                    <a:p>
+                      <a:endParaRPr lang="it-IT">
+                        <a:solidFill>
+                          <a:schemeClr val="accent2"/>
+                        </a:solidFill>
+                      </a:endParaRPr>
+                    </a:p>
+                  </a:txBody>
+                  <a:tcPr>
+                    <a:lnB w="12700" cap="flat" cmpd="sng" algn="ctr">
+                      <a:solidFill>
+                        <a:schemeClr val="tx1"/>
+                      </a:solidFill>
+                      <a:prstDash val="solid"/>
+                      <a:round/>
+                      <a:headEnd type="none" w="med" len="med"/>
+                      <a:tailEnd type="none" w="med" len="med"/>
+                    </a:lnB>
+                    <a:solidFill>
+                      <a:schemeClr val="accent1"/>
+                    </a:solidFill>
+                  </a:tcPr>
+                </a:tc>
+                <a:tc>
+                  <a:txBody>
+                    <a:bodyPr/>
+                    <a:lstStyle/>
+                    <a:p>
+                      <a:pPr algn="ctr">
+                        <a:lnSpc>
+                          <a:spcPct val="150000"/>
+                        </a:lnSpc>
+                      </a:pPr>
+                      <a:r>
+                        <a:rPr lang="it-IT" sz="1100" u="sng">
+                          <a:latin typeface="Bahnschrift SemiBold SemiConden" panose="020B0502040204020203" pitchFamily="34" charset="0"/>
+                        </a:rPr>
+                        <a:t>with standardization</a:t>
+                      </a:r>
+                    </a:p>
+                  </a:txBody>
+                  <a:tcPr>
+                    <a:lnR w="12700" cap="flat" cmpd="sng" algn="ctr">
+                      <a:solidFill>
+                        <a:schemeClr val="tx1"/>
+                      </a:solidFill>
+                      <a:prstDash val="solid"/>
+                      <a:round/>
+                      <a:headEnd type="none" w="med" len="med"/>
+                      <a:tailEnd type="none" w="med" len="med"/>
+                    </a:lnR>
+                    <a:lnB w="12700" cap="flat" cmpd="sng" algn="ctr">
+                      <a:solidFill>
+                        <a:schemeClr val="tx1"/>
+                      </a:solidFill>
+                      <a:prstDash val="solid"/>
+                      <a:round/>
+                      <a:headEnd type="none" w="med" len="med"/>
+                      <a:tailEnd type="none" w="med" len="med"/>
+                    </a:lnB>
+                  </a:tcPr>
+                </a:tc>
+                <a:tc>
+                  <a:txBody>
+                    <a:bodyPr/>
+                    <a:lstStyle/>
+                    <a:p>
+                      <a:pPr algn="ctr">
+                        <a:lnSpc>
+                          <a:spcPct val="150000"/>
+                        </a:lnSpc>
+                      </a:pPr>
+                      <a:r>
+                        <a:rPr lang="it-IT" sz="1100" u="sng">
+                          <a:latin typeface="Bahnschrift SemiBold SemiConden" panose="020B0502040204020203" pitchFamily="34" charset="0"/>
+                        </a:rPr>
+                        <a:t>w/out standardize</a:t>
+                      </a:r>
+                    </a:p>
+                  </a:txBody>
+                  <a:tcPr>
+                    <a:lnL w="12700" cap="flat" cmpd="sng" algn="ctr">
+                      <a:solidFill>
+                        <a:schemeClr val="tx1"/>
+                      </a:solidFill>
+                      <a:prstDash val="solid"/>
+                      <a:round/>
+                      <a:headEnd type="none" w="med" len="med"/>
+                      <a:tailEnd type="none" w="med" len="med"/>
+                    </a:lnL>
+                    <a:lnB w="12700" cap="flat" cmpd="sng" algn="ctr">
+                      <a:solidFill>
+                        <a:schemeClr val="tx1"/>
+                      </a:solidFill>
+                      <a:prstDash val="solid"/>
+                      <a:round/>
+                      <a:headEnd type="none" w="med" len="med"/>
+                      <a:tailEnd type="none" w="med" len="med"/>
+                    </a:lnB>
+                  </a:tcPr>
+                </a:tc>
+                <a:tc>
+                  <a:txBody>
+                    <a:bodyPr/>
+                    <a:lstStyle/>
+                    <a:p>
+                      <a:endParaRPr lang="it-IT"/>
+                    </a:p>
+                  </a:txBody>
+                  <a:tcPr>
+                    <a:lnB w="12700" cap="flat" cmpd="sng" algn="ctr">
+                      <a:solidFill>
+                        <a:schemeClr val="tx1"/>
+                      </a:solidFill>
+                      <a:prstDash val="solid"/>
+                      <a:round/>
+                      <a:headEnd type="none" w="med" len="med"/>
+                      <a:tailEnd type="none" w="med" len="med"/>
+                    </a:lnB>
+                    <a:solidFill>
+                      <a:schemeClr val="bg1"/>
+                    </a:solidFill>
+                  </a:tcPr>
+                </a:tc>
+                <a:tc>
+                  <a:txBody>
+                    <a:bodyPr/>
+                    <a:lstStyle/>
+                    <a:p>
+                      <a:endParaRPr lang="it-IT"/>
+                    </a:p>
+                  </a:txBody>
+                  <a:tcPr>
+                    <a:lnB w="12700" cap="flat" cmpd="sng" algn="ctr">
+                      <a:solidFill>
+                        <a:schemeClr val="tx1"/>
+                      </a:solidFill>
+                      <a:prstDash val="solid"/>
+                      <a:round/>
+                      <a:headEnd type="none" w="med" len="med"/>
+                      <a:tailEnd type="none" w="med" len="med"/>
+                    </a:lnB>
+                    <a:solidFill>
+                      <a:schemeClr val="bg1">
+                        <a:alpha val="20000"/>
+                      </a:schemeClr>
+                    </a:solidFill>
+                  </a:tcPr>
+                </a:tc>
+                <a:tc>
+                  <a:txBody>
+                    <a:bodyPr/>
+                    <a:lstStyle/>
+                    <a:p>
+                      <a:pPr algn="ctr">
+                        <a:lnSpc>
+                          <a:spcPct val="150000"/>
+                        </a:lnSpc>
+                      </a:pPr>
+                      <a:r>
+                        <a:rPr lang="it-IT" sz="1100" u="sng">
+                          <a:latin typeface="Bahnschrift SemiBold SemiConden" panose="020B0502040204020203" pitchFamily="34" charset="0"/>
+                        </a:rPr>
+                        <a:t>with standardization</a:t>
+                      </a:r>
+                    </a:p>
+                  </a:txBody>
+                  <a:tcPr>
+                    <a:lnR w="12700" cap="flat" cmpd="sng" algn="ctr">
+                      <a:solidFill>
+                        <a:schemeClr val="tx1"/>
+                      </a:solidFill>
+                      <a:prstDash val="solid"/>
+                      <a:round/>
+                      <a:headEnd type="none" w="med" len="med"/>
+                      <a:tailEnd type="none" w="med" len="med"/>
+                    </a:lnR>
+                    <a:lnB w="12700" cap="flat" cmpd="sng" algn="ctr">
+                      <a:solidFill>
+                        <a:schemeClr val="tx1"/>
+                      </a:solidFill>
+                      <a:prstDash val="solid"/>
+                      <a:round/>
+                      <a:headEnd type="none" w="med" len="med"/>
+                      <a:tailEnd type="none" w="med" len="med"/>
+                    </a:lnB>
+                  </a:tcPr>
+                </a:tc>
+                <a:tc>
+                  <a:txBody>
+                    <a:bodyPr/>
+                    <a:lstStyle/>
+                    <a:p>
+                      <a:pPr algn="ctr">
+                        <a:lnSpc>
+                          <a:spcPct val="150000"/>
+                        </a:lnSpc>
+                      </a:pPr>
+                      <a:r>
+                        <a:rPr lang="it-IT" sz="1100" u="sng">
+                          <a:latin typeface="Bahnschrift SemiBold SemiConden" panose="020B0502040204020203" pitchFamily="34" charset="0"/>
+                        </a:rPr>
+                        <a:t>w/out standardize</a:t>
+                      </a:r>
+                    </a:p>
+                  </a:txBody>
+                  <a:tcPr>
+                    <a:lnL w="12700" cap="flat" cmpd="sng" algn="ctr">
+                      <a:solidFill>
+                        <a:schemeClr val="tx1"/>
+                      </a:solidFill>
+                      <a:prstDash val="solid"/>
+                      <a:round/>
+                      <a:headEnd type="none" w="med" len="med"/>
+                      <a:tailEnd type="none" w="med" len="med"/>
+                    </a:lnL>
+                    <a:lnB w="12700" cap="flat" cmpd="sng" algn="ctr">
+                      <a:solidFill>
+                        <a:schemeClr val="tx1"/>
+                      </a:solidFill>
+                      <a:prstDash val="solid"/>
+                      <a:round/>
+                      <a:headEnd type="none" w="med" len="med"/>
+                      <a:tailEnd type="none" w="med" len="med"/>
+                    </a:lnB>
+                  </a:tcPr>
+                </a:tc>
+                <a:extLst>
+                  <a:ext uri="{0D108BD9-81ED-4DB2-BD59-A6C34878D82A}">
+                    <a16:rowId xmlns:a16="http://schemas.microsoft.com/office/drawing/2014/main" val="1365004327"/>
+                  </a:ext>
+                </a:extLst>
+              </a:tr>
+              <a:tr h="370840">
+                <a:tc>
+                  <a:txBody>
+                    <a:bodyPr/>
+                    <a:lstStyle/>
+                    <a:p>
+                      <a:r>
+                        <a:rPr lang="it-IT">
+                          <a:latin typeface="Bahnschrift SemiBold SemiConden" panose="020B0502040204020203" pitchFamily="34" charset="0"/>
+                        </a:rPr>
+                        <a:t>Logistic Regression</a:t>
+                      </a:r>
+                    </a:p>
+                  </a:txBody>
+                  <a:tcPr>
+                    <a:lnR w="12700" cap="flat" cmpd="sng" algn="ctr">
+                      <a:solidFill>
+                        <a:schemeClr val="tx1"/>
+                      </a:solidFill>
+                      <a:prstDash val="solid"/>
+                      <a:round/>
+                      <a:headEnd type="none" w="med" len="med"/>
+                      <a:tailEnd type="none" w="med" len="med"/>
+                    </a:lnR>
+                    <a:lnT w="12700" cap="flat" cmpd="sng" algn="ctr">
+                      <a:solidFill>
+                        <a:schemeClr val="tx1"/>
+                      </a:solidFill>
+                      <a:prstDash val="solid"/>
+                      <a:round/>
+                      <a:headEnd type="none" w="med" len="med"/>
+                      <a:tailEnd type="none" w="med" len="med"/>
+                    </a:lnT>
+                  </a:tcPr>
+                </a:tc>
+                <a:tc>
+                  <a:txBody>
+                    <a:bodyPr/>
+                    <a:lstStyle/>
+                    <a:p>
+                      <a:pPr algn="ctr"/>
+                      <a:r>
+                        <a:rPr lang="it-IT" sz="1800" b="0" i="0" kern="1200">
+                          <a:solidFill>
+                            <a:schemeClr val="tx1"/>
+                          </a:solidFill>
+                          <a:effectLst/>
+                          <a:latin typeface="Avenir Next LT Pro" panose="020B0504020202020204" pitchFamily="34" charset="0"/>
+                          <a:ea typeface="+mn-ea"/>
+                          <a:cs typeface="+mn-cs"/>
+                        </a:rPr>
+                        <a:t>0.9772</a:t>
+                      </a:r>
+                      <a:endParaRPr lang="it-IT">
+                        <a:latin typeface="Avenir Next LT Pro" panose="020B0504020202020204" pitchFamily="34" charset="0"/>
+                      </a:endParaRPr>
+                    </a:p>
+                  </a:txBody>
+                  <a:tcPr>
+                    <a:lnL w="12700" cap="flat" cmpd="sng" algn="ctr">
+                      <a:solidFill>
+                        <a:schemeClr val="tx1"/>
+                      </a:solidFill>
+                      <a:prstDash val="solid"/>
+                      <a:round/>
+                      <a:headEnd type="none" w="med" len="med"/>
+                      <a:tailEnd type="none" w="med" len="med"/>
+                    </a:lnL>
+                    <a:lnR w="12700" cap="flat" cmpd="sng" algn="ctr">
+                      <a:solidFill>
+                        <a:schemeClr val="tx1"/>
+                      </a:solidFill>
+                      <a:prstDash val="solid"/>
+                      <a:round/>
+                      <a:headEnd type="none" w="med" len="med"/>
+                      <a:tailEnd type="none" w="med" len="med"/>
+                    </a:lnR>
+                    <a:lnT w="12700" cap="flat" cmpd="sng" algn="ctr">
+                      <a:solidFill>
+                        <a:schemeClr val="tx1"/>
+                      </a:solidFill>
+                      <a:prstDash val="solid"/>
+                      <a:round/>
+                      <a:headEnd type="none" w="med" len="med"/>
+                      <a:tailEnd type="none" w="med" len="med"/>
+                    </a:lnT>
+                  </a:tcPr>
+                </a:tc>
+                <a:tc>
+                  <a:txBody>
+                    <a:bodyPr/>
+                    <a:lstStyle/>
+                    <a:p>
+                      <a:pPr algn="ctr"/>
+                      <a:r>
+                        <a:rPr lang="it-IT">
+                          <a:latin typeface="Avenir Next LT Pro" panose="020B0504020202020204" pitchFamily="34" charset="0"/>
+                        </a:rPr>
+                        <a:t>0.97725</a:t>
+                      </a:r>
+                    </a:p>
+                  </a:txBody>
+                  <a:tcPr>
+                    <a:lnL w="12700" cap="flat" cmpd="sng" algn="ctr">
+                      <a:solidFill>
+                        <a:schemeClr val="tx1"/>
+                      </a:solidFill>
+                      <a:prstDash val="solid"/>
+                      <a:round/>
+                      <a:headEnd type="none" w="med" len="med"/>
+                      <a:tailEnd type="none" w="med" len="med"/>
+                    </a:lnL>
+                    <a:lnR w="12700" cap="flat" cmpd="sng" algn="ctr">
+                      <a:solidFill>
+                        <a:schemeClr val="tx1"/>
+                      </a:solidFill>
+                      <a:prstDash val="solid"/>
+                      <a:round/>
+                      <a:headEnd type="none" w="med" len="med"/>
+                      <a:tailEnd type="none" w="med" len="med"/>
+                    </a:lnR>
+                    <a:lnT w="12700" cap="flat" cmpd="sng" algn="ctr">
+                      <a:solidFill>
+                        <a:schemeClr val="tx1"/>
+                      </a:solidFill>
+                      <a:prstDash val="solid"/>
+                      <a:round/>
+                      <a:headEnd type="none" w="med" len="med"/>
+                      <a:tailEnd type="none" w="med" len="med"/>
+                    </a:lnT>
+                  </a:tcPr>
+                </a:tc>
+                <a:tc>
+                  <a:txBody>
+                    <a:bodyPr/>
+                    <a:lstStyle/>
+                    <a:p>
+                      <a:pPr algn="ctr"/>
+                      <a:r>
+                        <a:rPr lang="it-IT" sz="1800" b="1" i="0" kern="1200">
+                          <a:solidFill>
+                            <a:schemeClr val="tx1"/>
+                          </a:solidFill>
+                          <a:effectLst/>
+                          <a:latin typeface="Avenir Next LT Pro" panose="020B0504020202020204" pitchFamily="34" charset="0"/>
+                          <a:ea typeface="+mn-ea"/>
+                          <a:cs typeface="+mn-cs"/>
+                        </a:rPr>
+                        <a:t>0.9777</a:t>
+                      </a:r>
+                      <a:endParaRPr lang="it-IT" b="1">
+                        <a:latin typeface="Avenir Next LT Pro" panose="020B0504020202020204" pitchFamily="34" charset="0"/>
+                      </a:endParaRPr>
+                    </a:p>
+                  </a:txBody>
+                  <a:tcPr>
+                    <a:lnL w="12700" cap="flat" cmpd="sng" algn="ctr">
+                      <a:solidFill>
+                        <a:schemeClr val="tx1"/>
+                      </a:solidFill>
+                      <a:prstDash val="solid"/>
+                      <a:round/>
+                      <a:headEnd type="none" w="med" len="med"/>
+                      <a:tailEnd type="none" w="med" len="med"/>
+                    </a:lnL>
+                    <a:lnR w="12700" cap="flat" cmpd="sng" algn="ctr">
+                      <a:solidFill>
+                        <a:schemeClr val="tx1"/>
+                      </a:solidFill>
+                      <a:prstDash val="solid"/>
+                      <a:round/>
+                      <a:headEnd type="none" w="med" len="med"/>
+                      <a:tailEnd type="none" w="med" len="med"/>
+                    </a:lnR>
+                    <a:lnT w="12700" cap="flat" cmpd="sng" algn="ctr">
+                      <a:solidFill>
+                        <a:schemeClr val="tx1"/>
+                      </a:solidFill>
+                      <a:prstDash val="solid"/>
+                      <a:round/>
+                      <a:headEnd type="none" w="med" len="med"/>
+                      <a:tailEnd type="none" w="med" len="med"/>
+                    </a:lnT>
+                  </a:tcPr>
+                </a:tc>
+                <a:tc>
+                  <a:txBody>
+                    <a:bodyPr/>
+                    <a:lstStyle/>
+                    <a:p>
+                      <a:pPr algn="ctr"/>
+                      <a:r>
+                        <a:rPr lang="it-IT" sz="1800" b="0" i="0" kern="1200">
+                          <a:solidFill>
+                            <a:schemeClr val="tx1"/>
+                          </a:solidFill>
+                          <a:effectLst/>
+                          <a:latin typeface="Avenir Next LT Pro" panose="020B0504020202020204" pitchFamily="34" charset="0"/>
+                          <a:ea typeface="+mn-ea"/>
+                          <a:cs typeface="+mn-cs"/>
+                        </a:rPr>
+                        <a:t>0.9733</a:t>
+                      </a:r>
+                      <a:endParaRPr lang="it-IT">
+                        <a:latin typeface="Avenir Next LT Pro" panose="020B0504020202020204" pitchFamily="34" charset="0"/>
+                      </a:endParaRPr>
+                    </a:p>
+                  </a:txBody>
+                  <a:tcPr>
+                    <a:lnL w="12700" cap="flat" cmpd="sng" algn="ctr">
+                      <a:solidFill>
+                        <a:schemeClr val="tx1"/>
+                      </a:solidFill>
+                      <a:prstDash val="solid"/>
+                      <a:round/>
+                      <a:headEnd type="none" w="med" len="med"/>
+                      <a:tailEnd type="none" w="med" len="med"/>
+                    </a:lnL>
+                    <a:lnR w="12700" cap="flat" cmpd="sng" algn="ctr">
+                      <a:solidFill>
+                        <a:schemeClr val="tx1"/>
+                      </a:solidFill>
+                      <a:prstDash val="solid"/>
+                      <a:round/>
+                      <a:headEnd type="none" w="med" len="med"/>
+                      <a:tailEnd type="none" w="med" len="med"/>
+                    </a:lnR>
+                    <a:lnT w="12700" cap="flat" cmpd="sng" algn="ctr">
+                      <a:solidFill>
+                        <a:schemeClr val="tx1"/>
+                      </a:solidFill>
+                      <a:prstDash val="solid"/>
+                      <a:round/>
+                      <a:headEnd type="none" w="med" len="med"/>
+                      <a:tailEnd type="none" w="med" len="med"/>
+                    </a:lnT>
+                  </a:tcPr>
+                </a:tc>
+                <a:tc>
+                  <a:txBody>
+                    <a:bodyPr/>
+                    <a:lstStyle/>
+                    <a:p>
+                      <a:pPr algn="ctr"/>
+                      <a:r>
+                        <a:rPr lang="it-IT">
+                          <a:latin typeface="Avenir Next LT Pro" panose="020B0504020202020204" pitchFamily="34" charset="0"/>
+                        </a:rPr>
+                        <a:t>0.974</a:t>
+                      </a:r>
+                    </a:p>
+                  </a:txBody>
+                  <a:tcPr>
+                    <a:lnL w="12700" cap="flat" cmpd="sng" algn="ctr">
+                      <a:solidFill>
+                        <a:schemeClr val="tx1"/>
+                      </a:solidFill>
+                      <a:prstDash val="solid"/>
+                      <a:round/>
+                      <a:headEnd type="none" w="med" len="med"/>
+                      <a:tailEnd type="none" w="med" len="med"/>
+                    </a:lnL>
+                    <a:lnR w="12700" cap="flat" cmpd="sng" algn="ctr">
+                      <a:solidFill>
+                        <a:schemeClr val="tx1"/>
+                      </a:solidFill>
+                      <a:prstDash val="solid"/>
+                      <a:round/>
+                      <a:headEnd type="none" w="med" len="med"/>
+                      <a:tailEnd type="none" w="med" len="med"/>
+                    </a:lnR>
+                    <a:lnT w="12700" cap="flat" cmpd="sng" algn="ctr">
+                      <a:solidFill>
+                        <a:schemeClr val="tx1"/>
+                      </a:solidFill>
+                      <a:prstDash val="solid"/>
+                      <a:round/>
+                      <a:headEnd type="none" w="med" len="med"/>
+                      <a:tailEnd type="none" w="med" len="med"/>
+                    </a:lnT>
+                  </a:tcPr>
+                </a:tc>
+                <a:tc>
+                  <a:txBody>
+                    <a:bodyPr/>
+                    <a:lstStyle/>
+                    <a:p>
+                      <a:pPr algn="ctr"/>
+                      <a:r>
+                        <a:rPr lang="it-IT">
+                          <a:latin typeface="Avenir Next LT Pro" panose="020B0504020202020204" pitchFamily="34" charset="0"/>
+                        </a:rPr>
+                        <a:t>0.974</a:t>
+                      </a:r>
+                    </a:p>
+                  </a:txBody>
+                  <a:tcPr>
+                    <a:lnL w="12700" cap="flat" cmpd="sng" algn="ctr">
+                      <a:solidFill>
+                        <a:schemeClr val="tx1"/>
+                      </a:solidFill>
+                      <a:prstDash val="solid"/>
+                      <a:round/>
+                      <a:headEnd type="none" w="med" len="med"/>
+                      <a:tailEnd type="none" w="med" len="med"/>
+                    </a:lnL>
+                    <a:lnT w="12700" cap="flat" cmpd="sng" algn="ctr">
+                      <a:solidFill>
+                        <a:schemeClr val="tx1"/>
+                      </a:solidFill>
+                      <a:prstDash val="solid"/>
+                      <a:round/>
+                      <a:headEnd type="none" w="med" len="med"/>
+                      <a:tailEnd type="none" w="med" len="med"/>
+                    </a:lnT>
+                  </a:tcPr>
+                </a:tc>
+                <a:extLst>
+                  <a:ext uri="{0D108BD9-81ED-4DB2-BD59-A6C34878D82A}">
+                    <a16:rowId xmlns:a16="http://schemas.microsoft.com/office/drawing/2014/main" val="2532579262"/>
+                  </a:ext>
+                </a:extLst>
+              </a:tr>
+              <a:tr h="370840">
+                <a:tc>
+                  <a:txBody>
+                    <a:bodyPr/>
+                    <a:lstStyle/>
+                    <a:p>
+                      <a:r>
+                        <a:rPr lang="it-IT">
+                          <a:latin typeface="Bahnschrift SemiBold SemiConden" panose="020B0502040204020203" pitchFamily="34" charset="0"/>
+                        </a:rPr>
+                        <a:t>Decision Tree</a:t>
+                      </a:r>
+                    </a:p>
+                  </a:txBody>
+                  <a:tcPr>
+                    <a:lnR w="12700" cap="flat" cmpd="sng" algn="ctr">
+                      <a:solidFill>
+                        <a:schemeClr val="tx1"/>
+                      </a:solidFill>
+                      <a:prstDash val="solid"/>
+                      <a:round/>
+                      <a:headEnd type="none" w="med" len="med"/>
+                      <a:tailEnd type="none" w="med" len="med"/>
+                    </a:lnR>
+                  </a:tcPr>
+                </a:tc>
+                <a:tc>
+                  <a:txBody>
+                    <a:bodyPr/>
+                    <a:lstStyle/>
+                    <a:p>
+                      <a:pPr marL="0" marR="0" lvl="0" indent="0" algn="ctr" defTabSz="457200" rtl="0" eaLnBrk="1" fontAlgn="auto" latinLnBrk="0" hangingPunct="1">
+                        <a:lnSpc>
+                          <a:spcPct val="100000"/>
+                        </a:lnSpc>
+                        <a:spcBef>
+                          <a:spcPts val="0"/>
+                        </a:spcBef>
+                        <a:spcAft>
+                          <a:spcPts val="0"/>
+                        </a:spcAft>
+                        <a:buClrTx/>
+                        <a:buSzTx/>
+                        <a:buFontTx/>
+                        <a:buNone/>
+                        <a:tabLst/>
+                        <a:defRPr/>
+                      </a:pPr>
+                      <a:r>
+                        <a:rPr lang="it-IT" b="0">
+                          <a:latin typeface="Avenir Next LT Pro" panose="020B0504020202020204" pitchFamily="34" charset="0"/>
+                        </a:rPr>
+                        <a:t>0.9773</a:t>
+                      </a:r>
+                    </a:p>
+                  </a:txBody>
+                  <a:tcPr>
+                    <a:lnL w="12700" cap="flat" cmpd="sng" algn="ctr">
+                      <a:solidFill>
+                        <a:schemeClr val="tx1"/>
+                      </a:solidFill>
+                      <a:prstDash val="solid"/>
+                      <a:round/>
+                      <a:headEnd type="none" w="med" len="med"/>
+                      <a:tailEnd type="none" w="med" len="med"/>
+                    </a:lnL>
+                    <a:lnR w="12700" cap="flat" cmpd="sng" algn="ctr">
+                      <a:solidFill>
+                        <a:schemeClr val="tx1"/>
+                      </a:solidFill>
+                      <a:prstDash val="solid"/>
+                      <a:round/>
+                      <a:headEnd type="none" w="med" len="med"/>
+                      <a:tailEnd type="none" w="med" len="med"/>
+                    </a:lnR>
+                  </a:tcPr>
+                </a:tc>
+                <a:tc>
+                  <a:txBody>
+                    <a:bodyPr/>
+                    <a:lstStyle/>
+                    <a:p>
+                      <a:pPr algn="ctr"/>
+                      <a:r>
+                        <a:rPr lang="it-IT" b="0">
+                          <a:latin typeface="Avenir Next LT Pro" panose="020B0504020202020204" pitchFamily="34" charset="0"/>
+                        </a:rPr>
+                        <a:t>0.9773</a:t>
+                      </a:r>
+                    </a:p>
+                  </a:txBody>
+                  <a:tcPr>
+                    <a:lnL w="12700" cap="flat" cmpd="sng" algn="ctr">
+                      <a:solidFill>
+                        <a:schemeClr val="tx1"/>
+                      </a:solidFill>
+                      <a:prstDash val="solid"/>
+                      <a:round/>
+                      <a:headEnd type="none" w="med" len="med"/>
+                      <a:tailEnd type="none" w="med" len="med"/>
+                    </a:lnL>
+                    <a:lnR w="12700" cap="flat" cmpd="sng" algn="ctr">
+                      <a:solidFill>
+                        <a:schemeClr val="tx1"/>
+                      </a:solidFill>
+                      <a:prstDash val="solid"/>
+                      <a:round/>
+                      <a:headEnd type="none" w="med" len="med"/>
+                      <a:tailEnd type="none" w="med" len="med"/>
+                    </a:lnR>
+                  </a:tcPr>
+                </a:tc>
+                <a:tc>
+                  <a:txBody>
+                    <a:bodyPr/>
+                    <a:lstStyle/>
+                    <a:p>
+                      <a:pPr algn="ctr"/>
+                      <a:endParaRPr lang="it-IT">
+                        <a:latin typeface="Avenir Next LT Pro" panose="020B0504020202020204" pitchFamily="34" charset="0"/>
+                      </a:endParaRPr>
+                    </a:p>
+                  </a:txBody>
+                  <a:tcPr>
+                    <a:lnL w="12700" cap="flat" cmpd="sng" algn="ctr">
+                      <a:solidFill>
+                        <a:schemeClr val="tx1"/>
+                      </a:solidFill>
+                      <a:prstDash val="solid"/>
+                      <a:round/>
+                      <a:headEnd type="none" w="med" len="med"/>
+                      <a:tailEnd type="none" w="med" len="med"/>
+                    </a:lnL>
+                    <a:lnR w="12700" cap="flat" cmpd="sng" algn="ctr">
+                      <a:solidFill>
+                        <a:schemeClr val="tx1"/>
+                      </a:solidFill>
+                      <a:prstDash val="solid"/>
+                      <a:round/>
+                      <a:headEnd type="none" w="med" len="med"/>
+                      <a:tailEnd type="none" w="med" len="med"/>
+                    </a:lnR>
+                  </a:tcPr>
+                </a:tc>
+                <a:tc>
+                  <a:txBody>
+                    <a:bodyPr/>
+                    <a:lstStyle/>
+                    <a:p>
+                      <a:pPr algn="ctr"/>
+                      <a:r>
+                        <a:rPr lang="it-IT" sz="1800" b="0" i="0" kern="1200">
+                          <a:solidFill>
+                            <a:schemeClr val="tx1"/>
+                          </a:solidFill>
+                          <a:effectLst/>
+                          <a:latin typeface="Avenir Next LT Pro" panose="020B0504020202020204" pitchFamily="34" charset="0"/>
+                          <a:ea typeface="+mn-ea"/>
+                          <a:cs typeface="+mn-cs"/>
+                        </a:rPr>
+                        <a:t>0.9734</a:t>
+                      </a:r>
+                      <a:endParaRPr lang="it-IT">
+                        <a:latin typeface="Avenir Next LT Pro" panose="020B0504020202020204" pitchFamily="34" charset="0"/>
+                      </a:endParaRPr>
+                    </a:p>
+                  </a:txBody>
+                  <a:tcPr>
+                    <a:lnL w="12700" cap="flat" cmpd="sng" algn="ctr">
+                      <a:solidFill>
+                        <a:schemeClr val="tx1"/>
+                      </a:solidFill>
+                      <a:prstDash val="solid"/>
+                      <a:round/>
+                      <a:headEnd type="none" w="med" len="med"/>
+                      <a:tailEnd type="none" w="med" len="med"/>
+                    </a:lnL>
+                    <a:lnR w="12700" cap="flat" cmpd="sng" algn="ctr">
+                      <a:solidFill>
+                        <a:schemeClr val="tx1"/>
+                      </a:solidFill>
+                      <a:prstDash val="solid"/>
+                      <a:round/>
+                      <a:headEnd type="none" w="med" len="med"/>
+                      <a:tailEnd type="none" w="med" len="med"/>
+                    </a:lnR>
+                  </a:tcPr>
+                </a:tc>
+                <a:tc>
+                  <a:txBody>
+                    <a:bodyPr/>
+                    <a:lstStyle/>
+                    <a:p>
+                      <a:pPr algn="ctr"/>
+                      <a:endParaRPr lang="it-IT">
+                        <a:latin typeface="Avenir Next LT Pro" panose="020B0504020202020204" pitchFamily="34" charset="0"/>
+                      </a:endParaRPr>
+                    </a:p>
+                  </a:txBody>
+                  <a:tcPr>
+                    <a:lnL w="12700" cap="flat" cmpd="sng" algn="ctr">
+                      <a:solidFill>
+                        <a:schemeClr val="tx1"/>
+                      </a:solidFill>
+                      <a:prstDash val="solid"/>
+                      <a:round/>
+                      <a:headEnd type="none" w="med" len="med"/>
+                      <a:tailEnd type="none" w="med" len="med"/>
+                    </a:lnL>
+                    <a:lnR w="12700" cap="flat" cmpd="sng" algn="ctr">
+                      <a:solidFill>
+                        <a:schemeClr val="tx1"/>
+                      </a:solidFill>
+                      <a:prstDash val="solid"/>
+                      <a:round/>
+                      <a:headEnd type="none" w="med" len="med"/>
+                      <a:tailEnd type="none" w="med" len="med"/>
+                    </a:lnR>
+                  </a:tcPr>
+                </a:tc>
+                <a:tc>
+                  <a:txBody>
+                    <a:bodyPr/>
+                    <a:lstStyle/>
+                    <a:p>
+                      <a:pPr algn="ctr"/>
+                      <a:endParaRPr lang="it-IT">
+                        <a:latin typeface="Avenir Next LT Pro" panose="020B0504020202020204" pitchFamily="34" charset="0"/>
+                      </a:endParaRPr>
+                    </a:p>
+                  </a:txBody>
+                  <a:tcPr>
+                    <a:lnL w="12700" cap="flat" cmpd="sng" algn="ctr">
+                      <a:solidFill>
+                        <a:schemeClr val="tx1"/>
+                      </a:solidFill>
+                      <a:prstDash val="solid"/>
+                      <a:round/>
+                      <a:headEnd type="none" w="med" len="med"/>
+                      <a:tailEnd type="none" w="med" len="med"/>
+                    </a:lnL>
+                  </a:tcPr>
+                </a:tc>
+                <a:extLst>
+                  <a:ext uri="{0D108BD9-81ED-4DB2-BD59-A6C34878D82A}">
+                    <a16:rowId xmlns:a16="http://schemas.microsoft.com/office/drawing/2014/main" val="3341464040"/>
+                  </a:ext>
+                </a:extLst>
+              </a:tr>
+              <a:tr h="370840">
+                <a:tc>
+                  <a:txBody>
+                    <a:bodyPr/>
+                    <a:lstStyle/>
+                    <a:p>
+                      <a:r>
+                        <a:rPr lang="it-IT">
+                          <a:latin typeface="Bahnschrift SemiBold SemiConden" panose="020B0502040204020203" pitchFamily="34" charset="0"/>
+                        </a:rPr>
+                        <a:t>Random Forest</a:t>
+                      </a:r>
+                    </a:p>
+                  </a:txBody>
+                  <a:tcPr>
+                    <a:lnR w="12700" cap="flat" cmpd="sng" algn="ctr">
+                      <a:solidFill>
+                        <a:schemeClr val="tx1"/>
+                      </a:solidFill>
+                      <a:prstDash val="solid"/>
+                      <a:round/>
+                      <a:headEnd type="none" w="med" len="med"/>
+                      <a:tailEnd type="none" w="med" len="med"/>
+                    </a:lnR>
+                  </a:tcPr>
+                </a:tc>
+                <a:tc>
+                  <a:txBody>
+                    <a:bodyPr/>
+                    <a:lstStyle/>
+                    <a:p>
+                      <a:pPr algn="ctr"/>
+                      <a:endParaRPr lang="it-IT">
+                        <a:latin typeface="Avenir Next LT Pro" panose="020B0504020202020204" pitchFamily="34" charset="0"/>
+                      </a:endParaRPr>
+                    </a:p>
+                  </a:txBody>
+                  <a:tcPr>
+                    <a:lnL w="12700" cap="flat" cmpd="sng" algn="ctr">
+                      <a:solidFill>
+                        <a:schemeClr val="tx1"/>
+                      </a:solidFill>
+                      <a:prstDash val="solid"/>
+                      <a:round/>
+                      <a:headEnd type="none" w="med" len="med"/>
+                      <a:tailEnd type="none" w="med" len="med"/>
+                    </a:lnL>
+                    <a:lnR w="12700" cap="flat" cmpd="sng" algn="ctr">
+                      <a:solidFill>
+                        <a:schemeClr val="tx1"/>
+                      </a:solidFill>
+                      <a:prstDash val="solid"/>
+                      <a:round/>
+                      <a:headEnd type="none" w="med" len="med"/>
+                      <a:tailEnd type="none" w="med" len="med"/>
+                    </a:lnR>
+                  </a:tcPr>
+                </a:tc>
+                <a:tc>
+                  <a:txBody>
+                    <a:bodyPr/>
+                    <a:lstStyle/>
+                    <a:p>
+                      <a:pPr algn="ctr"/>
+                      <a:endParaRPr lang="it-IT">
+                        <a:latin typeface="Avenir Next LT Pro" panose="020B0504020202020204" pitchFamily="34" charset="0"/>
+                      </a:endParaRPr>
+                    </a:p>
+                  </a:txBody>
+                  <a:tcPr>
+                    <a:lnL w="12700" cap="flat" cmpd="sng" algn="ctr">
+                      <a:solidFill>
+                        <a:schemeClr val="tx1"/>
+                      </a:solidFill>
+                      <a:prstDash val="solid"/>
+                      <a:round/>
+                      <a:headEnd type="none" w="med" len="med"/>
+                      <a:tailEnd type="none" w="med" len="med"/>
+                    </a:lnL>
+                    <a:lnR w="12700" cap="flat" cmpd="sng" algn="ctr">
+                      <a:solidFill>
+                        <a:schemeClr val="tx1"/>
+                      </a:solidFill>
+                      <a:prstDash val="solid"/>
+                      <a:round/>
+                      <a:headEnd type="none" w="med" len="med"/>
+                      <a:tailEnd type="none" w="med" len="med"/>
+                    </a:lnR>
+                  </a:tcPr>
+                </a:tc>
+                <a:tc>
+                  <a:txBody>
+                    <a:bodyPr/>
+                    <a:lstStyle/>
+                    <a:p>
+                      <a:pPr algn="ctr"/>
+                      <a:endParaRPr lang="it-IT">
+                        <a:latin typeface="Avenir Next LT Pro" panose="020B0504020202020204" pitchFamily="34" charset="0"/>
+                      </a:endParaRPr>
+                    </a:p>
+                  </a:txBody>
+                  <a:tcPr>
+                    <a:lnL w="12700" cap="flat" cmpd="sng" algn="ctr">
+                      <a:solidFill>
+                        <a:schemeClr val="tx1"/>
+                      </a:solidFill>
+                      <a:prstDash val="solid"/>
+                      <a:round/>
+                      <a:headEnd type="none" w="med" len="med"/>
+                      <a:tailEnd type="none" w="med" len="med"/>
+                    </a:lnL>
+                    <a:lnR w="12700" cap="flat" cmpd="sng" algn="ctr">
+                      <a:solidFill>
+                        <a:schemeClr val="tx1"/>
+                      </a:solidFill>
+                      <a:prstDash val="solid"/>
+                      <a:round/>
+                      <a:headEnd type="none" w="med" len="med"/>
+                      <a:tailEnd type="none" w="med" len="med"/>
+                    </a:lnR>
+                  </a:tcPr>
+                </a:tc>
+                <a:tc>
+                  <a:txBody>
+                    <a:bodyPr/>
+                    <a:lstStyle/>
+                    <a:p>
+                      <a:pPr algn="ctr"/>
+                      <a:endParaRPr lang="it-IT">
+                        <a:latin typeface="Avenir Next LT Pro" panose="020B0504020202020204" pitchFamily="34" charset="0"/>
+                      </a:endParaRPr>
+                    </a:p>
+                  </a:txBody>
+                  <a:tcPr>
+                    <a:lnL w="12700" cap="flat" cmpd="sng" algn="ctr">
+                      <a:solidFill>
+                        <a:schemeClr val="tx1"/>
+                      </a:solidFill>
+                      <a:prstDash val="solid"/>
+                      <a:round/>
+                      <a:headEnd type="none" w="med" len="med"/>
+                      <a:tailEnd type="none" w="med" len="med"/>
+                    </a:lnL>
+                    <a:lnR w="12700" cap="flat" cmpd="sng" algn="ctr">
+                      <a:solidFill>
+                        <a:schemeClr val="tx1"/>
+                      </a:solidFill>
+                      <a:prstDash val="solid"/>
+                      <a:round/>
+                      <a:headEnd type="none" w="med" len="med"/>
+                      <a:tailEnd type="none" w="med" len="med"/>
+                    </a:lnR>
+                  </a:tcPr>
+                </a:tc>
+                <a:tc>
+                  <a:txBody>
+                    <a:bodyPr/>
+                    <a:lstStyle/>
+                    <a:p>
+                      <a:pPr algn="ctr"/>
+                      <a:endParaRPr lang="it-IT">
+                        <a:latin typeface="Avenir Next LT Pro" panose="020B0504020202020204" pitchFamily="34" charset="0"/>
+                      </a:endParaRPr>
+                    </a:p>
+                  </a:txBody>
+                  <a:tcPr>
+                    <a:lnL w="12700" cap="flat" cmpd="sng" algn="ctr">
+                      <a:solidFill>
+                        <a:schemeClr val="tx1"/>
+                      </a:solidFill>
+                      <a:prstDash val="solid"/>
+                      <a:round/>
+                      <a:headEnd type="none" w="med" len="med"/>
+                      <a:tailEnd type="none" w="med" len="med"/>
+                    </a:lnL>
+                    <a:lnR w="12700" cap="flat" cmpd="sng" algn="ctr">
+                      <a:solidFill>
+                        <a:schemeClr val="tx1"/>
+                      </a:solidFill>
+                      <a:prstDash val="solid"/>
+                      <a:round/>
+                      <a:headEnd type="none" w="med" len="med"/>
+                      <a:tailEnd type="none" w="med" len="med"/>
+                    </a:lnR>
+                  </a:tcPr>
+                </a:tc>
+                <a:tc>
+                  <a:txBody>
+                    <a:bodyPr/>
+                    <a:lstStyle/>
+                    <a:p>
+                      <a:pPr algn="ctr"/>
+                      <a:endParaRPr lang="it-IT">
+                        <a:latin typeface="Avenir Next LT Pro" panose="020B0504020202020204" pitchFamily="34" charset="0"/>
+                      </a:endParaRPr>
+                    </a:p>
+                  </a:txBody>
+                  <a:tcPr>
+                    <a:lnL w="12700" cap="flat" cmpd="sng" algn="ctr">
+                      <a:solidFill>
+                        <a:schemeClr val="tx1"/>
+                      </a:solidFill>
+                      <a:prstDash val="solid"/>
+                      <a:round/>
+                      <a:headEnd type="none" w="med" len="med"/>
+                      <a:tailEnd type="none" w="med" len="med"/>
+                    </a:lnL>
+                  </a:tcPr>
+                </a:tc>
+                <a:extLst>
+                  <a:ext uri="{0D108BD9-81ED-4DB2-BD59-A6C34878D82A}">
+                    <a16:rowId xmlns:a16="http://schemas.microsoft.com/office/drawing/2014/main" val="2466824742"/>
+                  </a:ext>
+                </a:extLst>
+              </a:tr>
+            </a:tbl>
+          </a:graphicData>
+        </a:graphic>
+      </p:graphicFrame>
+      <p:sp>
+        <p:nvSpPr>
+          <p:cNvPr id="6" name="CasellaDiTesto 5">
+            <a:extLst>
+              <a:ext uri="{FF2B5EF4-FFF2-40B4-BE49-F238E27FC236}">
+                <a16:creationId xmlns:a16="http://schemas.microsoft.com/office/drawing/2014/main" id="{BC619C78-40E2-4630-9699-7D2EFDB53A63}"/>
+              </a:ext>
+            </a:extLst>
+          </p:cNvPr>
+          <p:cNvSpPr txBox="1"/>
+          <p:nvPr/>
+        </p:nvSpPr>
+        <p:spPr>
+          <a:xfrm>
+            <a:off x="769650" y="2294071"/>
+            <a:ext cx="1799112" cy="461665"/>
+          </a:xfrm>
+          <a:prstGeom prst="rect">
+            <a:avLst/>
+          </a:prstGeom>
+          <a:noFill/>
+        </p:spPr>
+        <p:txBody>
+          <a:bodyPr wrap="square" rtlCol="0" anchor="ctr">
+            <a:spAutoFit/>
+          </a:bodyPr>
+          <a:lstStyle/>
+          <a:p>
+            <a:pPr algn="ctr"/>
+            <a:r>
+              <a:rPr lang="it-IT" sz="2400" b="1">
+                <a:solidFill>
+                  <a:schemeClr val="accent4">
+                    <a:lumMod val="60000"/>
+                    <a:lumOff val="40000"/>
+                  </a:schemeClr>
+                </a:solidFill>
+              </a:rPr>
+              <a:t>Accuracy</a:t>
+            </a:r>
+          </a:p>
+        </p:txBody>
+      </p:sp>
+      <p:graphicFrame>
+        <p:nvGraphicFramePr>
+          <p:cNvPr id="8" name="Tabella 10">
+            <a:extLst>
+              <a:ext uri="{FF2B5EF4-FFF2-40B4-BE49-F238E27FC236}">
+                <a16:creationId xmlns:a16="http://schemas.microsoft.com/office/drawing/2014/main" id="{E4AFDD1F-C4B0-4DC3-8B0A-AB22D5DC190A}"/>
+              </a:ext>
+            </a:extLst>
+          </p:cNvPr>
+          <p:cNvGraphicFramePr>
+            <a:graphicFrameLocks noGrp="1"/>
+          </p:cNvGraphicFramePr>
+          <p:nvPr>
+            <p:extLst>
+              <p:ext uri="{D42A27DB-BD31-4B8C-83A1-F6EECF244321}">
+                <p14:modId xmlns:p14="http://schemas.microsoft.com/office/powerpoint/2010/main" val="817743733"/>
+              </p:ext>
+            </p:extLst>
+          </p:nvPr>
+        </p:nvGraphicFramePr>
+        <p:xfrm>
+          <a:off x="694061" y="4474134"/>
+          <a:ext cx="10551283" cy="1844040"/>
+        </p:xfrm>
+        <a:graphic>
+          <a:graphicData uri="http://schemas.openxmlformats.org/drawingml/2006/table">
+            <a:tbl>
+              <a:tblPr firstRow="1" bandRow="1">
+                <a:tableStyleId>{3B4B98B0-60AC-42C2-AFA5-B58CD77FA1E5}</a:tableStyleId>
+              </a:tblPr>
+              <a:tblGrid>
+                <a:gridCol w="1957828">
+                  <a:extLst>
+                    <a:ext uri="{9D8B030D-6E8A-4147-A177-3AD203B41FA5}">
+                      <a16:colId xmlns:a16="http://schemas.microsoft.com/office/drawing/2014/main" val="396372187"/>
+                    </a:ext>
+                  </a:extLst>
+                </a:gridCol>
+                <a:gridCol w="1306286">
+                  <a:extLst>
+                    <a:ext uri="{9D8B030D-6E8A-4147-A177-3AD203B41FA5}">
+                      <a16:colId xmlns:a16="http://schemas.microsoft.com/office/drawing/2014/main" val="1229565216"/>
+                    </a:ext>
+                  </a:extLst>
+                </a:gridCol>
+                <a:gridCol w="1240971">
+                  <a:extLst>
+                    <a:ext uri="{9D8B030D-6E8A-4147-A177-3AD203B41FA5}">
+                      <a16:colId xmlns:a16="http://schemas.microsoft.com/office/drawing/2014/main" val="3000570086"/>
+                    </a:ext>
+                  </a:extLst>
+                </a:gridCol>
+                <a:gridCol w="1561606">
+                  <a:extLst>
+                    <a:ext uri="{9D8B030D-6E8A-4147-A177-3AD203B41FA5}">
+                      <a16:colId xmlns:a16="http://schemas.microsoft.com/office/drawing/2014/main" val="2527479792"/>
+                    </a:ext>
+                  </a:extLst>
+                </a:gridCol>
+                <a:gridCol w="1711707">
+                  <a:extLst>
+                    <a:ext uri="{9D8B030D-6E8A-4147-A177-3AD203B41FA5}">
+                      <a16:colId xmlns:a16="http://schemas.microsoft.com/office/drawing/2014/main" val="1832342877"/>
+                    </a:ext>
+                  </a:extLst>
+                </a:gridCol>
+                <a:gridCol w="1442852">
+                  <a:extLst>
+                    <a:ext uri="{9D8B030D-6E8A-4147-A177-3AD203B41FA5}">
+                      <a16:colId xmlns:a16="http://schemas.microsoft.com/office/drawing/2014/main" val="455619855"/>
+                    </a:ext>
+                  </a:extLst>
+                </a:gridCol>
+                <a:gridCol w="1330033">
+                  <a:extLst>
+                    <a:ext uri="{9D8B030D-6E8A-4147-A177-3AD203B41FA5}">
+                      <a16:colId xmlns:a16="http://schemas.microsoft.com/office/drawing/2014/main" val="842104205"/>
+                    </a:ext>
+                  </a:extLst>
+                </a:gridCol>
+              </a:tblGrid>
+              <a:tr h="357766">
+                <a:tc>
+                  <a:txBody>
+                    <a:bodyPr/>
+                    <a:lstStyle/>
+                    <a:p>
+                      <a:endParaRPr lang="it-IT">
+                        <a:solidFill>
+                          <a:schemeClr val="accent2"/>
+                        </a:solidFill>
+                      </a:endParaRPr>
+                    </a:p>
+                  </a:txBody>
+                  <a:tcPr>
+                    <a:solidFill>
+                      <a:schemeClr val="accent1"/>
+                    </a:solidFill>
+                  </a:tcPr>
+                </a:tc>
+                <a:tc gridSpan="2">
+                  <a:txBody>
+                    <a:bodyPr/>
+                    <a:lstStyle/>
+                    <a:p>
+                      <a:pPr algn="ctr"/>
+                      <a:r>
+                        <a:rPr lang="it-IT"/>
+                        <a:t>Numerical</a:t>
+                      </a:r>
+                    </a:p>
+                  </a:txBody>
+                  <a:tcPr/>
+                </a:tc>
+                <a:tc hMerge="1">
+                  <a:txBody>
+                    <a:bodyPr/>
+                    <a:lstStyle/>
+                    <a:p>
+                      <a:endParaRPr lang="it-IT"/>
+                    </a:p>
+                  </a:txBody>
+                  <a:tcPr/>
+                </a:tc>
+                <a:tc>
+                  <a:txBody>
+                    <a:bodyPr/>
+                    <a:lstStyle/>
+                    <a:p>
+                      <a:pPr algn="ctr"/>
+                      <a:r>
+                        <a:rPr lang="it-IT"/>
+                        <a:t>All Features</a:t>
+                      </a:r>
+                    </a:p>
+                  </a:txBody>
+                  <a:tcPr/>
+                </a:tc>
+                <a:tc>
+                  <a:txBody>
+                    <a:bodyPr/>
+                    <a:lstStyle/>
+                    <a:p>
+                      <a:pPr algn="ctr"/>
+                      <a:r>
+                        <a:rPr lang="it-IT"/>
+                        <a:t>Categorical</a:t>
+                      </a:r>
+                    </a:p>
+                  </a:txBody>
+                  <a:tcPr/>
+                </a:tc>
+                <a:tc gridSpan="2">
+                  <a:txBody>
+                    <a:bodyPr/>
+                    <a:lstStyle/>
+                    <a:p>
+                      <a:pPr algn="ctr"/>
+                      <a:r>
+                        <a:rPr lang="it-IT"/>
+                        <a:t>Mix</a:t>
+                      </a:r>
+                    </a:p>
+                  </a:txBody>
+                  <a:tcPr/>
+                </a:tc>
+                <a:tc hMerge="1">
+                  <a:txBody>
+                    <a:bodyPr/>
+                    <a:lstStyle/>
+                    <a:p>
+                      <a:pPr algn="ctr"/>
+                      <a:endParaRPr lang="it-IT"/>
+                    </a:p>
+                  </a:txBody>
+                  <a:tcPr/>
+                </a:tc>
+                <a:extLst>
+                  <a:ext uri="{0D108BD9-81ED-4DB2-BD59-A6C34878D82A}">
+                    <a16:rowId xmlns:a16="http://schemas.microsoft.com/office/drawing/2014/main" val="464026787"/>
+                  </a:ext>
+                </a:extLst>
+              </a:tr>
+              <a:tr h="359229">
+                <a:tc>
+                  <a:txBody>
+                    <a:bodyPr/>
+                    <a:lstStyle/>
+                    <a:p>
+                      <a:endParaRPr lang="it-IT">
+                        <a:solidFill>
+                          <a:schemeClr val="accent2"/>
+                        </a:solidFill>
+                      </a:endParaRPr>
+                    </a:p>
+                  </a:txBody>
+                  <a:tcPr>
+                    <a:lnB w="12700" cap="flat" cmpd="sng" algn="ctr">
+                      <a:solidFill>
+                        <a:schemeClr val="tx1"/>
+                      </a:solidFill>
+                      <a:prstDash val="solid"/>
+                      <a:round/>
+                      <a:headEnd type="none" w="med" len="med"/>
+                      <a:tailEnd type="none" w="med" len="med"/>
+                    </a:lnB>
+                    <a:solidFill>
+                      <a:schemeClr val="accent1"/>
+                    </a:solidFill>
+                  </a:tcPr>
+                </a:tc>
+                <a:tc>
+                  <a:txBody>
+                    <a:bodyPr/>
+                    <a:lstStyle/>
+                    <a:p>
+                      <a:pPr algn="ctr">
+                        <a:lnSpc>
+                          <a:spcPct val="150000"/>
+                        </a:lnSpc>
+                      </a:pPr>
+                      <a:r>
+                        <a:rPr lang="it-IT" sz="1100" u="sng">
+                          <a:latin typeface="Bahnschrift SemiBold SemiConden" panose="020B0502040204020203" pitchFamily="34" charset="0"/>
+                        </a:rPr>
+                        <a:t>with standardization</a:t>
+                      </a:r>
+                    </a:p>
+                  </a:txBody>
+                  <a:tcPr>
+                    <a:lnR w="12700" cap="flat" cmpd="sng" algn="ctr">
+                      <a:solidFill>
+                        <a:schemeClr val="tx1"/>
+                      </a:solidFill>
+                      <a:prstDash val="solid"/>
+                      <a:round/>
+                      <a:headEnd type="none" w="med" len="med"/>
+                      <a:tailEnd type="none" w="med" len="med"/>
+                    </a:lnR>
+                    <a:lnB w="12700" cap="flat" cmpd="sng" algn="ctr">
+                      <a:solidFill>
+                        <a:schemeClr val="tx1"/>
+                      </a:solidFill>
+                      <a:prstDash val="solid"/>
+                      <a:round/>
+                      <a:headEnd type="none" w="med" len="med"/>
+                      <a:tailEnd type="none" w="med" len="med"/>
+                    </a:lnB>
+                  </a:tcPr>
+                </a:tc>
+                <a:tc>
+                  <a:txBody>
+                    <a:bodyPr/>
+                    <a:lstStyle/>
+                    <a:p>
+                      <a:pPr algn="ctr">
+                        <a:lnSpc>
+                          <a:spcPct val="150000"/>
+                        </a:lnSpc>
+                      </a:pPr>
+                      <a:r>
+                        <a:rPr lang="it-IT" sz="1100" u="sng">
+                          <a:latin typeface="Bahnschrift SemiBold SemiConden" panose="020B0502040204020203" pitchFamily="34" charset="0"/>
+                        </a:rPr>
+                        <a:t>w/out standardize</a:t>
+                      </a:r>
+                    </a:p>
+                  </a:txBody>
+                  <a:tcPr>
+                    <a:lnL w="12700" cap="flat" cmpd="sng" algn="ctr">
+                      <a:solidFill>
+                        <a:schemeClr val="tx1"/>
+                      </a:solidFill>
+                      <a:prstDash val="solid"/>
+                      <a:round/>
+                      <a:headEnd type="none" w="med" len="med"/>
+                      <a:tailEnd type="none" w="med" len="med"/>
+                    </a:lnL>
+                    <a:lnB w="12700" cap="flat" cmpd="sng" algn="ctr">
+                      <a:solidFill>
+                        <a:schemeClr val="tx1"/>
+                      </a:solidFill>
+                      <a:prstDash val="solid"/>
+                      <a:round/>
+                      <a:headEnd type="none" w="med" len="med"/>
+                      <a:tailEnd type="none" w="med" len="med"/>
+                    </a:lnB>
+                  </a:tcPr>
+                </a:tc>
+                <a:tc>
+                  <a:txBody>
+                    <a:bodyPr/>
+                    <a:lstStyle/>
+                    <a:p>
+                      <a:endParaRPr lang="it-IT"/>
+                    </a:p>
+                  </a:txBody>
+                  <a:tcPr>
+                    <a:lnB w="12700" cap="flat" cmpd="sng" algn="ctr">
+                      <a:solidFill>
+                        <a:schemeClr val="tx1"/>
+                      </a:solidFill>
+                      <a:prstDash val="solid"/>
+                      <a:round/>
+                      <a:headEnd type="none" w="med" len="med"/>
+                      <a:tailEnd type="none" w="med" len="med"/>
+                    </a:lnB>
+                    <a:solidFill>
+                      <a:schemeClr val="bg1"/>
+                    </a:solidFill>
+                  </a:tcPr>
+                </a:tc>
+                <a:tc>
+                  <a:txBody>
+                    <a:bodyPr/>
+                    <a:lstStyle/>
+                    <a:p>
+                      <a:endParaRPr lang="it-IT"/>
+                    </a:p>
+                  </a:txBody>
+                  <a:tcPr>
+                    <a:lnB w="12700" cap="flat" cmpd="sng" algn="ctr">
+                      <a:solidFill>
+                        <a:schemeClr val="tx1"/>
+                      </a:solidFill>
+                      <a:prstDash val="solid"/>
+                      <a:round/>
+                      <a:headEnd type="none" w="med" len="med"/>
+                      <a:tailEnd type="none" w="med" len="med"/>
+                    </a:lnB>
+                    <a:solidFill>
+                      <a:schemeClr val="bg1">
+                        <a:alpha val="20000"/>
+                      </a:schemeClr>
+                    </a:solidFill>
+                  </a:tcPr>
+                </a:tc>
+                <a:tc>
+                  <a:txBody>
+                    <a:bodyPr/>
+                    <a:lstStyle/>
+                    <a:p>
+                      <a:pPr algn="ctr">
+                        <a:lnSpc>
+                          <a:spcPct val="150000"/>
+                        </a:lnSpc>
+                      </a:pPr>
+                      <a:r>
+                        <a:rPr lang="it-IT" sz="1100" u="sng">
+                          <a:latin typeface="Bahnschrift SemiBold SemiConden" panose="020B0502040204020203" pitchFamily="34" charset="0"/>
+                        </a:rPr>
+                        <a:t>with standardization</a:t>
+                      </a:r>
+                    </a:p>
+                  </a:txBody>
+                  <a:tcPr>
+                    <a:lnR w="12700" cap="flat" cmpd="sng" algn="ctr">
+                      <a:solidFill>
+                        <a:schemeClr val="tx1"/>
+                      </a:solidFill>
+                      <a:prstDash val="solid"/>
+                      <a:round/>
+                      <a:headEnd type="none" w="med" len="med"/>
+                      <a:tailEnd type="none" w="med" len="med"/>
+                    </a:lnR>
+                    <a:lnB w="12700" cap="flat" cmpd="sng" algn="ctr">
+                      <a:solidFill>
+                        <a:schemeClr val="tx1"/>
+                      </a:solidFill>
+                      <a:prstDash val="solid"/>
+                      <a:round/>
+                      <a:headEnd type="none" w="med" len="med"/>
+                      <a:tailEnd type="none" w="med" len="med"/>
+                    </a:lnB>
+                  </a:tcPr>
+                </a:tc>
+                <a:tc>
+                  <a:txBody>
+                    <a:bodyPr/>
+                    <a:lstStyle/>
+                    <a:p>
+                      <a:pPr algn="ctr">
+                        <a:lnSpc>
+                          <a:spcPct val="150000"/>
+                        </a:lnSpc>
+                      </a:pPr>
+                      <a:r>
+                        <a:rPr lang="it-IT" sz="1100" u="sng">
+                          <a:latin typeface="Bahnschrift SemiBold SemiConden" panose="020B0502040204020203" pitchFamily="34" charset="0"/>
+                        </a:rPr>
+                        <a:t>w/out standardize</a:t>
+                      </a:r>
+                    </a:p>
+                  </a:txBody>
+                  <a:tcPr>
+                    <a:lnL w="12700" cap="flat" cmpd="sng" algn="ctr">
+                      <a:solidFill>
+                        <a:schemeClr val="tx1"/>
+                      </a:solidFill>
+                      <a:prstDash val="solid"/>
+                      <a:round/>
+                      <a:headEnd type="none" w="med" len="med"/>
+                      <a:tailEnd type="none" w="med" len="med"/>
+                    </a:lnL>
+                    <a:lnB w="12700" cap="flat" cmpd="sng" algn="ctr">
+                      <a:solidFill>
+                        <a:schemeClr val="tx1"/>
+                      </a:solidFill>
+                      <a:prstDash val="solid"/>
+                      <a:round/>
+                      <a:headEnd type="none" w="med" len="med"/>
+                      <a:tailEnd type="none" w="med" len="med"/>
+                    </a:lnB>
+                  </a:tcPr>
+                </a:tc>
+                <a:extLst>
+                  <a:ext uri="{0D108BD9-81ED-4DB2-BD59-A6C34878D82A}">
+                    <a16:rowId xmlns:a16="http://schemas.microsoft.com/office/drawing/2014/main" val="1365004327"/>
+                  </a:ext>
+                </a:extLst>
+              </a:tr>
+              <a:tr h="370840">
+                <a:tc>
+                  <a:txBody>
+                    <a:bodyPr/>
+                    <a:lstStyle/>
+                    <a:p>
+                      <a:r>
+                        <a:rPr lang="it-IT">
+                          <a:latin typeface="Bahnschrift SemiBold SemiConden" panose="020B0502040204020203" pitchFamily="34" charset="0"/>
+                        </a:rPr>
+                        <a:t>Logistic Regression</a:t>
+                      </a:r>
+                    </a:p>
+                  </a:txBody>
+                  <a:tcPr>
+                    <a:lnR w="12700" cap="flat" cmpd="sng" algn="ctr">
+                      <a:solidFill>
+                        <a:schemeClr val="tx1"/>
+                      </a:solidFill>
+                      <a:prstDash val="solid"/>
+                      <a:round/>
+                      <a:headEnd type="none" w="med" len="med"/>
+                      <a:tailEnd type="none" w="med" len="med"/>
+                    </a:lnR>
+                    <a:lnT w="12700" cap="flat" cmpd="sng" algn="ctr">
+                      <a:solidFill>
+                        <a:schemeClr val="tx1"/>
+                      </a:solidFill>
+                      <a:prstDash val="solid"/>
+                      <a:round/>
+                      <a:headEnd type="none" w="med" len="med"/>
+                      <a:tailEnd type="none" w="med" len="med"/>
+                    </a:lnT>
+                  </a:tcPr>
+                </a:tc>
+                <a:tc>
+                  <a:txBody>
+                    <a:bodyPr/>
+                    <a:lstStyle/>
+                    <a:p>
+                      <a:pPr algn="ctr"/>
+                      <a:r>
+                        <a:rPr lang="it-IT" sz="1800" b="0" i="0" kern="1200">
+                          <a:solidFill>
+                            <a:schemeClr val="tx1"/>
+                          </a:solidFill>
+                          <a:effectLst/>
+                          <a:latin typeface="Avenir Next LT Pro" panose="020B0504020202020204" pitchFamily="34" charset="0"/>
+                          <a:ea typeface="+mn-ea"/>
+                          <a:cs typeface="+mn-cs"/>
+                        </a:rPr>
+                        <a:t>0.832</a:t>
+                      </a:r>
+                      <a:endParaRPr lang="it-IT">
+                        <a:latin typeface="Avenir Next LT Pro" panose="020B0504020202020204" pitchFamily="34" charset="0"/>
+                      </a:endParaRPr>
+                    </a:p>
+                  </a:txBody>
+                  <a:tcPr>
+                    <a:lnL w="12700" cap="flat" cmpd="sng" algn="ctr">
+                      <a:solidFill>
+                        <a:schemeClr val="tx1"/>
+                      </a:solidFill>
+                      <a:prstDash val="solid"/>
+                      <a:round/>
+                      <a:headEnd type="none" w="med" len="med"/>
+                      <a:tailEnd type="none" w="med" len="med"/>
+                    </a:lnL>
+                    <a:lnR w="12700" cap="flat" cmpd="sng" algn="ctr">
+                      <a:solidFill>
+                        <a:schemeClr val="tx1"/>
+                      </a:solidFill>
+                      <a:prstDash val="solid"/>
+                      <a:round/>
+                      <a:headEnd type="none" w="med" len="med"/>
+                      <a:tailEnd type="none" w="med" len="med"/>
+                    </a:lnR>
+                    <a:lnT w="12700" cap="flat" cmpd="sng" algn="ctr">
+                      <a:solidFill>
+                        <a:schemeClr val="tx1"/>
+                      </a:solidFill>
+                      <a:prstDash val="solid"/>
+                      <a:round/>
+                      <a:headEnd type="none" w="med" len="med"/>
+                      <a:tailEnd type="none" w="med" len="med"/>
+                    </a:lnT>
+                  </a:tcPr>
+                </a:tc>
+                <a:tc>
+                  <a:txBody>
+                    <a:bodyPr/>
+                    <a:lstStyle/>
+                    <a:p>
+                      <a:pPr algn="ctr"/>
+                      <a:r>
+                        <a:rPr lang="it-IT" b="1">
+                          <a:latin typeface="Avenir Next LT Pro" panose="020B0504020202020204" pitchFamily="34" charset="0"/>
+                        </a:rPr>
+                        <a:t>0.834</a:t>
+                      </a:r>
+                    </a:p>
+                  </a:txBody>
+                  <a:tcPr>
+                    <a:lnL w="12700" cap="flat" cmpd="sng" algn="ctr">
+                      <a:solidFill>
+                        <a:schemeClr val="tx1"/>
+                      </a:solidFill>
+                      <a:prstDash val="solid"/>
+                      <a:round/>
+                      <a:headEnd type="none" w="med" len="med"/>
+                      <a:tailEnd type="none" w="med" len="med"/>
+                    </a:lnL>
+                    <a:lnR w="12700" cap="flat" cmpd="sng" algn="ctr">
+                      <a:solidFill>
+                        <a:schemeClr val="tx1"/>
+                      </a:solidFill>
+                      <a:prstDash val="solid"/>
+                      <a:round/>
+                      <a:headEnd type="none" w="med" len="med"/>
+                      <a:tailEnd type="none" w="med" len="med"/>
+                    </a:lnR>
+                    <a:lnT w="12700" cap="flat" cmpd="sng" algn="ctr">
+                      <a:solidFill>
+                        <a:schemeClr val="tx1"/>
+                      </a:solidFill>
+                      <a:prstDash val="solid"/>
+                      <a:round/>
+                      <a:headEnd type="none" w="med" len="med"/>
+                      <a:tailEnd type="none" w="med" len="med"/>
+                    </a:lnT>
+                  </a:tcPr>
+                </a:tc>
+                <a:tc>
+                  <a:txBody>
+                    <a:bodyPr/>
+                    <a:lstStyle/>
+                    <a:p>
+                      <a:pPr algn="ctr"/>
+                      <a:endParaRPr lang="it-IT"/>
+                    </a:p>
+                  </a:txBody>
+                  <a:tcPr>
+                    <a:lnL w="12700" cap="flat" cmpd="sng" algn="ctr">
+                      <a:solidFill>
+                        <a:schemeClr val="tx1"/>
+                      </a:solidFill>
+                      <a:prstDash val="solid"/>
+                      <a:round/>
+                      <a:headEnd type="none" w="med" len="med"/>
+                      <a:tailEnd type="none" w="med" len="med"/>
+                    </a:lnL>
+                    <a:lnR w="12700" cap="flat" cmpd="sng" algn="ctr">
+                      <a:solidFill>
+                        <a:schemeClr val="tx1"/>
+                      </a:solidFill>
+                      <a:prstDash val="solid"/>
+                      <a:round/>
+                      <a:headEnd type="none" w="med" len="med"/>
+                      <a:tailEnd type="none" w="med" len="med"/>
+                    </a:lnR>
+                    <a:lnT w="12700" cap="flat" cmpd="sng" algn="ctr">
+                      <a:solidFill>
+                        <a:schemeClr val="tx1"/>
+                      </a:solidFill>
+                      <a:prstDash val="solid"/>
+                      <a:round/>
+                      <a:headEnd type="none" w="med" len="med"/>
+                      <a:tailEnd type="none" w="med" len="med"/>
+                    </a:lnT>
+                  </a:tcPr>
+                </a:tc>
+                <a:tc>
+                  <a:txBody>
+                    <a:bodyPr/>
+                    <a:lstStyle/>
+                    <a:p>
+                      <a:pPr algn="ctr"/>
+                      <a:r>
+                        <a:rPr lang="it-IT" sz="1800" b="0" i="0" kern="1200">
+                          <a:solidFill>
+                            <a:schemeClr val="tx1"/>
+                          </a:solidFill>
+                          <a:effectLst/>
+                          <a:latin typeface="Avenir Next LT Pro" panose="020B0504020202020204" pitchFamily="34" charset="0"/>
+                          <a:ea typeface="+mn-ea"/>
+                          <a:cs typeface="+mn-cs"/>
+                        </a:rPr>
+                        <a:t>0.800</a:t>
+                      </a:r>
+                      <a:endParaRPr lang="it-IT">
+                        <a:latin typeface="Avenir Next LT Pro" panose="020B0504020202020204" pitchFamily="34" charset="0"/>
+                      </a:endParaRPr>
+                    </a:p>
+                  </a:txBody>
+                  <a:tcPr>
+                    <a:lnL w="12700" cap="flat" cmpd="sng" algn="ctr">
+                      <a:solidFill>
+                        <a:schemeClr val="tx1"/>
+                      </a:solidFill>
+                      <a:prstDash val="solid"/>
+                      <a:round/>
+                      <a:headEnd type="none" w="med" len="med"/>
+                      <a:tailEnd type="none" w="med" len="med"/>
+                    </a:lnL>
+                    <a:lnR w="12700" cap="flat" cmpd="sng" algn="ctr">
+                      <a:solidFill>
+                        <a:schemeClr val="tx1"/>
+                      </a:solidFill>
+                      <a:prstDash val="solid"/>
+                      <a:round/>
+                      <a:headEnd type="none" w="med" len="med"/>
+                      <a:tailEnd type="none" w="med" len="med"/>
+                    </a:lnR>
+                    <a:lnT w="12700" cap="flat" cmpd="sng" algn="ctr">
+                      <a:solidFill>
+                        <a:schemeClr val="tx1"/>
+                      </a:solidFill>
+                      <a:prstDash val="solid"/>
+                      <a:round/>
+                      <a:headEnd type="none" w="med" len="med"/>
+                      <a:tailEnd type="none" w="med" len="med"/>
+                    </a:lnT>
+                  </a:tcPr>
+                </a:tc>
+                <a:tc>
+                  <a:txBody>
+                    <a:bodyPr/>
+                    <a:lstStyle/>
+                    <a:p>
+                      <a:pPr algn="ctr"/>
+                      <a:r>
+                        <a:rPr lang="it-IT">
+                          <a:latin typeface="Avenir Next LT Pro" panose="020B0504020202020204" pitchFamily="34" charset="0"/>
+                        </a:rPr>
+                        <a:t>0.824</a:t>
+                      </a:r>
+                    </a:p>
+                  </a:txBody>
+                  <a:tcPr>
+                    <a:lnL w="12700" cap="flat" cmpd="sng" algn="ctr">
+                      <a:solidFill>
+                        <a:schemeClr val="tx1"/>
+                      </a:solidFill>
+                      <a:prstDash val="solid"/>
+                      <a:round/>
+                      <a:headEnd type="none" w="med" len="med"/>
+                      <a:tailEnd type="none" w="med" len="med"/>
+                    </a:lnL>
+                    <a:lnR w="12700" cap="flat" cmpd="sng" algn="ctr">
+                      <a:solidFill>
+                        <a:schemeClr val="tx1"/>
+                      </a:solidFill>
+                      <a:prstDash val="solid"/>
+                      <a:round/>
+                      <a:headEnd type="none" w="med" len="med"/>
+                      <a:tailEnd type="none" w="med" len="med"/>
+                    </a:lnR>
+                    <a:lnT w="12700" cap="flat" cmpd="sng" algn="ctr">
+                      <a:solidFill>
+                        <a:schemeClr val="tx1"/>
+                      </a:solidFill>
+                      <a:prstDash val="solid"/>
+                      <a:round/>
+                      <a:headEnd type="none" w="med" len="med"/>
+                      <a:tailEnd type="none" w="med" len="med"/>
+                    </a:lnT>
+                  </a:tcPr>
+                </a:tc>
+                <a:tc>
+                  <a:txBody>
+                    <a:bodyPr/>
+                    <a:lstStyle/>
+                    <a:p>
+                      <a:pPr algn="ctr"/>
+                      <a:r>
+                        <a:rPr lang="it-IT">
+                          <a:latin typeface="Avenir Next LT Pro" panose="020B0504020202020204" pitchFamily="34" charset="0"/>
+                        </a:rPr>
+                        <a:t>0.824</a:t>
+                      </a:r>
+                    </a:p>
+                  </a:txBody>
+                  <a:tcPr>
+                    <a:lnL w="12700" cap="flat" cmpd="sng" algn="ctr">
+                      <a:solidFill>
+                        <a:schemeClr val="tx1"/>
+                      </a:solidFill>
+                      <a:prstDash val="solid"/>
+                      <a:round/>
+                      <a:headEnd type="none" w="med" len="med"/>
+                      <a:tailEnd type="none" w="med" len="med"/>
+                    </a:lnL>
+                    <a:lnT w="12700" cap="flat" cmpd="sng" algn="ctr">
+                      <a:solidFill>
+                        <a:schemeClr val="tx1"/>
+                      </a:solidFill>
+                      <a:prstDash val="solid"/>
+                      <a:round/>
+                      <a:headEnd type="none" w="med" len="med"/>
+                      <a:tailEnd type="none" w="med" len="med"/>
+                    </a:lnT>
+                  </a:tcPr>
+                </a:tc>
+                <a:extLst>
+                  <a:ext uri="{0D108BD9-81ED-4DB2-BD59-A6C34878D82A}">
+                    <a16:rowId xmlns:a16="http://schemas.microsoft.com/office/drawing/2014/main" val="2532579262"/>
+                  </a:ext>
+                </a:extLst>
+              </a:tr>
+              <a:tr h="370840">
+                <a:tc>
+                  <a:txBody>
+                    <a:bodyPr/>
+                    <a:lstStyle/>
+                    <a:p>
+                      <a:r>
+                        <a:rPr lang="it-IT">
+                          <a:latin typeface="Bahnschrift SemiBold SemiConden" panose="020B0502040204020203" pitchFamily="34" charset="0"/>
+                        </a:rPr>
+                        <a:t>Decision Tree</a:t>
+                      </a:r>
+                    </a:p>
+                  </a:txBody>
+                  <a:tcPr>
+                    <a:lnR w="12700" cap="flat" cmpd="sng" algn="ctr">
+                      <a:solidFill>
+                        <a:schemeClr val="tx1"/>
+                      </a:solidFill>
+                      <a:prstDash val="solid"/>
+                      <a:round/>
+                      <a:headEnd type="none" w="med" len="med"/>
+                      <a:tailEnd type="none" w="med" len="med"/>
+                    </a:lnR>
+                  </a:tcPr>
+                </a:tc>
+                <a:tc>
+                  <a:txBody>
+                    <a:bodyPr/>
+                    <a:lstStyle/>
+                    <a:p>
+                      <a:pPr marL="0" marR="0" lvl="0" indent="0" algn="ctr" defTabSz="457200" rtl="0" eaLnBrk="1" fontAlgn="auto" latinLnBrk="0" hangingPunct="1">
+                        <a:lnSpc>
+                          <a:spcPct val="100000"/>
+                        </a:lnSpc>
+                        <a:spcBef>
+                          <a:spcPts val="0"/>
+                        </a:spcBef>
+                        <a:spcAft>
+                          <a:spcPts val="0"/>
+                        </a:spcAft>
+                        <a:buClrTx/>
+                        <a:buSzTx/>
+                        <a:buFontTx/>
+                        <a:buNone/>
+                        <a:tabLst/>
+                        <a:defRPr/>
+                      </a:pPr>
+                      <a:r>
+                        <a:rPr lang="it-IT">
+                          <a:latin typeface="Avenir Next LT Pro" panose="020B0504020202020204" pitchFamily="34" charset="0"/>
+                        </a:rPr>
+                        <a:t>0.428</a:t>
+                      </a:r>
+                    </a:p>
+                  </a:txBody>
+                  <a:tcPr>
+                    <a:lnL w="12700" cap="flat" cmpd="sng" algn="ctr">
+                      <a:solidFill>
+                        <a:schemeClr val="tx1"/>
+                      </a:solidFill>
+                      <a:prstDash val="solid"/>
+                      <a:round/>
+                      <a:headEnd type="none" w="med" len="med"/>
+                      <a:tailEnd type="none" w="med" len="med"/>
+                    </a:lnL>
+                    <a:lnR w="12700" cap="flat" cmpd="sng" algn="ctr">
+                      <a:solidFill>
+                        <a:schemeClr val="tx1"/>
+                      </a:solidFill>
+                      <a:prstDash val="solid"/>
+                      <a:round/>
+                      <a:headEnd type="none" w="med" len="med"/>
+                      <a:tailEnd type="none" w="med" len="med"/>
+                    </a:lnR>
+                  </a:tcPr>
+                </a:tc>
+                <a:tc>
+                  <a:txBody>
+                    <a:bodyPr/>
+                    <a:lstStyle/>
+                    <a:p>
+                      <a:pPr algn="ctr"/>
+                      <a:r>
+                        <a:rPr lang="it-IT">
+                          <a:latin typeface="Avenir Next LT Pro" panose="020B0504020202020204" pitchFamily="34" charset="0"/>
+                        </a:rPr>
+                        <a:t>0.428</a:t>
+                      </a:r>
+                    </a:p>
+                  </a:txBody>
+                  <a:tcPr>
+                    <a:lnL w="12700" cap="flat" cmpd="sng" algn="ctr">
+                      <a:solidFill>
+                        <a:schemeClr val="tx1"/>
+                      </a:solidFill>
+                      <a:prstDash val="solid"/>
+                      <a:round/>
+                      <a:headEnd type="none" w="med" len="med"/>
+                      <a:tailEnd type="none" w="med" len="med"/>
+                    </a:lnL>
+                    <a:lnR w="12700" cap="flat" cmpd="sng" algn="ctr">
+                      <a:solidFill>
+                        <a:schemeClr val="tx1"/>
+                      </a:solidFill>
+                      <a:prstDash val="solid"/>
+                      <a:round/>
+                      <a:headEnd type="none" w="med" len="med"/>
+                      <a:tailEnd type="none" w="med" len="med"/>
+                    </a:lnR>
+                  </a:tcPr>
+                </a:tc>
+                <a:tc>
+                  <a:txBody>
+                    <a:bodyPr/>
+                    <a:lstStyle/>
+                    <a:p>
+                      <a:pPr algn="ctr"/>
+                      <a:endParaRPr lang="it-IT">
+                        <a:latin typeface="Avenir Next LT Pro" panose="020B0504020202020204" pitchFamily="34" charset="0"/>
+                      </a:endParaRPr>
+                    </a:p>
+                  </a:txBody>
+                  <a:tcPr>
+                    <a:lnL w="12700" cap="flat" cmpd="sng" algn="ctr">
+                      <a:solidFill>
+                        <a:schemeClr val="tx1"/>
+                      </a:solidFill>
+                      <a:prstDash val="solid"/>
+                      <a:round/>
+                      <a:headEnd type="none" w="med" len="med"/>
+                      <a:tailEnd type="none" w="med" len="med"/>
+                    </a:lnL>
+                    <a:lnR w="12700" cap="flat" cmpd="sng" algn="ctr">
+                      <a:solidFill>
+                        <a:schemeClr val="tx1"/>
+                      </a:solidFill>
+                      <a:prstDash val="solid"/>
+                      <a:round/>
+                      <a:headEnd type="none" w="med" len="med"/>
+                      <a:tailEnd type="none" w="med" len="med"/>
+                    </a:lnR>
+                  </a:tcPr>
+                </a:tc>
+                <a:tc>
+                  <a:txBody>
+                    <a:bodyPr/>
+                    <a:lstStyle/>
+                    <a:p>
+                      <a:pPr algn="ctr"/>
+                      <a:r>
+                        <a:rPr lang="it-IT" sz="1800" b="0" i="0" kern="1200">
+                          <a:solidFill>
+                            <a:schemeClr val="tx1"/>
+                          </a:solidFill>
+                          <a:effectLst/>
+                          <a:latin typeface="Avenir Next LT Pro" panose="020B0504020202020204" pitchFamily="34" charset="0"/>
+                          <a:ea typeface="+mn-ea"/>
+                          <a:cs typeface="+mn-cs"/>
+                        </a:rPr>
+                        <a:t>0.7074</a:t>
+                      </a:r>
+                      <a:endParaRPr lang="it-IT">
+                        <a:latin typeface="Avenir Next LT Pro" panose="020B0504020202020204" pitchFamily="34" charset="0"/>
+                      </a:endParaRPr>
+                    </a:p>
+                  </a:txBody>
+                  <a:tcPr>
+                    <a:lnL w="12700" cap="flat" cmpd="sng" algn="ctr">
+                      <a:solidFill>
+                        <a:schemeClr val="tx1"/>
+                      </a:solidFill>
+                      <a:prstDash val="solid"/>
+                      <a:round/>
+                      <a:headEnd type="none" w="med" len="med"/>
+                      <a:tailEnd type="none" w="med" len="med"/>
+                    </a:lnL>
+                    <a:lnR w="12700" cap="flat" cmpd="sng" algn="ctr">
+                      <a:solidFill>
+                        <a:schemeClr val="tx1"/>
+                      </a:solidFill>
+                      <a:prstDash val="solid"/>
+                      <a:round/>
+                      <a:headEnd type="none" w="med" len="med"/>
+                      <a:tailEnd type="none" w="med" len="med"/>
+                    </a:lnR>
+                  </a:tcPr>
+                </a:tc>
+                <a:tc>
+                  <a:txBody>
+                    <a:bodyPr/>
+                    <a:lstStyle/>
+                    <a:p>
+                      <a:pPr algn="ctr"/>
+                      <a:endParaRPr lang="it-IT">
+                        <a:latin typeface="Avenir Next LT Pro" panose="020B0504020202020204" pitchFamily="34" charset="0"/>
+                      </a:endParaRPr>
+                    </a:p>
+                  </a:txBody>
+                  <a:tcPr>
+                    <a:lnL w="12700" cap="flat" cmpd="sng" algn="ctr">
+                      <a:solidFill>
+                        <a:schemeClr val="tx1"/>
+                      </a:solidFill>
+                      <a:prstDash val="solid"/>
+                      <a:round/>
+                      <a:headEnd type="none" w="med" len="med"/>
+                      <a:tailEnd type="none" w="med" len="med"/>
+                    </a:lnL>
+                    <a:lnR w="12700" cap="flat" cmpd="sng" algn="ctr">
+                      <a:solidFill>
+                        <a:schemeClr val="tx1"/>
+                      </a:solidFill>
+                      <a:prstDash val="solid"/>
+                      <a:round/>
+                      <a:headEnd type="none" w="med" len="med"/>
+                      <a:tailEnd type="none" w="med" len="med"/>
+                    </a:lnR>
+                  </a:tcPr>
+                </a:tc>
+                <a:tc>
+                  <a:txBody>
+                    <a:bodyPr/>
+                    <a:lstStyle/>
+                    <a:p>
+                      <a:pPr algn="ctr"/>
+                      <a:endParaRPr lang="it-IT">
+                        <a:latin typeface="Avenir Next LT Pro" panose="020B0504020202020204" pitchFamily="34" charset="0"/>
+                      </a:endParaRPr>
+                    </a:p>
+                  </a:txBody>
+                  <a:tcPr>
+                    <a:lnL w="12700" cap="flat" cmpd="sng" algn="ctr">
+                      <a:solidFill>
+                        <a:schemeClr val="tx1"/>
+                      </a:solidFill>
+                      <a:prstDash val="solid"/>
+                      <a:round/>
+                      <a:headEnd type="none" w="med" len="med"/>
+                      <a:tailEnd type="none" w="med" len="med"/>
+                    </a:lnL>
+                  </a:tcPr>
+                </a:tc>
+                <a:extLst>
+                  <a:ext uri="{0D108BD9-81ED-4DB2-BD59-A6C34878D82A}">
+                    <a16:rowId xmlns:a16="http://schemas.microsoft.com/office/drawing/2014/main" val="3341464040"/>
+                  </a:ext>
+                </a:extLst>
+              </a:tr>
+              <a:tr h="370840">
+                <a:tc>
+                  <a:txBody>
+                    <a:bodyPr/>
+                    <a:lstStyle/>
+                    <a:p>
+                      <a:r>
+                        <a:rPr lang="it-IT">
+                          <a:latin typeface="Bahnschrift SemiBold SemiConden" panose="020B0502040204020203" pitchFamily="34" charset="0"/>
+                        </a:rPr>
+                        <a:t>Random Forest</a:t>
+                      </a:r>
+                    </a:p>
+                  </a:txBody>
+                  <a:tcPr>
+                    <a:lnR w="12700" cap="flat" cmpd="sng" algn="ctr">
+                      <a:solidFill>
+                        <a:schemeClr val="tx1"/>
+                      </a:solidFill>
+                      <a:prstDash val="solid"/>
+                      <a:round/>
+                      <a:headEnd type="none" w="med" len="med"/>
+                      <a:tailEnd type="none" w="med" len="med"/>
+                    </a:lnR>
+                  </a:tcPr>
+                </a:tc>
+                <a:tc>
+                  <a:txBody>
+                    <a:bodyPr/>
+                    <a:lstStyle/>
+                    <a:p>
+                      <a:pPr algn="ctr"/>
+                      <a:endParaRPr lang="it-IT">
+                        <a:latin typeface="Avenir Next LT Pro" panose="020B0504020202020204" pitchFamily="34" charset="0"/>
+                      </a:endParaRPr>
+                    </a:p>
+                  </a:txBody>
+                  <a:tcPr>
+                    <a:lnL w="12700" cap="flat" cmpd="sng" algn="ctr">
+                      <a:solidFill>
+                        <a:schemeClr val="tx1"/>
+                      </a:solidFill>
+                      <a:prstDash val="solid"/>
+                      <a:round/>
+                      <a:headEnd type="none" w="med" len="med"/>
+                      <a:tailEnd type="none" w="med" len="med"/>
+                    </a:lnL>
+                    <a:lnR w="12700" cap="flat" cmpd="sng" algn="ctr">
+                      <a:solidFill>
+                        <a:schemeClr val="tx1"/>
+                      </a:solidFill>
+                      <a:prstDash val="solid"/>
+                      <a:round/>
+                      <a:headEnd type="none" w="med" len="med"/>
+                      <a:tailEnd type="none" w="med" len="med"/>
+                    </a:lnR>
+                  </a:tcPr>
+                </a:tc>
+                <a:tc>
+                  <a:txBody>
+                    <a:bodyPr/>
+                    <a:lstStyle/>
+                    <a:p>
+                      <a:pPr algn="ctr"/>
+                      <a:endParaRPr lang="it-IT">
+                        <a:latin typeface="Avenir Next LT Pro" panose="020B0504020202020204" pitchFamily="34" charset="0"/>
+                      </a:endParaRPr>
+                    </a:p>
+                  </a:txBody>
+                  <a:tcPr>
+                    <a:lnL w="12700" cap="flat" cmpd="sng" algn="ctr">
+                      <a:solidFill>
+                        <a:schemeClr val="tx1"/>
+                      </a:solidFill>
+                      <a:prstDash val="solid"/>
+                      <a:round/>
+                      <a:headEnd type="none" w="med" len="med"/>
+                      <a:tailEnd type="none" w="med" len="med"/>
+                    </a:lnL>
+                    <a:lnR w="12700" cap="flat" cmpd="sng" algn="ctr">
+                      <a:solidFill>
+                        <a:schemeClr val="tx1"/>
+                      </a:solidFill>
+                      <a:prstDash val="solid"/>
+                      <a:round/>
+                      <a:headEnd type="none" w="med" len="med"/>
+                      <a:tailEnd type="none" w="med" len="med"/>
+                    </a:lnR>
+                  </a:tcPr>
+                </a:tc>
+                <a:tc>
+                  <a:txBody>
+                    <a:bodyPr/>
+                    <a:lstStyle/>
+                    <a:p>
+                      <a:pPr algn="ctr"/>
+                      <a:endParaRPr lang="it-IT">
+                        <a:latin typeface="Avenir Next LT Pro" panose="020B0504020202020204" pitchFamily="34" charset="0"/>
+                      </a:endParaRPr>
+                    </a:p>
+                  </a:txBody>
+                  <a:tcPr>
+                    <a:lnL w="12700" cap="flat" cmpd="sng" algn="ctr">
+                      <a:solidFill>
+                        <a:schemeClr val="tx1"/>
+                      </a:solidFill>
+                      <a:prstDash val="solid"/>
+                      <a:round/>
+                      <a:headEnd type="none" w="med" len="med"/>
+                      <a:tailEnd type="none" w="med" len="med"/>
+                    </a:lnL>
+                    <a:lnR w="12700" cap="flat" cmpd="sng" algn="ctr">
+                      <a:solidFill>
+                        <a:schemeClr val="tx1"/>
+                      </a:solidFill>
+                      <a:prstDash val="solid"/>
+                      <a:round/>
+                      <a:headEnd type="none" w="med" len="med"/>
+                      <a:tailEnd type="none" w="med" len="med"/>
+                    </a:lnR>
+                  </a:tcPr>
+                </a:tc>
+                <a:tc>
+                  <a:txBody>
+                    <a:bodyPr/>
+                    <a:lstStyle/>
+                    <a:p>
+                      <a:pPr algn="ctr"/>
+                      <a:endParaRPr lang="it-IT">
+                        <a:latin typeface="Avenir Next LT Pro" panose="020B0504020202020204" pitchFamily="34" charset="0"/>
+                      </a:endParaRPr>
+                    </a:p>
+                  </a:txBody>
+                  <a:tcPr>
+                    <a:lnL w="12700" cap="flat" cmpd="sng" algn="ctr">
+                      <a:solidFill>
+                        <a:schemeClr val="tx1"/>
+                      </a:solidFill>
+                      <a:prstDash val="solid"/>
+                      <a:round/>
+                      <a:headEnd type="none" w="med" len="med"/>
+                      <a:tailEnd type="none" w="med" len="med"/>
+                    </a:lnL>
+                    <a:lnR w="12700" cap="flat" cmpd="sng" algn="ctr">
+                      <a:solidFill>
+                        <a:schemeClr val="tx1"/>
+                      </a:solidFill>
+                      <a:prstDash val="solid"/>
+                      <a:round/>
+                      <a:headEnd type="none" w="med" len="med"/>
+                      <a:tailEnd type="none" w="med" len="med"/>
+                    </a:lnR>
+                  </a:tcPr>
+                </a:tc>
+                <a:tc>
+                  <a:txBody>
+                    <a:bodyPr/>
+                    <a:lstStyle/>
+                    <a:p>
+                      <a:pPr algn="ctr"/>
+                      <a:endParaRPr lang="it-IT">
+                        <a:latin typeface="Avenir Next LT Pro" panose="020B0504020202020204" pitchFamily="34" charset="0"/>
+                      </a:endParaRPr>
+                    </a:p>
+                  </a:txBody>
+                  <a:tcPr>
+                    <a:lnL w="12700" cap="flat" cmpd="sng" algn="ctr">
+                      <a:solidFill>
+                        <a:schemeClr val="tx1"/>
+                      </a:solidFill>
+                      <a:prstDash val="solid"/>
+                      <a:round/>
+                      <a:headEnd type="none" w="med" len="med"/>
+                      <a:tailEnd type="none" w="med" len="med"/>
+                    </a:lnL>
+                    <a:lnR w="12700" cap="flat" cmpd="sng" algn="ctr">
+                      <a:solidFill>
+                        <a:schemeClr val="tx1"/>
+                      </a:solidFill>
+                      <a:prstDash val="solid"/>
+                      <a:round/>
+                      <a:headEnd type="none" w="med" len="med"/>
+                      <a:tailEnd type="none" w="med" len="med"/>
+                    </a:lnR>
+                  </a:tcPr>
+                </a:tc>
+                <a:tc>
+                  <a:txBody>
+                    <a:bodyPr/>
+                    <a:lstStyle/>
+                    <a:p>
+                      <a:pPr algn="ctr"/>
+                      <a:endParaRPr lang="it-IT">
+                        <a:latin typeface="Avenir Next LT Pro" panose="020B0504020202020204" pitchFamily="34" charset="0"/>
+                      </a:endParaRPr>
+                    </a:p>
+                  </a:txBody>
+                  <a:tcPr>
+                    <a:lnL w="12700" cap="flat" cmpd="sng" algn="ctr">
+                      <a:solidFill>
+                        <a:schemeClr val="tx1"/>
+                      </a:solidFill>
+                      <a:prstDash val="solid"/>
+                      <a:round/>
+                      <a:headEnd type="none" w="med" len="med"/>
+                      <a:tailEnd type="none" w="med" len="med"/>
+                    </a:lnL>
+                  </a:tcPr>
+                </a:tc>
+                <a:extLst>
+                  <a:ext uri="{0D108BD9-81ED-4DB2-BD59-A6C34878D82A}">
+                    <a16:rowId xmlns:a16="http://schemas.microsoft.com/office/drawing/2014/main" val="2466824742"/>
+                  </a:ext>
+                </a:extLst>
+              </a:tr>
+            </a:tbl>
+          </a:graphicData>
+        </a:graphic>
+      </p:graphicFrame>
+      <p:sp>
+        <p:nvSpPr>
+          <p:cNvPr id="9" name="CasellaDiTesto 8">
+            <a:extLst>
+              <a:ext uri="{FF2B5EF4-FFF2-40B4-BE49-F238E27FC236}">
+                <a16:creationId xmlns:a16="http://schemas.microsoft.com/office/drawing/2014/main" id="{E5DF370F-4775-4942-A08E-47F2C147807C}"/>
+              </a:ext>
+            </a:extLst>
+          </p:cNvPr>
+          <p:cNvSpPr txBox="1"/>
+          <p:nvPr/>
+        </p:nvSpPr>
+        <p:spPr>
+          <a:xfrm>
+            <a:off x="769650" y="4594163"/>
+            <a:ext cx="1799112" cy="461665"/>
+          </a:xfrm>
+          <a:prstGeom prst="rect">
+            <a:avLst/>
+          </a:prstGeom>
+          <a:noFill/>
+        </p:spPr>
+        <p:txBody>
+          <a:bodyPr wrap="square" rtlCol="0" anchor="ctr">
+            <a:spAutoFit/>
+          </a:bodyPr>
+          <a:lstStyle/>
+          <a:p>
+            <a:pPr algn="ctr"/>
+            <a:r>
+              <a:rPr lang="it-IT" sz="2400" b="1">
+                <a:solidFill>
+                  <a:schemeClr val="accent4">
+                    <a:lumMod val="60000"/>
+                    <a:lumOff val="40000"/>
+                  </a:schemeClr>
+                </a:solidFill>
+              </a:rPr>
+              <a:t>AUC ROC</a:t>
+            </a:r>
+          </a:p>
+        </p:txBody>
+      </p:sp>
+    </p:spTree>
+    <p:extLst>
+      <p:ext uri="{BB962C8B-B14F-4D97-AF65-F5344CB8AC3E}">
+        <p14:creationId xmlns:p14="http://schemas.microsoft.com/office/powerpoint/2010/main" val="745060227"/>
+      </p:ext>
+    </p:extLst>
+  </p:cSld>
+  <p:clrMapOvr>
+    <a:masterClrMapping/>
+  </p:clrMapOvr>
+</p:sld>
+</file>
+
+<file path=ppt/slides/slide13.xml><?xml version="1.0" encoding="utf-8"?>
+<p:sld xmlns:a="http://schemas.openxmlformats.org/drawingml/2006/main" xmlns:r="http://schemas.openxmlformats.org/officeDocument/2006/relationships" xmlns:p="http://schemas.openxmlformats.org/presentationml/2006/main">
+  <p:cSld>
+    <p:spTree>
+      <p:nvGrpSpPr>
+        <p:cNvPr id="1" name=""/>
+        <p:cNvGrpSpPr/>
+        <p:nvPr/>
+      </p:nvGrpSpPr>
+      <p:grpSpPr>
+        <a:xfrm>
+          <a:off x="0" y="0"/>
+          <a:ext cx="0" cy="0"/>
+          <a:chOff x="0" y="0"/>
+          <a:chExt cx="0" cy="0"/>
+        </a:xfrm>
+      </p:grpSpPr>
+      <p:sp>
+        <p:nvSpPr>
+          <p:cNvPr id="2" name="Titolo 1">
+            <a:extLst>
+              <a:ext uri="{FF2B5EF4-FFF2-40B4-BE49-F238E27FC236}">
+                <a16:creationId xmlns:a16="http://schemas.microsoft.com/office/drawing/2014/main" id="{E792274F-2C6D-42A4-8D80-721288892FBE}"/>
+              </a:ext>
+            </a:extLst>
+          </p:cNvPr>
+          <p:cNvSpPr>
+            <a:spLocks noGrp="1"/>
+          </p:cNvSpPr>
+          <p:nvPr>
+            <p:ph type="title"/>
+          </p:nvPr>
+        </p:nvSpPr>
+        <p:spPr/>
+        <p:txBody>
+          <a:bodyPr/>
+          <a:lstStyle/>
+          <a:p>
+            <a:r>
+              <a:rPr lang="it-IT"/>
+              <a:t>		.2 - EXPERIMENTAL RESULTS</a:t>
+            </a:r>
+          </a:p>
+        </p:txBody>
+      </p:sp>
+      <p:grpSp>
+        <p:nvGrpSpPr>
+          <p:cNvPr id="3" name="Gruppo 2">
+            <a:extLst>
+              <a:ext uri="{FF2B5EF4-FFF2-40B4-BE49-F238E27FC236}">
+                <a16:creationId xmlns:a16="http://schemas.microsoft.com/office/drawing/2014/main" id="{AFE51A2F-C543-4376-96E1-9399FABF37CE}"/>
+              </a:ext>
+            </a:extLst>
+          </p:cNvPr>
+          <p:cNvGrpSpPr/>
+          <p:nvPr/>
+        </p:nvGrpSpPr>
+        <p:grpSpPr>
+          <a:xfrm>
+            <a:off x="694062" y="866145"/>
+            <a:ext cx="719101" cy="1013800"/>
+            <a:chOff x="1" y="13513"/>
+            <a:chExt cx="602970" cy="861385"/>
+          </a:xfrm>
+        </p:grpSpPr>
+        <p:sp>
+          <p:nvSpPr>
+            <p:cNvPr id="4" name="Freccia a gallone 3">
+              <a:extLst>
+                <a:ext uri="{FF2B5EF4-FFF2-40B4-BE49-F238E27FC236}">
+                  <a16:creationId xmlns:a16="http://schemas.microsoft.com/office/drawing/2014/main" id="{FBDCB5C1-82C5-4CF2-B6D8-655A84F9C352}"/>
+                </a:ext>
+              </a:extLst>
+            </p:cNvPr>
+            <p:cNvSpPr/>
+            <p:nvPr/>
+          </p:nvSpPr>
+          <p:spPr>
+            <a:xfrm rot="5400000">
+              <a:off x="-129207" y="142721"/>
+              <a:ext cx="861385" cy="602970"/>
+            </a:xfrm>
+            <a:prstGeom prst="chevron">
+              <a:avLst/>
+            </a:prstGeom>
+            <a:solidFill>
+              <a:schemeClr val="bg1"/>
+            </a:solidFill>
+          </p:spPr>
+          <p:style>
+            <a:lnRef idx="2">
+              <a:schemeClr val="accent1">
+                <a:hueOff val="0"/>
+                <a:satOff val="0"/>
+                <a:lumOff val="0"/>
+                <a:alphaOff val="0"/>
+              </a:schemeClr>
+            </a:lnRef>
+            <a:fillRef idx="1">
+              <a:schemeClr val="accent1">
+                <a:hueOff val="0"/>
+                <a:satOff val="0"/>
+                <a:lumOff val="0"/>
+                <a:alphaOff val="0"/>
+              </a:schemeClr>
+            </a:fillRef>
+            <a:effectRef idx="0">
+              <a:schemeClr val="accent1">
+                <a:hueOff val="0"/>
+                <a:satOff val="0"/>
+                <a:lumOff val="0"/>
+                <a:alphaOff val="0"/>
+              </a:schemeClr>
+            </a:effectRef>
+            <a:fontRef idx="minor">
+              <a:schemeClr val="lt1"/>
+            </a:fontRef>
+          </p:style>
+        </p:sp>
+        <p:sp>
+          <p:nvSpPr>
+            <p:cNvPr id="5" name="Freccia a gallone 4">
+              <a:extLst>
+                <a:ext uri="{FF2B5EF4-FFF2-40B4-BE49-F238E27FC236}">
+                  <a16:creationId xmlns:a16="http://schemas.microsoft.com/office/drawing/2014/main" id="{326F6C87-E915-4BA4-8FED-405C80921F87}"/>
+                </a:ext>
+              </a:extLst>
+            </p:cNvPr>
+            <p:cNvSpPr txBox="1"/>
+            <p:nvPr/>
+          </p:nvSpPr>
+          <p:spPr>
+            <a:xfrm>
+              <a:off x="1" y="401002"/>
+              <a:ext cx="602970" cy="258415"/>
+            </a:xfrm>
+            <a:prstGeom prst="rect">
+              <a:avLst/>
+            </a:prstGeom>
+          </p:spPr>
+          <p:style>
+            <a:lnRef idx="0">
+              <a:scrgbClr r="0" g="0" b="0"/>
+            </a:lnRef>
+            <a:fillRef idx="0">
+              <a:scrgbClr r="0" g="0" b="0"/>
+            </a:fillRef>
+            <a:effectRef idx="0">
+              <a:scrgbClr r="0" g="0" b="0"/>
+            </a:effectRef>
+            <a:fontRef idx="minor">
+              <a:schemeClr val="lt1"/>
+            </a:fontRef>
+          </p:style>
+          <p:txBody>
+            <a:bodyPr spcFirstLastPara="0" vert="horz" wrap="square" lIns="10795" tIns="10795" rIns="10795" bIns="10795" numCol="1" spcCol="1270" anchor="ctr" anchorCtr="0">
+              <a:noAutofit/>
+            </a:bodyPr>
+            <a:lstStyle/>
+            <a:p>
+              <a:pPr marL="0" lvl="0" indent="0" algn="ctr" defTabSz="755650">
+                <a:lnSpc>
+                  <a:spcPct val="90000"/>
+                </a:lnSpc>
+                <a:spcBef>
+                  <a:spcPct val="0"/>
+                </a:spcBef>
+                <a:spcAft>
+                  <a:spcPct val="35000"/>
+                </a:spcAft>
+                <a:buNone/>
+              </a:pPr>
+              <a:r>
+                <a:rPr lang="it-IT" sz="2800" kern="1200">
+                  <a:solidFill>
+                    <a:schemeClr val="accent1"/>
+                  </a:solidFill>
+                  <a:latin typeface="+mj-lt"/>
+                </a:rPr>
+                <a:t>5</a:t>
+              </a:r>
+            </a:p>
+          </p:txBody>
+        </p:sp>
+      </p:grpSp>
+      <p:graphicFrame>
+        <p:nvGraphicFramePr>
+          <p:cNvPr id="10" name="Tabella 10">
+            <a:extLst>
+              <a:ext uri="{FF2B5EF4-FFF2-40B4-BE49-F238E27FC236}">
+                <a16:creationId xmlns:a16="http://schemas.microsoft.com/office/drawing/2014/main" id="{2D7D1767-576B-49B5-BB93-922257762A05}"/>
+              </a:ext>
+            </a:extLst>
+          </p:cNvPr>
+          <p:cNvGraphicFramePr>
+            <a:graphicFrameLocks noGrp="1"/>
+          </p:cNvGraphicFramePr>
+          <p:nvPr>
+            <p:extLst>
+              <p:ext uri="{D42A27DB-BD31-4B8C-83A1-F6EECF244321}">
+                <p14:modId xmlns:p14="http://schemas.microsoft.com/office/powerpoint/2010/main" val="2125628200"/>
+              </p:ext>
+            </p:extLst>
+          </p:nvPr>
+        </p:nvGraphicFramePr>
+        <p:xfrm>
+          <a:off x="694061" y="2174042"/>
           <a:ext cx="10551283" cy="1844040"/>
         </p:xfrm>
         <a:graphic>
@@ -33233,7 +35928,7 @@
                     <a:bodyPr/>
                     <a:lstStyle/>
                     <a:p>
-                      <a:pPr>
+                      <a:pPr algn="ctr">
                         <a:lnSpc>
                           <a:spcPct val="150000"/>
                         </a:lnSpc>
@@ -33324,7 +36019,7 @@
                           <a:ea typeface="+mn-ea"/>
                           <a:cs typeface="+mn-cs"/>
                         </a:rPr>
-                        <a:t>0.9772</a:t>
+                        <a:t>0.7137</a:t>
                       </a:r>
                       <a:endParaRPr lang="it-IT">
                         <a:latin typeface="Avenir Next LT Pro" panose="020B0504020202020204" pitchFamily="34" charset="0"/>
@@ -33368,10 +36063,10 @@
                     <a:p>
                       <a:pPr algn="ctr"/>
                       <a:r>
-                        <a:rPr lang="it-IT">
+                        <a:rPr lang="it-IT" b="1">
                           <a:latin typeface="Avenir Next LT Pro" panose="020B0504020202020204" pitchFamily="34" charset="0"/>
                         </a:rPr>
-                        <a:t>0.9773</a:t>
+                        <a:t>0.7139</a:t>
                       </a:r>
                     </a:p>
                   </a:txBody>
@@ -33411,7 +36106,9 @@
                     <a:lstStyle/>
                     <a:p>
                       <a:pPr algn="ctr"/>
-                      <a:endParaRPr lang="it-IT"/>
+                      <a:endParaRPr lang="it-IT" b="0">
+                        <a:latin typeface="Avenir Next LT Pro" panose="020B0504020202020204" pitchFamily="34" charset="0"/>
+                      </a:endParaRPr>
                     </a:p>
                   </a:txBody>
                   <a:tcPr>
@@ -33460,7 +36157,7 @@
                           <a:ea typeface="+mn-ea"/>
                           <a:cs typeface="+mn-cs"/>
                         </a:rPr>
-                        <a:t>0.973</a:t>
+                        <a:t>0.5897</a:t>
                       </a:r>
                       <a:endParaRPr lang="it-IT">
                         <a:latin typeface="Avenir Next LT Pro" panose="020B0504020202020204" pitchFamily="34" charset="0"/>
@@ -33507,7 +36204,7 @@
                         <a:rPr lang="it-IT">
                           <a:latin typeface="Avenir Next LT Pro" panose="020B0504020202020204" pitchFamily="34" charset="0"/>
                         </a:rPr>
-                        <a:t>0.974</a:t>
+                        <a:t>0.6352</a:t>
                       </a:r>
                     </a:p>
                   </a:txBody>
@@ -33551,7 +36248,7 @@
                         <a:rPr lang="it-IT">
                           <a:latin typeface="Avenir Next LT Pro" panose="020B0504020202020204" pitchFamily="34" charset="0"/>
                         </a:rPr>
-                        <a:t>0.974</a:t>
+                        <a:t>0.6352</a:t>
                       </a:r>
                     </a:p>
                   </a:txBody>
@@ -33613,8 +36310,29 @@
                     <a:bodyPr/>
                     <a:lstStyle/>
                     <a:p>
-                      <a:pPr algn="ctr"/>
-                      <a:endParaRPr lang="it-IT"/>
+                      <a:pPr marL="0" marR="0" lvl="0" indent="0" algn="ctr" defTabSz="457200" rtl="0" eaLnBrk="1" fontAlgn="auto" latinLnBrk="0" hangingPunct="1">
+                        <a:lnSpc>
+                          <a:spcPct val="100000"/>
+                        </a:lnSpc>
+                        <a:spcBef>
+                          <a:spcPts val="0"/>
+                        </a:spcBef>
+                        <a:spcAft>
+                          <a:spcPts val="0"/>
+                        </a:spcAft>
+                        <a:buClrTx/>
+                        <a:buSzTx/>
+                        <a:buFontTx/>
+                        <a:buNone/>
+                        <a:tabLst/>
+                        <a:defRPr/>
+                      </a:pPr>
+                      <a:r>
+                        <a:rPr lang="it-IT" b="0">
+                          <a:latin typeface="Avenir Next LT Pro" panose="020B0504020202020204" pitchFamily="34" charset="0"/>
+                        </a:rPr>
+                        <a:t>0.7138</a:t>
+                      </a:r>
                     </a:p>
                   </a:txBody>
                   <a:tcPr>
@@ -33644,7 +36362,12 @@
                     <a:lstStyle/>
                     <a:p>
                       <a:pPr algn="ctr"/>
-                      <a:endParaRPr lang="it-IT"/>
+                      <a:r>
+                        <a:rPr lang="it-IT" b="0">
+                          <a:latin typeface="Avenir Next LT Pro" panose="020B0504020202020204" pitchFamily="34" charset="0"/>
+                        </a:rPr>
+                        <a:t>0.7138</a:t>
+                      </a:r>
                     </a:p>
                   </a:txBody>
                   <a:tcPr>
@@ -33674,7 +36397,9 @@
                     <a:lstStyle/>
                     <a:p>
                       <a:pPr algn="ctr"/>
-                      <a:endParaRPr lang="it-IT"/>
+                      <a:endParaRPr lang="it-IT">
+                        <a:latin typeface="Avenir Next LT Pro" panose="020B0504020202020204" pitchFamily="34" charset="0"/>
+                      </a:endParaRPr>
                     </a:p>
                   </a:txBody>
                   <a:tcPr>
@@ -33704,7 +36429,12 @@
                     <a:lstStyle/>
                     <a:p>
                       <a:pPr algn="ctr"/>
-                      <a:endParaRPr lang="it-IT"/>
+                      <a:r>
+                        <a:rPr lang="it-IT">
+                          <a:latin typeface="Avenir Next LT Pro" panose="020B0504020202020204" pitchFamily="34" charset="0"/>
+                        </a:rPr>
+                        <a:t>0.5961</a:t>
+                      </a:r>
                     </a:p>
                   </a:txBody>
                   <a:tcPr>
@@ -33734,7 +36464,9 @@
                     <a:lstStyle/>
                     <a:p>
                       <a:pPr algn="ctr"/>
-                      <a:endParaRPr lang="it-IT"/>
+                      <a:endParaRPr lang="it-IT">
+                        <a:latin typeface="Avenir Next LT Pro" panose="020B0504020202020204" pitchFamily="34" charset="0"/>
+                      </a:endParaRPr>
                     </a:p>
                   </a:txBody>
                   <a:tcPr>
@@ -33764,7 +36496,9 @@
                     <a:lstStyle/>
                     <a:p>
                       <a:pPr algn="ctr"/>
-                      <a:endParaRPr lang="it-IT"/>
+                      <a:endParaRPr lang="it-IT">
+                        <a:latin typeface="Avenir Next LT Pro" panose="020B0504020202020204" pitchFamily="34" charset="0"/>
+                      </a:endParaRPr>
                     </a:p>
                   </a:txBody>
                   <a:tcPr>
@@ -33817,7 +36551,9 @@
                     <a:lstStyle/>
                     <a:p>
                       <a:pPr algn="ctr"/>
-                      <a:endParaRPr lang="it-IT"/>
+                      <a:endParaRPr lang="it-IT">
+                        <a:latin typeface="Avenir Next LT Pro" panose="020B0504020202020204" pitchFamily="34" charset="0"/>
+                      </a:endParaRPr>
                     </a:p>
                   </a:txBody>
                   <a:tcPr>
@@ -33847,7 +36583,9 @@
                     <a:lstStyle/>
                     <a:p>
                       <a:pPr algn="ctr"/>
-                      <a:endParaRPr lang="it-IT"/>
+                      <a:endParaRPr lang="it-IT">
+                        <a:latin typeface="Avenir Next LT Pro" panose="020B0504020202020204" pitchFamily="34" charset="0"/>
+                      </a:endParaRPr>
                     </a:p>
                   </a:txBody>
                   <a:tcPr>
@@ -33877,7 +36615,9 @@
                     <a:lstStyle/>
                     <a:p>
                       <a:pPr algn="ctr"/>
-                      <a:endParaRPr lang="it-IT"/>
+                      <a:endParaRPr lang="it-IT">
+                        <a:latin typeface="Avenir Next LT Pro" panose="020B0504020202020204" pitchFamily="34" charset="0"/>
+                      </a:endParaRPr>
                     </a:p>
                   </a:txBody>
                   <a:tcPr>
@@ -33907,7 +36647,9 @@
                     <a:lstStyle/>
                     <a:p>
                       <a:pPr algn="ctr"/>
-                      <a:endParaRPr lang="it-IT"/>
+                      <a:endParaRPr lang="it-IT">
+                        <a:latin typeface="Avenir Next LT Pro" panose="020B0504020202020204" pitchFamily="34" charset="0"/>
+                      </a:endParaRPr>
                     </a:p>
                   </a:txBody>
                   <a:tcPr>
@@ -33937,7 +36679,9 @@
                     <a:lstStyle/>
                     <a:p>
                       <a:pPr algn="ctr"/>
-                      <a:endParaRPr lang="it-IT"/>
+                      <a:endParaRPr lang="it-IT">
+                        <a:latin typeface="Avenir Next LT Pro" panose="020B0504020202020204" pitchFamily="34" charset="0"/>
+                      </a:endParaRPr>
                     </a:p>
                   </a:txBody>
                   <a:tcPr>
@@ -33967,7 +36711,9 @@
                     <a:lstStyle/>
                     <a:p>
                       <a:pPr algn="ctr"/>
-                      <a:endParaRPr lang="it-IT"/>
+                      <a:endParaRPr lang="it-IT">
+                        <a:latin typeface="Avenir Next LT Pro" panose="020B0504020202020204" pitchFamily="34" charset="0"/>
+                      </a:endParaRPr>
                     </a:p>
                   </a:txBody>
                   <a:tcPr>
@@ -33992,10 +36738,1285 @@
           </a:graphicData>
         </a:graphic>
       </p:graphicFrame>
+      <p:sp>
+        <p:nvSpPr>
+          <p:cNvPr id="6" name="CasellaDiTesto 5">
+            <a:extLst>
+              <a:ext uri="{FF2B5EF4-FFF2-40B4-BE49-F238E27FC236}">
+                <a16:creationId xmlns:a16="http://schemas.microsoft.com/office/drawing/2014/main" id="{BC619C78-40E2-4630-9699-7D2EFDB53A63}"/>
+              </a:ext>
+            </a:extLst>
+          </p:cNvPr>
+          <p:cNvSpPr txBox="1"/>
+          <p:nvPr/>
+        </p:nvSpPr>
+        <p:spPr>
+          <a:xfrm>
+            <a:off x="769650" y="2294071"/>
+            <a:ext cx="1799112" cy="461665"/>
+          </a:xfrm>
+          <a:prstGeom prst="rect">
+            <a:avLst/>
+          </a:prstGeom>
+          <a:noFill/>
+        </p:spPr>
+        <p:txBody>
+          <a:bodyPr wrap="square" rtlCol="0" anchor="ctr">
+            <a:spAutoFit/>
+          </a:bodyPr>
+          <a:lstStyle/>
+          <a:p>
+            <a:pPr algn="ctr"/>
+            <a:r>
+              <a:rPr lang="it-IT" sz="2400" b="1">
+                <a:solidFill>
+                  <a:schemeClr val="accent4">
+                    <a:lumMod val="60000"/>
+                    <a:lumOff val="40000"/>
+                  </a:schemeClr>
+                </a:solidFill>
+              </a:rPr>
+              <a:t>F1-Score</a:t>
+            </a:r>
+          </a:p>
+        </p:txBody>
+      </p:sp>
+      <p:graphicFrame>
+        <p:nvGraphicFramePr>
+          <p:cNvPr id="8" name="Tabella 10">
+            <a:extLst>
+              <a:ext uri="{FF2B5EF4-FFF2-40B4-BE49-F238E27FC236}">
+                <a16:creationId xmlns:a16="http://schemas.microsoft.com/office/drawing/2014/main" id="{E4AFDD1F-C4B0-4DC3-8B0A-AB22D5DC190A}"/>
+              </a:ext>
+            </a:extLst>
+          </p:cNvPr>
+          <p:cNvGraphicFramePr>
+            <a:graphicFrameLocks noGrp="1"/>
+          </p:cNvGraphicFramePr>
+          <p:nvPr>
+            <p:extLst>
+              <p:ext uri="{D42A27DB-BD31-4B8C-83A1-F6EECF244321}">
+                <p14:modId xmlns:p14="http://schemas.microsoft.com/office/powerpoint/2010/main" val="3033830348"/>
+              </p:ext>
+            </p:extLst>
+          </p:nvPr>
+        </p:nvGraphicFramePr>
+        <p:xfrm>
+          <a:off x="694061" y="4474134"/>
+          <a:ext cx="10551283" cy="1844040"/>
+        </p:xfrm>
+        <a:graphic>
+          <a:graphicData uri="http://schemas.openxmlformats.org/drawingml/2006/table">
+            <a:tbl>
+              <a:tblPr firstRow="1" bandRow="1">
+                <a:tableStyleId>{3B4B98B0-60AC-42C2-AFA5-B58CD77FA1E5}</a:tableStyleId>
+              </a:tblPr>
+              <a:tblGrid>
+                <a:gridCol w="1957828">
+                  <a:extLst>
+                    <a:ext uri="{9D8B030D-6E8A-4147-A177-3AD203B41FA5}">
+                      <a16:colId xmlns:a16="http://schemas.microsoft.com/office/drawing/2014/main" val="396372187"/>
+                    </a:ext>
+                  </a:extLst>
+                </a:gridCol>
+                <a:gridCol w="1306286">
+                  <a:extLst>
+                    <a:ext uri="{9D8B030D-6E8A-4147-A177-3AD203B41FA5}">
+                      <a16:colId xmlns:a16="http://schemas.microsoft.com/office/drawing/2014/main" val="1229565216"/>
+                    </a:ext>
+                  </a:extLst>
+                </a:gridCol>
+                <a:gridCol w="1320407">
+                  <a:extLst>
+                    <a:ext uri="{9D8B030D-6E8A-4147-A177-3AD203B41FA5}">
+                      <a16:colId xmlns:a16="http://schemas.microsoft.com/office/drawing/2014/main" val="3000570086"/>
+                    </a:ext>
+                  </a:extLst>
+                </a:gridCol>
+                <a:gridCol w="1482170">
+                  <a:extLst>
+                    <a:ext uri="{9D8B030D-6E8A-4147-A177-3AD203B41FA5}">
+                      <a16:colId xmlns:a16="http://schemas.microsoft.com/office/drawing/2014/main" val="2527479792"/>
+                    </a:ext>
+                  </a:extLst>
+                </a:gridCol>
+                <a:gridCol w="1711707">
+                  <a:extLst>
+                    <a:ext uri="{9D8B030D-6E8A-4147-A177-3AD203B41FA5}">
+                      <a16:colId xmlns:a16="http://schemas.microsoft.com/office/drawing/2014/main" val="1832342877"/>
+                    </a:ext>
+                  </a:extLst>
+                </a:gridCol>
+                <a:gridCol w="1442852">
+                  <a:extLst>
+                    <a:ext uri="{9D8B030D-6E8A-4147-A177-3AD203B41FA5}">
+                      <a16:colId xmlns:a16="http://schemas.microsoft.com/office/drawing/2014/main" val="455619855"/>
+                    </a:ext>
+                  </a:extLst>
+                </a:gridCol>
+                <a:gridCol w="1330033">
+                  <a:extLst>
+                    <a:ext uri="{9D8B030D-6E8A-4147-A177-3AD203B41FA5}">
+                      <a16:colId xmlns:a16="http://schemas.microsoft.com/office/drawing/2014/main" val="842104205"/>
+                    </a:ext>
+                  </a:extLst>
+                </a:gridCol>
+              </a:tblGrid>
+              <a:tr h="357766">
+                <a:tc>
+                  <a:txBody>
+                    <a:bodyPr/>
+                    <a:lstStyle/>
+                    <a:p>
+                      <a:endParaRPr lang="it-IT">
+                        <a:solidFill>
+                          <a:schemeClr val="accent2"/>
+                        </a:solidFill>
+                      </a:endParaRPr>
+                    </a:p>
+                  </a:txBody>
+                  <a:tcPr>
+                    <a:solidFill>
+                      <a:schemeClr val="accent1"/>
+                    </a:solidFill>
+                  </a:tcPr>
+                </a:tc>
+                <a:tc gridSpan="2">
+                  <a:txBody>
+                    <a:bodyPr/>
+                    <a:lstStyle/>
+                    <a:p>
+                      <a:pPr algn="ctr"/>
+                      <a:r>
+                        <a:rPr lang="it-IT"/>
+                        <a:t>Numerical</a:t>
+                      </a:r>
+                    </a:p>
+                  </a:txBody>
+                  <a:tcPr/>
+                </a:tc>
+                <a:tc hMerge="1">
+                  <a:txBody>
+                    <a:bodyPr/>
+                    <a:lstStyle/>
+                    <a:p>
+                      <a:endParaRPr lang="it-IT"/>
+                    </a:p>
+                  </a:txBody>
+                  <a:tcPr/>
+                </a:tc>
+                <a:tc>
+                  <a:txBody>
+                    <a:bodyPr/>
+                    <a:lstStyle/>
+                    <a:p>
+                      <a:pPr algn="ctr"/>
+                      <a:r>
+                        <a:rPr lang="it-IT"/>
+                        <a:t>All Features</a:t>
+                      </a:r>
+                    </a:p>
+                  </a:txBody>
+                  <a:tcPr/>
+                </a:tc>
+                <a:tc>
+                  <a:txBody>
+                    <a:bodyPr/>
+                    <a:lstStyle/>
+                    <a:p>
+                      <a:pPr algn="ctr"/>
+                      <a:r>
+                        <a:rPr lang="it-IT"/>
+                        <a:t>Categorical</a:t>
+                      </a:r>
+                    </a:p>
+                  </a:txBody>
+                  <a:tcPr/>
+                </a:tc>
+                <a:tc gridSpan="2">
+                  <a:txBody>
+                    <a:bodyPr/>
+                    <a:lstStyle/>
+                    <a:p>
+                      <a:pPr algn="ctr"/>
+                      <a:r>
+                        <a:rPr lang="it-IT"/>
+                        <a:t>Mix</a:t>
+                      </a:r>
+                    </a:p>
+                  </a:txBody>
+                  <a:tcPr/>
+                </a:tc>
+                <a:tc hMerge="1">
+                  <a:txBody>
+                    <a:bodyPr/>
+                    <a:lstStyle/>
+                    <a:p>
+                      <a:pPr algn="ctr"/>
+                      <a:endParaRPr lang="it-IT"/>
+                    </a:p>
+                  </a:txBody>
+                  <a:tcPr/>
+                </a:tc>
+                <a:extLst>
+                  <a:ext uri="{0D108BD9-81ED-4DB2-BD59-A6C34878D82A}">
+                    <a16:rowId xmlns:a16="http://schemas.microsoft.com/office/drawing/2014/main" val="464026787"/>
+                  </a:ext>
+                </a:extLst>
+              </a:tr>
+              <a:tr h="359229">
+                <a:tc>
+                  <a:txBody>
+                    <a:bodyPr/>
+                    <a:lstStyle/>
+                    <a:p>
+                      <a:endParaRPr lang="it-IT">
+                        <a:solidFill>
+                          <a:schemeClr val="accent2"/>
+                        </a:solidFill>
+                      </a:endParaRPr>
+                    </a:p>
+                  </a:txBody>
+                  <a:tcPr>
+                    <a:lnB w="12700" cap="flat" cmpd="sng" algn="ctr">
+                      <a:solidFill>
+                        <a:schemeClr val="tx1"/>
+                      </a:solidFill>
+                      <a:prstDash val="solid"/>
+                      <a:round/>
+                      <a:headEnd type="none" w="med" len="med"/>
+                      <a:tailEnd type="none" w="med" len="med"/>
+                    </a:lnB>
+                    <a:solidFill>
+                      <a:schemeClr val="accent1"/>
+                    </a:solidFill>
+                  </a:tcPr>
+                </a:tc>
+                <a:tc>
+                  <a:txBody>
+                    <a:bodyPr/>
+                    <a:lstStyle/>
+                    <a:p>
+                      <a:pPr algn="ctr">
+                        <a:lnSpc>
+                          <a:spcPct val="150000"/>
+                        </a:lnSpc>
+                      </a:pPr>
+                      <a:r>
+                        <a:rPr lang="it-IT" sz="1100" u="sng">
+                          <a:latin typeface="Bahnschrift SemiBold SemiConden" panose="020B0502040204020203" pitchFamily="34" charset="0"/>
+                        </a:rPr>
+                        <a:t>with standardization</a:t>
+                      </a:r>
+                    </a:p>
+                  </a:txBody>
+                  <a:tcPr>
+                    <a:lnR w="12700" cap="flat" cmpd="sng" algn="ctr">
+                      <a:solidFill>
+                        <a:schemeClr val="tx1"/>
+                      </a:solidFill>
+                      <a:prstDash val="solid"/>
+                      <a:round/>
+                      <a:headEnd type="none" w="med" len="med"/>
+                      <a:tailEnd type="none" w="med" len="med"/>
+                    </a:lnR>
+                    <a:lnB w="12700" cap="flat" cmpd="sng" algn="ctr">
+                      <a:solidFill>
+                        <a:schemeClr val="tx1"/>
+                      </a:solidFill>
+                      <a:prstDash val="solid"/>
+                      <a:round/>
+                      <a:headEnd type="none" w="med" len="med"/>
+                      <a:tailEnd type="none" w="med" len="med"/>
+                    </a:lnB>
+                  </a:tcPr>
+                </a:tc>
+                <a:tc>
+                  <a:txBody>
+                    <a:bodyPr/>
+                    <a:lstStyle/>
+                    <a:p>
+                      <a:pPr algn="ctr">
+                        <a:lnSpc>
+                          <a:spcPct val="150000"/>
+                        </a:lnSpc>
+                      </a:pPr>
+                      <a:r>
+                        <a:rPr lang="it-IT" sz="1100" u="sng">
+                          <a:latin typeface="Bahnschrift SemiBold SemiConden" panose="020B0502040204020203" pitchFamily="34" charset="0"/>
+                        </a:rPr>
+                        <a:t>w/out standardize</a:t>
+                      </a:r>
+                    </a:p>
+                  </a:txBody>
+                  <a:tcPr>
+                    <a:lnL w="12700" cap="flat" cmpd="sng" algn="ctr">
+                      <a:solidFill>
+                        <a:schemeClr val="tx1"/>
+                      </a:solidFill>
+                      <a:prstDash val="solid"/>
+                      <a:round/>
+                      <a:headEnd type="none" w="med" len="med"/>
+                      <a:tailEnd type="none" w="med" len="med"/>
+                    </a:lnL>
+                    <a:lnB w="12700" cap="flat" cmpd="sng" algn="ctr">
+                      <a:solidFill>
+                        <a:schemeClr val="tx1"/>
+                      </a:solidFill>
+                      <a:prstDash val="solid"/>
+                      <a:round/>
+                      <a:headEnd type="none" w="med" len="med"/>
+                      <a:tailEnd type="none" w="med" len="med"/>
+                    </a:lnB>
+                  </a:tcPr>
+                </a:tc>
+                <a:tc>
+                  <a:txBody>
+                    <a:bodyPr/>
+                    <a:lstStyle/>
+                    <a:p>
+                      <a:endParaRPr lang="it-IT"/>
+                    </a:p>
+                  </a:txBody>
+                  <a:tcPr>
+                    <a:lnB w="12700" cap="flat" cmpd="sng" algn="ctr">
+                      <a:solidFill>
+                        <a:schemeClr val="tx1"/>
+                      </a:solidFill>
+                      <a:prstDash val="solid"/>
+                      <a:round/>
+                      <a:headEnd type="none" w="med" len="med"/>
+                      <a:tailEnd type="none" w="med" len="med"/>
+                    </a:lnB>
+                    <a:solidFill>
+                      <a:schemeClr val="bg1"/>
+                    </a:solidFill>
+                  </a:tcPr>
+                </a:tc>
+                <a:tc>
+                  <a:txBody>
+                    <a:bodyPr/>
+                    <a:lstStyle/>
+                    <a:p>
+                      <a:endParaRPr lang="it-IT"/>
+                    </a:p>
+                  </a:txBody>
+                  <a:tcPr>
+                    <a:lnB w="12700" cap="flat" cmpd="sng" algn="ctr">
+                      <a:solidFill>
+                        <a:schemeClr val="tx1"/>
+                      </a:solidFill>
+                      <a:prstDash val="solid"/>
+                      <a:round/>
+                      <a:headEnd type="none" w="med" len="med"/>
+                      <a:tailEnd type="none" w="med" len="med"/>
+                    </a:lnB>
+                    <a:solidFill>
+                      <a:schemeClr val="bg1">
+                        <a:alpha val="20000"/>
+                      </a:schemeClr>
+                    </a:solidFill>
+                  </a:tcPr>
+                </a:tc>
+                <a:tc>
+                  <a:txBody>
+                    <a:bodyPr/>
+                    <a:lstStyle/>
+                    <a:p>
+                      <a:pPr algn="ctr">
+                        <a:lnSpc>
+                          <a:spcPct val="150000"/>
+                        </a:lnSpc>
+                      </a:pPr>
+                      <a:r>
+                        <a:rPr lang="it-IT" sz="1100" u="sng">
+                          <a:latin typeface="Bahnschrift SemiBold SemiConden" panose="020B0502040204020203" pitchFamily="34" charset="0"/>
+                        </a:rPr>
+                        <a:t>with standardization</a:t>
+                      </a:r>
+                    </a:p>
+                  </a:txBody>
+                  <a:tcPr>
+                    <a:lnR w="12700" cap="flat" cmpd="sng" algn="ctr">
+                      <a:solidFill>
+                        <a:schemeClr val="tx1"/>
+                      </a:solidFill>
+                      <a:prstDash val="solid"/>
+                      <a:round/>
+                      <a:headEnd type="none" w="med" len="med"/>
+                      <a:tailEnd type="none" w="med" len="med"/>
+                    </a:lnR>
+                    <a:lnB w="12700" cap="flat" cmpd="sng" algn="ctr">
+                      <a:solidFill>
+                        <a:schemeClr val="tx1"/>
+                      </a:solidFill>
+                      <a:prstDash val="solid"/>
+                      <a:round/>
+                      <a:headEnd type="none" w="med" len="med"/>
+                      <a:tailEnd type="none" w="med" len="med"/>
+                    </a:lnB>
+                  </a:tcPr>
+                </a:tc>
+                <a:tc>
+                  <a:txBody>
+                    <a:bodyPr/>
+                    <a:lstStyle/>
+                    <a:p>
+                      <a:pPr algn="ctr">
+                        <a:lnSpc>
+                          <a:spcPct val="150000"/>
+                        </a:lnSpc>
+                      </a:pPr>
+                      <a:r>
+                        <a:rPr lang="it-IT" sz="1100" u="sng">
+                          <a:latin typeface="Bahnschrift SemiBold SemiConden" panose="020B0502040204020203" pitchFamily="34" charset="0"/>
+                        </a:rPr>
+                        <a:t>w/out standardize</a:t>
+                      </a:r>
+                    </a:p>
+                  </a:txBody>
+                  <a:tcPr>
+                    <a:lnL w="12700" cap="flat" cmpd="sng" algn="ctr">
+                      <a:solidFill>
+                        <a:schemeClr val="tx1"/>
+                      </a:solidFill>
+                      <a:prstDash val="solid"/>
+                      <a:round/>
+                      <a:headEnd type="none" w="med" len="med"/>
+                      <a:tailEnd type="none" w="med" len="med"/>
+                    </a:lnL>
+                    <a:lnB w="12700" cap="flat" cmpd="sng" algn="ctr">
+                      <a:solidFill>
+                        <a:schemeClr val="tx1"/>
+                      </a:solidFill>
+                      <a:prstDash val="solid"/>
+                      <a:round/>
+                      <a:headEnd type="none" w="med" len="med"/>
+                      <a:tailEnd type="none" w="med" len="med"/>
+                    </a:lnB>
+                  </a:tcPr>
+                </a:tc>
+                <a:extLst>
+                  <a:ext uri="{0D108BD9-81ED-4DB2-BD59-A6C34878D82A}">
+                    <a16:rowId xmlns:a16="http://schemas.microsoft.com/office/drawing/2014/main" val="1365004327"/>
+                  </a:ext>
+                </a:extLst>
+              </a:tr>
+              <a:tr h="370840">
+                <a:tc>
+                  <a:txBody>
+                    <a:bodyPr/>
+                    <a:lstStyle/>
+                    <a:p>
+                      <a:r>
+                        <a:rPr lang="it-IT">
+                          <a:latin typeface="Bahnschrift SemiBold SemiConden" panose="020B0502040204020203" pitchFamily="34" charset="0"/>
+                        </a:rPr>
+                        <a:t>Logistic Regression</a:t>
+                      </a:r>
+                    </a:p>
+                  </a:txBody>
+                  <a:tcPr>
+                    <a:lnR w="12700" cap="flat" cmpd="sng" algn="ctr">
+                      <a:solidFill>
+                        <a:schemeClr val="tx1"/>
+                      </a:solidFill>
+                      <a:prstDash val="solid"/>
+                      <a:round/>
+                      <a:headEnd type="none" w="med" len="med"/>
+                      <a:tailEnd type="none" w="med" len="med"/>
+                    </a:lnR>
+                    <a:lnT w="12700" cap="flat" cmpd="sng" algn="ctr">
+                      <a:solidFill>
+                        <a:schemeClr val="tx1"/>
+                      </a:solidFill>
+                      <a:prstDash val="solid"/>
+                      <a:round/>
+                      <a:headEnd type="none" w="med" len="med"/>
+                      <a:tailEnd type="none" w="med" len="med"/>
+                    </a:lnT>
+                  </a:tcPr>
+                </a:tc>
+                <a:tc>
+                  <a:txBody>
+                    <a:bodyPr/>
+                    <a:lstStyle/>
+                    <a:p>
+                      <a:pPr algn="ctr"/>
+                      <a:r>
+                        <a:rPr lang="it-IT" sz="1600" b="0" i="0" kern="1200">
+                          <a:solidFill>
+                            <a:schemeClr val="tx1"/>
+                          </a:solidFill>
+                          <a:effectLst/>
+                          <a:latin typeface="Avenir Next LT Pro" panose="020B0504020202020204" pitchFamily="34" charset="0"/>
+                          <a:ea typeface="+mn-ea"/>
+                          <a:cs typeface="+mn-cs"/>
+                        </a:rPr>
+                        <a:t>0.853/0.613</a:t>
+                      </a:r>
+                      <a:endParaRPr lang="it-IT" sz="1600">
+                        <a:latin typeface="Avenir Next LT Pro" panose="020B0504020202020204" pitchFamily="34" charset="0"/>
+                      </a:endParaRPr>
+                    </a:p>
+                  </a:txBody>
+                  <a:tcPr>
+                    <a:lnL w="12700" cap="flat" cmpd="sng" algn="ctr">
+                      <a:solidFill>
+                        <a:schemeClr val="tx1"/>
+                      </a:solidFill>
+                      <a:prstDash val="solid"/>
+                      <a:round/>
+                      <a:headEnd type="none" w="med" len="med"/>
+                      <a:tailEnd type="none" w="med" len="med"/>
+                    </a:lnL>
+                    <a:lnR w="12700" cap="flat" cmpd="sng" algn="ctr">
+                      <a:solidFill>
+                        <a:schemeClr val="tx1"/>
+                      </a:solidFill>
+                      <a:prstDash val="solid"/>
+                      <a:round/>
+                      <a:headEnd type="none" w="med" len="med"/>
+                      <a:tailEnd type="none" w="med" len="med"/>
+                    </a:lnR>
+                    <a:lnT w="12700" cap="flat" cmpd="sng" algn="ctr">
+                      <a:solidFill>
+                        <a:schemeClr val="tx1"/>
+                      </a:solidFill>
+                      <a:prstDash val="solid"/>
+                      <a:round/>
+                      <a:headEnd type="none" w="med" len="med"/>
+                      <a:tailEnd type="none" w="med" len="med"/>
+                    </a:lnT>
+                  </a:tcPr>
+                </a:tc>
+                <a:tc>
+                  <a:txBody>
+                    <a:bodyPr/>
+                    <a:lstStyle/>
+                    <a:p>
+                      <a:pPr algn="ctr"/>
+                      <a:r>
+                        <a:rPr lang="it-IT" sz="1600" b="0">
+                          <a:latin typeface="Avenir Next LT Pro" panose="020B0504020202020204" pitchFamily="34" charset="0"/>
+                        </a:rPr>
+                        <a:t>0.852/0.614</a:t>
+                      </a:r>
+                    </a:p>
+                  </a:txBody>
+                  <a:tcPr>
+                    <a:lnL w="12700" cap="flat" cmpd="sng" algn="ctr">
+                      <a:solidFill>
+                        <a:schemeClr val="tx1"/>
+                      </a:solidFill>
+                      <a:prstDash val="solid"/>
+                      <a:round/>
+                      <a:headEnd type="none" w="med" len="med"/>
+                      <a:tailEnd type="none" w="med" len="med"/>
+                    </a:lnL>
+                    <a:lnR w="12700" cap="flat" cmpd="sng" algn="ctr">
+                      <a:solidFill>
+                        <a:schemeClr val="tx1"/>
+                      </a:solidFill>
+                      <a:prstDash val="solid"/>
+                      <a:round/>
+                      <a:headEnd type="none" w="med" len="med"/>
+                      <a:tailEnd type="none" w="med" len="med"/>
+                    </a:lnR>
+                    <a:lnT w="12700" cap="flat" cmpd="sng" algn="ctr">
+                      <a:solidFill>
+                        <a:schemeClr val="tx1"/>
+                      </a:solidFill>
+                      <a:prstDash val="solid"/>
+                      <a:round/>
+                      <a:headEnd type="none" w="med" len="med"/>
+                      <a:tailEnd type="none" w="med" len="med"/>
+                    </a:lnT>
+                  </a:tcPr>
+                </a:tc>
+                <a:tc>
+                  <a:txBody>
+                    <a:bodyPr/>
+                    <a:lstStyle/>
+                    <a:p>
+                      <a:pPr algn="ctr"/>
+                      <a:endParaRPr lang="it-IT" sz="1600"/>
+                    </a:p>
+                  </a:txBody>
+                  <a:tcPr>
+                    <a:lnL w="12700" cap="flat" cmpd="sng" algn="ctr">
+                      <a:solidFill>
+                        <a:schemeClr val="tx1"/>
+                      </a:solidFill>
+                      <a:prstDash val="solid"/>
+                      <a:round/>
+                      <a:headEnd type="none" w="med" len="med"/>
+                      <a:tailEnd type="none" w="med" len="med"/>
+                    </a:lnL>
+                    <a:lnR w="12700" cap="flat" cmpd="sng" algn="ctr">
+                      <a:solidFill>
+                        <a:schemeClr val="tx1"/>
+                      </a:solidFill>
+                      <a:prstDash val="solid"/>
+                      <a:round/>
+                      <a:headEnd type="none" w="med" len="med"/>
+                      <a:tailEnd type="none" w="med" len="med"/>
+                    </a:lnR>
+                    <a:lnT w="12700" cap="flat" cmpd="sng" algn="ctr">
+                      <a:solidFill>
+                        <a:schemeClr val="tx1"/>
+                      </a:solidFill>
+                      <a:prstDash val="solid"/>
+                      <a:round/>
+                      <a:headEnd type="none" w="med" len="med"/>
+                      <a:tailEnd type="none" w="med" len="med"/>
+                    </a:lnT>
+                  </a:tcPr>
+                </a:tc>
+                <a:tc>
+                  <a:txBody>
+                    <a:bodyPr/>
+                    <a:lstStyle/>
+                    <a:p>
+                      <a:pPr algn="ctr"/>
+                      <a:r>
+                        <a:rPr lang="it-IT" sz="1600" b="0" i="0" kern="1200">
+                          <a:solidFill>
+                            <a:schemeClr val="tx1"/>
+                          </a:solidFill>
+                          <a:effectLst/>
+                          <a:latin typeface="Avenir Next LT Pro" panose="020B0504020202020204" pitchFamily="34" charset="0"/>
+                          <a:ea typeface="+mn-ea"/>
+                          <a:cs typeface="+mn-cs"/>
+                        </a:rPr>
+                        <a:t>0.706/0.505</a:t>
+                      </a:r>
+                      <a:endParaRPr lang="it-IT" sz="1600">
+                        <a:latin typeface="Avenir Next LT Pro" panose="020B0504020202020204" pitchFamily="34" charset="0"/>
+                      </a:endParaRPr>
+                    </a:p>
+                  </a:txBody>
+                  <a:tcPr>
+                    <a:lnL w="12700" cap="flat" cmpd="sng" algn="ctr">
+                      <a:solidFill>
+                        <a:schemeClr val="tx1"/>
+                      </a:solidFill>
+                      <a:prstDash val="solid"/>
+                      <a:round/>
+                      <a:headEnd type="none" w="med" len="med"/>
+                      <a:tailEnd type="none" w="med" len="med"/>
+                    </a:lnL>
+                    <a:lnR w="12700" cap="flat" cmpd="sng" algn="ctr">
+                      <a:solidFill>
+                        <a:schemeClr val="tx1"/>
+                      </a:solidFill>
+                      <a:prstDash val="solid"/>
+                      <a:round/>
+                      <a:headEnd type="none" w="med" len="med"/>
+                      <a:tailEnd type="none" w="med" len="med"/>
+                    </a:lnR>
+                    <a:lnT w="12700" cap="flat" cmpd="sng" algn="ctr">
+                      <a:solidFill>
+                        <a:schemeClr val="tx1"/>
+                      </a:solidFill>
+                      <a:prstDash val="solid"/>
+                      <a:round/>
+                      <a:headEnd type="none" w="med" len="med"/>
+                      <a:tailEnd type="none" w="med" len="med"/>
+                    </a:lnT>
+                  </a:tcPr>
+                </a:tc>
+                <a:tc>
+                  <a:txBody>
+                    <a:bodyPr/>
+                    <a:lstStyle/>
+                    <a:p>
+                      <a:pPr algn="ctr"/>
+                      <a:r>
+                        <a:rPr lang="it-IT" sz="1600">
+                          <a:latin typeface="Avenir Next LT Pro" panose="020B0504020202020204" pitchFamily="34" charset="0"/>
+                        </a:rPr>
+                        <a:t>0.785/0.533</a:t>
+                      </a:r>
+                    </a:p>
+                  </a:txBody>
+                  <a:tcPr>
+                    <a:lnL w="12700" cap="flat" cmpd="sng" algn="ctr">
+                      <a:solidFill>
+                        <a:schemeClr val="tx1"/>
+                      </a:solidFill>
+                      <a:prstDash val="solid"/>
+                      <a:round/>
+                      <a:headEnd type="none" w="med" len="med"/>
+                      <a:tailEnd type="none" w="med" len="med"/>
+                    </a:lnL>
+                    <a:lnR w="12700" cap="flat" cmpd="sng" algn="ctr">
+                      <a:solidFill>
+                        <a:schemeClr val="tx1"/>
+                      </a:solidFill>
+                      <a:prstDash val="solid"/>
+                      <a:round/>
+                      <a:headEnd type="none" w="med" len="med"/>
+                      <a:tailEnd type="none" w="med" len="med"/>
+                    </a:lnR>
+                    <a:lnT w="12700" cap="flat" cmpd="sng" algn="ctr">
+                      <a:solidFill>
+                        <a:schemeClr val="tx1"/>
+                      </a:solidFill>
+                      <a:prstDash val="solid"/>
+                      <a:round/>
+                      <a:headEnd type="none" w="med" len="med"/>
+                      <a:tailEnd type="none" w="med" len="med"/>
+                    </a:lnT>
+                  </a:tcPr>
+                </a:tc>
+                <a:tc>
+                  <a:txBody>
+                    <a:bodyPr/>
+                    <a:lstStyle/>
+                    <a:p>
+                      <a:pPr algn="ctr"/>
+                      <a:r>
+                        <a:rPr lang="it-IT" sz="1600">
+                          <a:latin typeface="Avenir Next LT Pro" panose="020B0504020202020204" pitchFamily="34" charset="0"/>
+                        </a:rPr>
+                        <a:t>0.785/0.533</a:t>
+                      </a:r>
+                    </a:p>
+                  </a:txBody>
+                  <a:tcPr>
+                    <a:lnL w="12700" cap="flat" cmpd="sng" algn="ctr">
+                      <a:solidFill>
+                        <a:schemeClr val="tx1"/>
+                      </a:solidFill>
+                      <a:prstDash val="solid"/>
+                      <a:round/>
+                      <a:headEnd type="none" w="med" len="med"/>
+                      <a:tailEnd type="none" w="med" len="med"/>
+                    </a:lnL>
+                    <a:lnT w="12700" cap="flat" cmpd="sng" algn="ctr">
+                      <a:solidFill>
+                        <a:schemeClr val="tx1"/>
+                      </a:solidFill>
+                      <a:prstDash val="solid"/>
+                      <a:round/>
+                      <a:headEnd type="none" w="med" len="med"/>
+                      <a:tailEnd type="none" w="med" len="med"/>
+                    </a:lnT>
+                  </a:tcPr>
+                </a:tc>
+                <a:extLst>
+                  <a:ext uri="{0D108BD9-81ED-4DB2-BD59-A6C34878D82A}">
+                    <a16:rowId xmlns:a16="http://schemas.microsoft.com/office/drawing/2014/main" val="2532579262"/>
+                  </a:ext>
+                </a:extLst>
+              </a:tr>
+              <a:tr h="370840">
+                <a:tc>
+                  <a:txBody>
+                    <a:bodyPr/>
+                    <a:lstStyle/>
+                    <a:p>
+                      <a:r>
+                        <a:rPr lang="it-IT">
+                          <a:latin typeface="Bahnschrift SemiBold SemiConden" panose="020B0502040204020203" pitchFamily="34" charset="0"/>
+                        </a:rPr>
+                        <a:t>Decision Tree</a:t>
+                      </a:r>
+                    </a:p>
+                  </a:txBody>
+                  <a:tcPr>
+                    <a:lnR w="12700" cap="flat" cmpd="sng" algn="ctr">
+                      <a:solidFill>
+                        <a:schemeClr val="tx1"/>
+                      </a:solidFill>
+                      <a:prstDash val="solid"/>
+                      <a:round/>
+                      <a:headEnd type="none" w="med" len="med"/>
+                      <a:tailEnd type="none" w="med" len="med"/>
+                    </a:lnR>
+                  </a:tcPr>
+                </a:tc>
+                <a:tc>
+                  <a:txBody>
+                    <a:bodyPr/>
+                    <a:lstStyle/>
+                    <a:p>
+                      <a:pPr marL="0" marR="0" lvl="0" indent="0" algn="ctr" defTabSz="457200" rtl="0" eaLnBrk="1" fontAlgn="auto" latinLnBrk="0" hangingPunct="1">
+                        <a:lnSpc>
+                          <a:spcPct val="100000"/>
+                        </a:lnSpc>
+                        <a:spcBef>
+                          <a:spcPts val="0"/>
+                        </a:spcBef>
+                        <a:spcAft>
+                          <a:spcPts val="0"/>
+                        </a:spcAft>
+                        <a:buClrTx/>
+                        <a:buSzTx/>
+                        <a:buFontTx/>
+                        <a:buNone/>
+                        <a:tabLst/>
+                        <a:defRPr/>
+                      </a:pPr>
+                      <a:r>
+                        <a:rPr lang="it-IT" sz="1600">
+                          <a:latin typeface="Avenir Next LT Pro" panose="020B0504020202020204" pitchFamily="34" charset="0"/>
+                        </a:rPr>
+                        <a:t>0.878/0.601</a:t>
+                      </a:r>
+                    </a:p>
+                  </a:txBody>
+                  <a:tcPr>
+                    <a:lnL w="12700" cap="flat" cmpd="sng" algn="ctr">
+                      <a:solidFill>
+                        <a:schemeClr val="tx1"/>
+                      </a:solidFill>
+                      <a:prstDash val="solid"/>
+                      <a:round/>
+                      <a:headEnd type="none" w="med" len="med"/>
+                      <a:tailEnd type="none" w="med" len="med"/>
+                    </a:lnL>
+                    <a:lnR w="12700" cap="flat" cmpd="sng" algn="ctr">
+                      <a:solidFill>
+                        <a:schemeClr val="tx1"/>
+                      </a:solidFill>
+                      <a:prstDash val="solid"/>
+                      <a:round/>
+                      <a:headEnd type="none" w="med" len="med"/>
+                      <a:tailEnd type="none" w="med" len="med"/>
+                    </a:lnR>
+                  </a:tcPr>
+                </a:tc>
+                <a:tc>
+                  <a:txBody>
+                    <a:bodyPr/>
+                    <a:lstStyle/>
+                    <a:p>
+                      <a:pPr algn="ctr"/>
+                      <a:r>
+                        <a:rPr lang="it-IT" sz="1600">
+                          <a:latin typeface="Avenir Next LT Pro" panose="020B0504020202020204" pitchFamily="34" charset="0"/>
+                        </a:rPr>
+                        <a:t>0.878/0.601</a:t>
+                      </a:r>
+                    </a:p>
+                  </a:txBody>
+                  <a:tcPr>
+                    <a:lnL w="12700" cap="flat" cmpd="sng" algn="ctr">
+                      <a:solidFill>
+                        <a:schemeClr val="tx1"/>
+                      </a:solidFill>
+                      <a:prstDash val="solid"/>
+                      <a:round/>
+                      <a:headEnd type="none" w="med" len="med"/>
+                      <a:tailEnd type="none" w="med" len="med"/>
+                    </a:lnL>
+                    <a:lnR w="12700" cap="flat" cmpd="sng" algn="ctr">
+                      <a:solidFill>
+                        <a:schemeClr val="tx1"/>
+                      </a:solidFill>
+                      <a:prstDash val="solid"/>
+                      <a:round/>
+                      <a:headEnd type="none" w="med" len="med"/>
+                      <a:tailEnd type="none" w="med" len="med"/>
+                    </a:lnR>
+                  </a:tcPr>
+                </a:tc>
+                <a:tc>
+                  <a:txBody>
+                    <a:bodyPr/>
+                    <a:lstStyle/>
+                    <a:p>
+                      <a:pPr algn="ctr"/>
+                      <a:endParaRPr lang="it-IT" sz="1600">
+                        <a:latin typeface="Avenir Next LT Pro" panose="020B0504020202020204" pitchFamily="34" charset="0"/>
+                      </a:endParaRPr>
+                    </a:p>
+                  </a:txBody>
+                  <a:tcPr>
+                    <a:lnL w="12700" cap="flat" cmpd="sng" algn="ctr">
+                      <a:solidFill>
+                        <a:schemeClr val="tx1"/>
+                      </a:solidFill>
+                      <a:prstDash val="solid"/>
+                      <a:round/>
+                      <a:headEnd type="none" w="med" len="med"/>
+                      <a:tailEnd type="none" w="med" len="med"/>
+                    </a:lnL>
+                    <a:lnR w="12700" cap="flat" cmpd="sng" algn="ctr">
+                      <a:solidFill>
+                        <a:schemeClr val="tx1"/>
+                      </a:solidFill>
+                      <a:prstDash val="solid"/>
+                      <a:round/>
+                      <a:headEnd type="none" w="med" len="med"/>
+                      <a:tailEnd type="none" w="med" len="med"/>
+                    </a:lnR>
+                  </a:tcPr>
+                </a:tc>
+                <a:tc>
+                  <a:txBody>
+                    <a:bodyPr/>
+                    <a:lstStyle/>
+                    <a:p>
+                      <a:pPr algn="ctr"/>
+                      <a:r>
+                        <a:rPr lang="it-IT" sz="1600">
+                          <a:latin typeface="Avenir Next LT Pro" panose="020B0504020202020204" pitchFamily="34" charset="0"/>
+                        </a:rPr>
+                        <a:t>0.732/0.502</a:t>
+                      </a:r>
+                    </a:p>
+                  </a:txBody>
+                  <a:tcPr>
+                    <a:lnL w="12700" cap="flat" cmpd="sng" algn="ctr">
+                      <a:solidFill>
+                        <a:schemeClr val="tx1"/>
+                      </a:solidFill>
+                      <a:prstDash val="solid"/>
+                      <a:round/>
+                      <a:headEnd type="none" w="med" len="med"/>
+                      <a:tailEnd type="none" w="med" len="med"/>
+                    </a:lnL>
+                    <a:lnR w="12700" cap="flat" cmpd="sng" algn="ctr">
+                      <a:solidFill>
+                        <a:schemeClr val="tx1"/>
+                      </a:solidFill>
+                      <a:prstDash val="solid"/>
+                      <a:round/>
+                      <a:headEnd type="none" w="med" len="med"/>
+                      <a:tailEnd type="none" w="med" len="med"/>
+                    </a:lnR>
+                  </a:tcPr>
+                </a:tc>
+                <a:tc>
+                  <a:txBody>
+                    <a:bodyPr/>
+                    <a:lstStyle/>
+                    <a:p>
+                      <a:pPr algn="ctr"/>
+                      <a:endParaRPr lang="it-IT" sz="1600">
+                        <a:latin typeface="Avenir Next LT Pro" panose="020B0504020202020204" pitchFamily="34" charset="0"/>
+                      </a:endParaRPr>
+                    </a:p>
+                  </a:txBody>
+                  <a:tcPr>
+                    <a:lnL w="12700" cap="flat" cmpd="sng" algn="ctr">
+                      <a:solidFill>
+                        <a:schemeClr val="tx1"/>
+                      </a:solidFill>
+                      <a:prstDash val="solid"/>
+                      <a:round/>
+                      <a:headEnd type="none" w="med" len="med"/>
+                      <a:tailEnd type="none" w="med" len="med"/>
+                    </a:lnL>
+                    <a:lnR w="12700" cap="flat" cmpd="sng" algn="ctr">
+                      <a:solidFill>
+                        <a:schemeClr val="tx1"/>
+                      </a:solidFill>
+                      <a:prstDash val="solid"/>
+                      <a:round/>
+                      <a:headEnd type="none" w="med" len="med"/>
+                      <a:tailEnd type="none" w="med" len="med"/>
+                    </a:lnR>
+                  </a:tcPr>
+                </a:tc>
+                <a:tc>
+                  <a:txBody>
+                    <a:bodyPr/>
+                    <a:lstStyle/>
+                    <a:p>
+                      <a:pPr algn="ctr"/>
+                      <a:endParaRPr lang="it-IT" sz="1600">
+                        <a:latin typeface="Avenir Next LT Pro" panose="020B0504020202020204" pitchFamily="34" charset="0"/>
+                      </a:endParaRPr>
+                    </a:p>
+                  </a:txBody>
+                  <a:tcPr>
+                    <a:lnL w="12700" cap="flat" cmpd="sng" algn="ctr">
+                      <a:solidFill>
+                        <a:schemeClr val="tx1"/>
+                      </a:solidFill>
+                      <a:prstDash val="solid"/>
+                      <a:round/>
+                      <a:headEnd type="none" w="med" len="med"/>
+                      <a:tailEnd type="none" w="med" len="med"/>
+                    </a:lnL>
+                  </a:tcPr>
+                </a:tc>
+                <a:extLst>
+                  <a:ext uri="{0D108BD9-81ED-4DB2-BD59-A6C34878D82A}">
+                    <a16:rowId xmlns:a16="http://schemas.microsoft.com/office/drawing/2014/main" val="3341464040"/>
+                  </a:ext>
+                </a:extLst>
+              </a:tr>
+              <a:tr h="370840">
+                <a:tc>
+                  <a:txBody>
+                    <a:bodyPr/>
+                    <a:lstStyle/>
+                    <a:p>
+                      <a:r>
+                        <a:rPr lang="it-IT">
+                          <a:latin typeface="Bahnschrift SemiBold SemiConden" panose="020B0502040204020203" pitchFamily="34" charset="0"/>
+                        </a:rPr>
+                        <a:t>Random Forest</a:t>
+                      </a:r>
+                    </a:p>
+                  </a:txBody>
+                  <a:tcPr>
+                    <a:lnR w="12700" cap="flat" cmpd="sng" algn="ctr">
+                      <a:solidFill>
+                        <a:schemeClr val="tx1"/>
+                      </a:solidFill>
+                      <a:prstDash val="solid"/>
+                      <a:round/>
+                      <a:headEnd type="none" w="med" len="med"/>
+                      <a:tailEnd type="none" w="med" len="med"/>
+                    </a:lnR>
+                  </a:tcPr>
+                </a:tc>
+                <a:tc>
+                  <a:txBody>
+                    <a:bodyPr/>
+                    <a:lstStyle/>
+                    <a:p>
+                      <a:pPr algn="ctr"/>
+                      <a:endParaRPr lang="it-IT" sz="1600">
+                        <a:latin typeface="Avenir Next LT Pro" panose="020B0504020202020204" pitchFamily="34" charset="0"/>
+                      </a:endParaRPr>
+                    </a:p>
+                  </a:txBody>
+                  <a:tcPr>
+                    <a:lnL w="12700" cap="flat" cmpd="sng" algn="ctr">
+                      <a:solidFill>
+                        <a:schemeClr val="tx1"/>
+                      </a:solidFill>
+                      <a:prstDash val="solid"/>
+                      <a:round/>
+                      <a:headEnd type="none" w="med" len="med"/>
+                      <a:tailEnd type="none" w="med" len="med"/>
+                    </a:lnL>
+                    <a:lnR w="12700" cap="flat" cmpd="sng" algn="ctr">
+                      <a:solidFill>
+                        <a:schemeClr val="tx1"/>
+                      </a:solidFill>
+                      <a:prstDash val="solid"/>
+                      <a:round/>
+                      <a:headEnd type="none" w="med" len="med"/>
+                      <a:tailEnd type="none" w="med" len="med"/>
+                    </a:lnR>
+                  </a:tcPr>
+                </a:tc>
+                <a:tc>
+                  <a:txBody>
+                    <a:bodyPr/>
+                    <a:lstStyle/>
+                    <a:p>
+                      <a:pPr algn="ctr"/>
+                      <a:endParaRPr lang="it-IT" sz="1600">
+                        <a:latin typeface="Avenir Next LT Pro" panose="020B0504020202020204" pitchFamily="34" charset="0"/>
+                      </a:endParaRPr>
+                    </a:p>
+                  </a:txBody>
+                  <a:tcPr>
+                    <a:lnL w="12700" cap="flat" cmpd="sng" algn="ctr">
+                      <a:solidFill>
+                        <a:schemeClr val="tx1"/>
+                      </a:solidFill>
+                      <a:prstDash val="solid"/>
+                      <a:round/>
+                      <a:headEnd type="none" w="med" len="med"/>
+                      <a:tailEnd type="none" w="med" len="med"/>
+                    </a:lnL>
+                    <a:lnR w="12700" cap="flat" cmpd="sng" algn="ctr">
+                      <a:solidFill>
+                        <a:schemeClr val="tx1"/>
+                      </a:solidFill>
+                      <a:prstDash val="solid"/>
+                      <a:round/>
+                      <a:headEnd type="none" w="med" len="med"/>
+                      <a:tailEnd type="none" w="med" len="med"/>
+                    </a:lnR>
+                  </a:tcPr>
+                </a:tc>
+                <a:tc>
+                  <a:txBody>
+                    <a:bodyPr/>
+                    <a:lstStyle/>
+                    <a:p>
+                      <a:pPr algn="ctr"/>
+                      <a:endParaRPr lang="it-IT" sz="1600">
+                        <a:latin typeface="Avenir Next LT Pro" panose="020B0504020202020204" pitchFamily="34" charset="0"/>
+                      </a:endParaRPr>
+                    </a:p>
+                  </a:txBody>
+                  <a:tcPr>
+                    <a:lnL w="12700" cap="flat" cmpd="sng" algn="ctr">
+                      <a:solidFill>
+                        <a:schemeClr val="tx1"/>
+                      </a:solidFill>
+                      <a:prstDash val="solid"/>
+                      <a:round/>
+                      <a:headEnd type="none" w="med" len="med"/>
+                      <a:tailEnd type="none" w="med" len="med"/>
+                    </a:lnL>
+                    <a:lnR w="12700" cap="flat" cmpd="sng" algn="ctr">
+                      <a:solidFill>
+                        <a:schemeClr val="tx1"/>
+                      </a:solidFill>
+                      <a:prstDash val="solid"/>
+                      <a:round/>
+                      <a:headEnd type="none" w="med" len="med"/>
+                      <a:tailEnd type="none" w="med" len="med"/>
+                    </a:lnR>
+                  </a:tcPr>
+                </a:tc>
+                <a:tc>
+                  <a:txBody>
+                    <a:bodyPr/>
+                    <a:lstStyle/>
+                    <a:p>
+                      <a:pPr algn="ctr"/>
+                      <a:endParaRPr lang="it-IT" sz="1600">
+                        <a:latin typeface="Avenir Next LT Pro" panose="020B0504020202020204" pitchFamily="34" charset="0"/>
+                      </a:endParaRPr>
+                    </a:p>
+                  </a:txBody>
+                  <a:tcPr>
+                    <a:lnL w="12700" cap="flat" cmpd="sng" algn="ctr">
+                      <a:solidFill>
+                        <a:schemeClr val="tx1"/>
+                      </a:solidFill>
+                      <a:prstDash val="solid"/>
+                      <a:round/>
+                      <a:headEnd type="none" w="med" len="med"/>
+                      <a:tailEnd type="none" w="med" len="med"/>
+                    </a:lnL>
+                    <a:lnR w="12700" cap="flat" cmpd="sng" algn="ctr">
+                      <a:solidFill>
+                        <a:schemeClr val="tx1"/>
+                      </a:solidFill>
+                      <a:prstDash val="solid"/>
+                      <a:round/>
+                      <a:headEnd type="none" w="med" len="med"/>
+                      <a:tailEnd type="none" w="med" len="med"/>
+                    </a:lnR>
+                  </a:tcPr>
+                </a:tc>
+                <a:tc>
+                  <a:txBody>
+                    <a:bodyPr/>
+                    <a:lstStyle/>
+                    <a:p>
+                      <a:pPr algn="ctr"/>
+                      <a:endParaRPr lang="it-IT" sz="1600">
+                        <a:latin typeface="Avenir Next LT Pro" panose="020B0504020202020204" pitchFamily="34" charset="0"/>
+                      </a:endParaRPr>
+                    </a:p>
+                  </a:txBody>
+                  <a:tcPr>
+                    <a:lnL w="12700" cap="flat" cmpd="sng" algn="ctr">
+                      <a:solidFill>
+                        <a:schemeClr val="tx1"/>
+                      </a:solidFill>
+                      <a:prstDash val="solid"/>
+                      <a:round/>
+                      <a:headEnd type="none" w="med" len="med"/>
+                      <a:tailEnd type="none" w="med" len="med"/>
+                    </a:lnL>
+                    <a:lnR w="12700" cap="flat" cmpd="sng" algn="ctr">
+                      <a:solidFill>
+                        <a:schemeClr val="tx1"/>
+                      </a:solidFill>
+                      <a:prstDash val="solid"/>
+                      <a:round/>
+                      <a:headEnd type="none" w="med" len="med"/>
+                      <a:tailEnd type="none" w="med" len="med"/>
+                    </a:lnR>
+                  </a:tcPr>
+                </a:tc>
+                <a:tc>
+                  <a:txBody>
+                    <a:bodyPr/>
+                    <a:lstStyle/>
+                    <a:p>
+                      <a:pPr algn="ctr"/>
+                      <a:endParaRPr lang="it-IT" sz="1600">
+                        <a:latin typeface="Avenir Next LT Pro" panose="020B0504020202020204" pitchFamily="34" charset="0"/>
+                      </a:endParaRPr>
+                    </a:p>
+                  </a:txBody>
+                  <a:tcPr>
+                    <a:lnL w="12700" cap="flat" cmpd="sng" algn="ctr">
+                      <a:solidFill>
+                        <a:schemeClr val="tx1"/>
+                      </a:solidFill>
+                      <a:prstDash val="solid"/>
+                      <a:round/>
+                      <a:headEnd type="none" w="med" len="med"/>
+                      <a:tailEnd type="none" w="med" len="med"/>
+                    </a:lnL>
+                  </a:tcPr>
+                </a:tc>
+                <a:extLst>
+                  <a:ext uri="{0D108BD9-81ED-4DB2-BD59-A6C34878D82A}">
+                    <a16:rowId xmlns:a16="http://schemas.microsoft.com/office/drawing/2014/main" val="2466824742"/>
+                  </a:ext>
+                </a:extLst>
+              </a:tr>
+            </a:tbl>
+          </a:graphicData>
+        </a:graphic>
+      </p:graphicFrame>
+      <p:sp>
+        <p:nvSpPr>
+          <p:cNvPr id="9" name="CasellaDiTesto 8">
+            <a:extLst>
+              <a:ext uri="{FF2B5EF4-FFF2-40B4-BE49-F238E27FC236}">
+                <a16:creationId xmlns:a16="http://schemas.microsoft.com/office/drawing/2014/main" id="{E5DF370F-4775-4942-A08E-47F2C147807C}"/>
+              </a:ext>
+            </a:extLst>
+          </p:cNvPr>
+          <p:cNvSpPr txBox="1"/>
+          <p:nvPr/>
+        </p:nvSpPr>
+        <p:spPr>
+          <a:xfrm>
+            <a:off x="769650" y="4594163"/>
+            <a:ext cx="1799112" cy="461665"/>
+          </a:xfrm>
+          <a:prstGeom prst="rect">
+            <a:avLst/>
+          </a:prstGeom>
+          <a:noFill/>
+        </p:spPr>
+        <p:txBody>
+          <a:bodyPr wrap="square" rtlCol="0" anchor="ctr">
+            <a:spAutoFit/>
+          </a:bodyPr>
+          <a:lstStyle/>
+          <a:p>
+            <a:pPr algn="ctr"/>
+            <a:r>
+              <a:rPr lang="it-IT" sz="2400" b="1">
+                <a:solidFill>
+                  <a:schemeClr val="accent4">
+                    <a:lumMod val="60000"/>
+                    <a:lumOff val="40000"/>
+                  </a:schemeClr>
+                </a:solidFill>
+              </a:rPr>
+              <a:t>P/R</a:t>
+            </a:r>
+          </a:p>
+        </p:txBody>
+      </p:sp>
     </p:spTree>
     <p:extLst>
       <p:ext uri="{BB962C8B-B14F-4D97-AF65-F5344CB8AC3E}">
-        <p14:creationId xmlns:p14="http://schemas.microsoft.com/office/powerpoint/2010/main" val="745060227"/>
+        <p14:creationId xmlns:p14="http://schemas.microsoft.com/office/powerpoint/2010/main" val="2345042767"/>
       </p:ext>
     </p:extLst>
   </p:cSld>

</xml_diff>

<commit_message>
Update Notebook and Presentation and results
</commit_message>
<xml_diff>
--- a/presentation/fraudolent_transaction.pptx
+++ b/presentation/fraudolent_transaction.pptx
@@ -5,10 +5,10 @@
     <p:sldMasterId id="2147483672" r:id="rId1"/>
   </p:sldMasterIdLst>
   <p:notesMasterIdLst>
-    <p:notesMasterId r:id="rId15"/>
+    <p:notesMasterId r:id="rId16"/>
   </p:notesMasterIdLst>
   <p:handoutMasterIdLst>
-    <p:handoutMasterId r:id="rId16"/>
+    <p:handoutMasterId r:id="rId17"/>
   </p:handoutMasterIdLst>
   <p:sldIdLst>
     <p:sldId id="256" r:id="rId2"/>
@@ -21,9 +21,10 @@
     <p:sldId id="268" r:id="rId9"/>
     <p:sldId id="269" r:id="rId10"/>
     <p:sldId id="270" r:id="rId11"/>
-    <p:sldId id="271" r:id="rId12"/>
-    <p:sldId id="272" r:id="rId13"/>
-    <p:sldId id="274" r:id="rId14"/>
+    <p:sldId id="276" r:id="rId12"/>
+    <p:sldId id="275" r:id="rId13"/>
+    <p:sldId id="272" r:id="rId14"/>
+    <p:sldId id="274" r:id="rId15"/>
   </p:sldIdLst>
   <p:sldSz cx="12192000" cy="6858000"/>
   <p:notesSz cx="6858000" cy="9144000"/>
@@ -31658,6 +31659,695 @@
           <p:cNvPr id="2" name="Titolo 1">
             <a:extLst>
               <a:ext uri="{FF2B5EF4-FFF2-40B4-BE49-F238E27FC236}">
+                <a16:creationId xmlns:a16="http://schemas.microsoft.com/office/drawing/2014/main" id="{2D4F70C5-0703-4DD4-BA30-EC5493220F65}"/>
+              </a:ext>
+            </a:extLst>
+          </p:cNvPr>
+          <p:cNvSpPr>
+            <a:spLocks noGrp="1"/>
+          </p:cNvSpPr>
+          <p:nvPr>
+            <p:ph type="title"/>
+          </p:nvPr>
+        </p:nvSpPr>
+        <p:spPr>
+          <a:xfrm>
+            <a:off x="581192" y="5262296"/>
+            <a:ext cx="5291156" cy="689514"/>
+          </a:xfrm>
+        </p:spPr>
+        <p:txBody>
+          <a:bodyPr>
+            <a:noAutofit/>
+          </a:bodyPr>
+          <a:lstStyle/>
+          <a:p>
+            <a:r>
+              <a:rPr lang="it-IT" sz="2800"/>
+              <a:t>		</a:t>
+            </a:r>
+            <a:r>
+              <a:rPr lang="it-IT" sz="2800">
+                <a:solidFill>
+                  <a:schemeClr val="bg1"/>
+                </a:solidFill>
+              </a:rPr>
+              <a:t>.2 – TRAIN OVERSAMPLER</a:t>
+            </a:r>
+            <a:endParaRPr lang="it-IT" sz="2800"/>
+          </a:p>
+        </p:txBody>
+      </p:sp>
+      <p:grpSp>
+        <p:nvGrpSpPr>
+          <p:cNvPr id="5" name="Gruppo 4">
+            <a:extLst>
+              <a:ext uri="{FF2B5EF4-FFF2-40B4-BE49-F238E27FC236}">
+                <a16:creationId xmlns:a16="http://schemas.microsoft.com/office/drawing/2014/main" id="{6119A0C5-EF17-40FD-A973-25BD252D8628}"/>
+              </a:ext>
+            </a:extLst>
+          </p:cNvPr>
+          <p:cNvGrpSpPr/>
+          <p:nvPr/>
+        </p:nvGrpSpPr>
+        <p:grpSpPr>
+          <a:xfrm rot="10800000">
+            <a:off x="673890" y="5014562"/>
+            <a:ext cx="719101" cy="1242237"/>
+            <a:chOff x="1" y="13513"/>
+            <a:chExt cx="602970" cy="861385"/>
+          </a:xfrm>
+        </p:grpSpPr>
+        <p:sp>
+          <p:nvSpPr>
+            <p:cNvPr id="6" name="Freccia a gallone 5">
+              <a:extLst>
+                <a:ext uri="{FF2B5EF4-FFF2-40B4-BE49-F238E27FC236}">
+                  <a16:creationId xmlns:a16="http://schemas.microsoft.com/office/drawing/2014/main" id="{B656033D-4A78-440D-A14A-24A8ACA038DC}"/>
+                </a:ext>
+              </a:extLst>
+            </p:cNvPr>
+            <p:cNvSpPr/>
+            <p:nvPr/>
+          </p:nvSpPr>
+          <p:spPr>
+            <a:xfrm rot="5400000">
+              <a:off x="-129207" y="142721"/>
+              <a:ext cx="861385" cy="602970"/>
+            </a:xfrm>
+            <a:prstGeom prst="chevron">
+              <a:avLst/>
+            </a:prstGeom>
+            <a:solidFill>
+              <a:schemeClr val="bg1"/>
+            </a:solidFill>
+          </p:spPr>
+          <p:style>
+            <a:lnRef idx="2">
+              <a:schemeClr val="accent1">
+                <a:hueOff val="0"/>
+                <a:satOff val="0"/>
+                <a:lumOff val="0"/>
+                <a:alphaOff val="0"/>
+              </a:schemeClr>
+            </a:lnRef>
+            <a:fillRef idx="1">
+              <a:schemeClr val="accent1">
+                <a:hueOff val="0"/>
+                <a:satOff val="0"/>
+                <a:lumOff val="0"/>
+                <a:alphaOff val="0"/>
+              </a:schemeClr>
+            </a:fillRef>
+            <a:effectRef idx="0">
+              <a:schemeClr val="accent1">
+                <a:hueOff val="0"/>
+                <a:satOff val="0"/>
+                <a:lumOff val="0"/>
+                <a:alphaOff val="0"/>
+              </a:schemeClr>
+            </a:effectRef>
+            <a:fontRef idx="minor">
+              <a:schemeClr val="lt1"/>
+            </a:fontRef>
+          </p:style>
+        </p:sp>
+        <p:sp>
+          <p:nvSpPr>
+            <p:cNvPr id="7" name="Freccia a gallone 4">
+              <a:extLst>
+                <a:ext uri="{FF2B5EF4-FFF2-40B4-BE49-F238E27FC236}">
+                  <a16:creationId xmlns:a16="http://schemas.microsoft.com/office/drawing/2014/main" id="{0245AF58-447A-432E-B276-739487AF3B49}"/>
+                </a:ext>
+              </a:extLst>
+            </p:cNvPr>
+            <p:cNvSpPr txBox="1"/>
+            <p:nvPr/>
+          </p:nvSpPr>
+          <p:spPr>
+            <a:xfrm rot="10800000">
+              <a:off x="1" y="334849"/>
+              <a:ext cx="602970" cy="258415"/>
+            </a:xfrm>
+            <a:prstGeom prst="rect">
+              <a:avLst/>
+            </a:prstGeom>
+          </p:spPr>
+          <p:style>
+            <a:lnRef idx="0">
+              <a:scrgbClr r="0" g="0" b="0"/>
+            </a:lnRef>
+            <a:fillRef idx="0">
+              <a:scrgbClr r="0" g="0" b="0"/>
+            </a:fillRef>
+            <a:effectRef idx="0">
+              <a:scrgbClr r="0" g="0" b="0"/>
+            </a:effectRef>
+            <a:fontRef idx="minor">
+              <a:schemeClr val="lt1"/>
+            </a:fontRef>
+          </p:style>
+          <p:txBody>
+            <a:bodyPr spcFirstLastPara="0" vert="horz" wrap="square" lIns="10795" tIns="10795" rIns="10795" bIns="10795" numCol="1" spcCol="1270" anchor="ctr" anchorCtr="0">
+              <a:noAutofit/>
+            </a:bodyPr>
+            <a:lstStyle/>
+            <a:p>
+              <a:pPr marL="0" lvl="0" indent="0" algn="ctr" defTabSz="755650">
+                <a:lnSpc>
+                  <a:spcPct val="90000"/>
+                </a:lnSpc>
+                <a:spcBef>
+                  <a:spcPct val="0"/>
+                </a:spcBef>
+                <a:spcAft>
+                  <a:spcPct val="35000"/>
+                </a:spcAft>
+                <a:buNone/>
+              </a:pPr>
+              <a:r>
+                <a:rPr lang="it-IT" sz="2800">
+                  <a:solidFill>
+                    <a:schemeClr val="accent1"/>
+                  </a:solidFill>
+                  <a:latin typeface="+mj-lt"/>
+                </a:rPr>
+                <a:t>4</a:t>
+              </a:r>
+              <a:endParaRPr lang="it-IT" sz="2800" kern="1200">
+                <a:solidFill>
+                  <a:schemeClr val="accent1"/>
+                </a:solidFill>
+                <a:latin typeface="+mj-lt"/>
+              </a:endParaRPr>
+            </a:p>
+          </p:txBody>
+        </p:sp>
+      </p:grpSp>
+      <p:sp>
+        <p:nvSpPr>
+          <p:cNvPr id="8" name="Segnaposto contenuto 2">
+            <a:extLst>
+              <a:ext uri="{FF2B5EF4-FFF2-40B4-BE49-F238E27FC236}">
+                <a16:creationId xmlns:a16="http://schemas.microsoft.com/office/drawing/2014/main" id="{0C24FC21-C61C-42B5-A6B3-BA315C920B0A}"/>
+              </a:ext>
+            </a:extLst>
+          </p:cNvPr>
+          <p:cNvSpPr txBox="1">
+            <a:spLocks/>
+          </p:cNvSpPr>
+          <p:nvPr/>
+        </p:nvSpPr>
+        <p:spPr>
+          <a:xfrm>
+            <a:off x="694061" y="831273"/>
+            <a:ext cx="10795316" cy="3936670"/>
+          </a:xfrm>
+          <a:prstGeom prst="rect">
+            <a:avLst/>
+          </a:prstGeom>
+        </p:spPr>
+        <p:txBody>
+          <a:bodyPr vert="horz" lIns="91440" tIns="45720" rIns="91440" bIns="45720" rtlCol="0" anchor="ctr">
+            <a:normAutofit/>
+          </a:bodyPr>
+          <a:lstStyle>
+            <a:lvl1pPr marL="306000" indent="-306000" algn="l" defTabSz="457200" rtl="0" eaLnBrk="1" latinLnBrk="0" hangingPunct="1">
+              <a:spcBef>
+                <a:spcPct val="20000"/>
+              </a:spcBef>
+              <a:spcAft>
+                <a:spcPts val="600"/>
+              </a:spcAft>
+              <a:buClr>
+                <a:schemeClr val="accent2"/>
+              </a:buClr>
+              <a:buSzPct val="92000"/>
+              <a:buFont typeface="Wingdings 2" panose="05020102010507070707" pitchFamily="18" charset="2"/>
+              <a:buChar char=""/>
+              <a:defRPr sz="1800" kern="1200">
+                <a:solidFill>
+                  <a:schemeClr val="tx2"/>
+                </a:solidFill>
+                <a:latin typeface="+mn-lt"/>
+                <a:ea typeface="+mn-ea"/>
+                <a:cs typeface="+mn-cs"/>
+              </a:defRPr>
+            </a:lvl1pPr>
+            <a:lvl2pPr marL="630000" indent="-306000" algn="l" defTabSz="457200" rtl="0" eaLnBrk="1" latinLnBrk="0" hangingPunct="1">
+              <a:spcBef>
+                <a:spcPct val="20000"/>
+              </a:spcBef>
+              <a:spcAft>
+                <a:spcPts val="600"/>
+              </a:spcAft>
+              <a:buClr>
+                <a:schemeClr val="accent2"/>
+              </a:buClr>
+              <a:buSzPct val="92000"/>
+              <a:buFont typeface="Wingdings 2" panose="05020102010507070707" pitchFamily="18" charset="2"/>
+              <a:buChar char=""/>
+              <a:defRPr sz="1600" kern="1200">
+                <a:solidFill>
+                  <a:schemeClr val="tx2"/>
+                </a:solidFill>
+                <a:latin typeface="+mn-lt"/>
+                <a:ea typeface="+mn-ea"/>
+                <a:cs typeface="+mn-cs"/>
+              </a:defRPr>
+            </a:lvl2pPr>
+            <a:lvl3pPr marL="900000" indent="-270000" algn="l" defTabSz="457200" rtl="0" eaLnBrk="1" latinLnBrk="0" hangingPunct="1">
+              <a:spcBef>
+                <a:spcPct val="20000"/>
+              </a:spcBef>
+              <a:spcAft>
+                <a:spcPts val="600"/>
+              </a:spcAft>
+              <a:buClr>
+                <a:schemeClr val="accent2"/>
+              </a:buClr>
+              <a:buSzPct val="92000"/>
+              <a:buFont typeface="Wingdings 2" panose="05020102010507070707" pitchFamily="18" charset="2"/>
+              <a:buChar char=""/>
+              <a:defRPr sz="1400" kern="1200">
+                <a:solidFill>
+                  <a:schemeClr val="tx2"/>
+                </a:solidFill>
+                <a:latin typeface="+mn-lt"/>
+                <a:ea typeface="+mn-ea"/>
+                <a:cs typeface="+mn-cs"/>
+              </a:defRPr>
+            </a:lvl3pPr>
+            <a:lvl4pPr marL="1242000" indent="-234000" algn="l" defTabSz="457200" rtl="0" eaLnBrk="1" latinLnBrk="0" hangingPunct="1">
+              <a:spcBef>
+                <a:spcPct val="20000"/>
+              </a:spcBef>
+              <a:spcAft>
+                <a:spcPts val="600"/>
+              </a:spcAft>
+              <a:buClr>
+                <a:schemeClr val="accent2"/>
+              </a:buClr>
+              <a:buSzPct val="92000"/>
+              <a:buFont typeface="Wingdings 2" panose="05020102010507070707" pitchFamily="18" charset="2"/>
+              <a:buChar char=""/>
+              <a:defRPr sz="1200" kern="1200">
+                <a:solidFill>
+                  <a:schemeClr val="tx2"/>
+                </a:solidFill>
+                <a:latin typeface="+mn-lt"/>
+                <a:ea typeface="+mn-ea"/>
+                <a:cs typeface="+mn-cs"/>
+              </a:defRPr>
+            </a:lvl4pPr>
+            <a:lvl5pPr marL="1602000" indent="-234000" algn="l" defTabSz="457200" rtl="0" eaLnBrk="1" latinLnBrk="0" hangingPunct="1">
+              <a:spcBef>
+                <a:spcPct val="20000"/>
+              </a:spcBef>
+              <a:spcAft>
+                <a:spcPts val="600"/>
+              </a:spcAft>
+              <a:buClr>
+                <a:schemeClr val="accent2"/>
+              </a:buClr>
+              <a:buSzPct val="92000"/>
+              <a:buFont typeface="Wingdings 2" panose="05020102010507070707" pitchFamily="18" charset="2"/>
+              <a:buChar char=""/>
+              <a:defRPr sz="1200" kern="1200">
+                <a:solidFill>
+                  <a:schemeClr val="tx2"/>
+                </a:solidFill>
+                <a:latin typeface="+mn-lt"/>
+                <a:ea typeface="+mn-ea"/>
+                <a:cs typeface="+mn-cs"/>
+              </a:defRPr>
+            </a:lvl5pPr>
+            <a:lvl6pPr marL="1900000" indent="-228600" algn="l" defTabSz="457200" rtl="0" eaLnBrk="1" latinLnBrk="0" hangingPunct="1">
+              <a:spcBef>
+                <a:spcPct val="20000"/>
+              </a:spcBef>
+              <a:spcAft>
+                <a:spcPts val="600"/>
+              </a:spcAft>
+              <a:buClr>
+                <a:schemeClr val="accent2"/>
+              </a:buClr>
+              <a:buSzPct val="92000"/>
+              <a:buFont typeface="Wingdings 2" panose="05020102010507070707" pitchFamily="18" charset="2"/>
+              <a:buChar char=""/>
+              <a:defRPr sz="1200" kern="1200">
+                <a:solidFill>
+                  <a:schemeClr val="tx2"/>
+                </a:solidFill>
+                <a:latin typeface="+mn-lt"/>
+                <a:ea typeface="+mn-ea"/>
+                <a:cs typeface="+mn-cs"/>
+              </a:defRPr>
+            </a:lvl6pPr>
+            <a:lvl7pPr marL="2200000" indent="-228600" algn="l" defTabSz="457200" rtl="0" eaLnBrk="1" latinLnBrk="0" hangingPunct="1">
+              <a:spcBef>
+                <a:spcPct val="20000"/>
+              </a:spcBef>
+              <a:spcAft>
+                <a:spcPts val="600"/>
+              </a:spcAft>
+              <a:buClr>
+                <a:schemeClr val="accent2"/>
+              </a:buClr>
+              <a:buSzPct val="92000"/>
+              <a:buFont typeface="Wingdings 2" panose="05020102010507070707" pitchFamily="18" charset="2"/>
+              <a:buChar char=""/>
+              <a:defRPr sz="1200" kern="1200">
+                <a:solidFill>
+                  <a:schemeClr val="tx2"/>
+                </a:solidFill>
+                <a:latin typeface="+mn-lt"/>
+                <a:ea typeface="+mn-ea"/>
+                <a:cs typeface="+mn-cs"/>
+              </a:defRPr>
+            </a:lvl7pPr>
+            <a:lvl8pPr marL="2500000" indent="-228600" algn="l" defTabSz="457200" rtl="0" eaLnBrk="1" latinLnBrk="0" hangingPunct="1">
+              <a:spcBef>
+                <a:spcPct val="20000"/>
+              </a:spcBef>
+              <a:spcAft>
+                <a:spcPts val="600"/>
+              </a:spcAft>
+              <a:buClr>
+                <a:schemeClr val="accent2"/>
+              </a:buClr>
+              <a:buSzPct val="92000"/>
+              <a:buFont typeface="Wingdings 2" panose="05020102010507070707" pitchFamily="18" charset="2"/>
+              <a:buChar char=""/>
+              <a:defRPr sz="1200" kern="1200">
+                <a:solidFill>
+                  <a:schemeClr val="tx2"/>
+                </a:solidFill>
+                <a:latin typeface="+mn-lt"/>
+                <a:ea typeface="+mn-ea"/>
+                <a:cs typeface="+mn-cs"/>
+              </a:defRPr>
+            </a:lvl8pPr>
+            <a:lvl9pPr marL="2800000" indent="-228600" algn="l" defTabSz="457200" rtl="0" eaLnBrk="1" latinLnBrk="0" hangingPunct="1">
+              <a:spcBef>
+                <a:spcPct val="20000"/>
+              </a:spcBef>
+              <a:spcAft>
+                <a:spcPts val="600"/>
+              </a:spcAft>
+              <a:buClr>
+                <a:schemeClr val="accent2"/>
+              </a:buClr>
+              <a:buSzPct val="92000"/>
+              <a:buFont typeface="Wingdings 2" panose="05020102010507070707" pitchFamily="18" charset="2"/>
+              <a:buChar char=""/>
+              <a:defRPr sz="1200" kern="1200">
+                <a:solidFill>
+                  <a:schemeClr val="tx2"/>
+                </a:solidFill>
+                <a:latin typeface="+mn-lt"/>
+                <a:ea typeface="+mn-ea"/>
+                <a:cs typeface="+mn-cs"/>
+              </a:defRPr>
+            </a:lvl9pPr>
+          </a:lstStyle>
+          <a:p>
+            <a:r>
+              <a:rPr lang="it-IT">
+                <a:solidFill>
+                  <a:schemeClr val="tx1"/>
+                </a:solidFill>
+              </a:rPr>
+              <a:t>After the stratified sampling, the train dataset was </a:t>
+            </a:r>
+            <a:r>
+              <a:rPr lang="it-IT">
+                <a:solidFill>
+                  <a:schemeClr val="accent2"/>
+                </a:solidFill>
+              </a:rPr>
+              <a:t>still highly unbalanced</a:t>
+            </a:r>
+          </a:p>
+          <a:p>
+            <a:r>
+              <a:rPr lang="it-IT">
+                <a:solidFill>
+                  <a:schemeClr val="tx1"/>
+                </a:solidFill>
+              </a:rPr>
+              <a:t>We have </a:t>
+            </a:r>
+            <a:r>
+              <a:rPr lang="it-IT">
+                <a:solidFill>
+                  <a:schemeClr val="accent4"/>
+                </a:solidFill>
+              </a:rPr>
+              <a:t>342530</a:t>
+            </a:r>
+            <a:r>
+              <a:rPr lang="it-IT">
+                <a:solidFill>
+                  <a:schemeClr val="tx1"/>
+                </a:solidFill>
+              </a:rPr>
+              <a:t> of 0s and </a:t>
+            </a:r>
+            <a:r>
+              <a:rPr lang="it-IT">
+                <a:solidFill>
+                  <a:schemeClr val="accent4"/>
+                </a:solidFill>
+              </a:rPr>
+              <a:t>14511</a:t>
+            </a:r>
+            <a:r>
+              <a:rPr lang="it-IT">
+                <a:solidFill>
+                  <a:schemeClr val="tx1"/>
+                </a:solidFill>
+              </a:rPr>
+              <a:t> of 1s. </a:t>
+            </a:r>
+          </a:p>
+          <a:p>
+            <a:r>
+              <a:rPr lang="it-IT">
+                <a:solidFill>
+                  <a:schemeClr val="tx1"/>
+                </a:solidFill>
+              </a:rPr>
+              <a:t>I decided to apply </a:t>
+            </a:r>
+            <a:r>
+              <a:rPr lang="it-IT">
+                <a:solidFill>
+                  <a:schemeClr val="accent2"/>
+                </a:solidFill>
+              </a:rPr>
+              <a:t>oversampling</a:t>
+            </a:r>
+            <a:r>
+              <a:rPr lang="it-IT">
+                <a:solidFill>
+                  <a:schemeClr val="tx1"/>
+                </a:solidFill>
+              </a:rPr>
+              <a:t> on the train set</a:t>
+            </a:r>
+          </a:p>
+          <a:p>
+            <a:pPr lvl="1"/>
+            <a:r>
+              <a:rPr lang="it-IT">
+                <a:solidFill>
+                  <a:schemeClr val="tx1"/>
+                </a:solidFill>
+              </a:rPr>
+              <a:t>After this I had 342530 of equal entries for fraudolent transactions</a:t>
+            </a:r>
+          </a:p>
+          <a:p>
+            <a:pPr lvl="1"/>
+            <a:r>
+              <a:rPr lang="it-IT">
+                <a:solidFill>
+                  <a:schemeClr val="tx1"/>
+                </a:solidFill>
+              </a:rPr>
+              <a:t>I decided to keep only the </a:t>
+            </a:r>
+            <a:r>
+              <a:rPr lang="it-IT">
+                <a:solidFill>
+                  <a:schemeClr val="accent2"/>
+                </a:solidFill>
+              </a:rPr>
+              <a:t>60%</a:t>
+            </a:r>
+            <a:r>
+              <a:rPr lang="it-IT">
+                <a:solidFill>
+                  <a:schemeClr val="tx1"/>
+                </a:solidFill>
+              </a:rPr>
+              <a:t> of them</a:t>
+            </a:r>
+          </a:p>
+          <a:p>
+            <a:pPr lvl="1"/>
+            <a:r>
+              <a:rPr lang="it-IT">
+                <a:solidFill>
+                  <a:schemeClr val="tx1"/>
+                </a:solidFill>
+              </a:rPr>
+              <a:t>That because, keeping all of them, I obtained a high number of False Positive</a:t>
+            </a:r>
+          </a:p>
+          <a:p>
+            <a:pPr lvl="1"/>
+            <a:r>
+              <a:rPr lang="it-IT">
+                <a:solidFill>
+                  <a:schemeClr val="tx1"/>
+                </a:solidFill>
+              </a:rPr>
+              <a:t>A high number of non fraduolent have been classified as fraduolent</a:t>
+            </a:r>
+          </a:p>
+          <a:p>
+            <a:r>
+              <a:rPr lang="it-IT">
+                <a:solidFill>
+                  <a:schemeClr val="tx1"/>
+                </a:solidFill>
+              </a:rPr>
+              <a:t>Finally, the train set contains </a:t>
+            </a:r>
+            <a:r>
+              <a:rPr lang="it-IT">
+                <a:solidFill>
+                  <a:schemeClr val="accent2"/>
+                </a:solidFill>
+              </a:rPr>
+              <a:t>63.3%</a:t>
+            </a:r>
+            <a:r>
+              <a:rPr lang="it-IT">
+                <a:solidFill>
+                  <a:schemeClr val="tx1"/>
+                </a:solidFill>
+              </a:rPr>
+              <a:t> of non fraud and </a:t>
+            </a:r>
+            <a:r>
+              <a:rPr lang="it-IT">
+                <a:solidFill>
+                  <a:schemeClr val="accent2"/>
+                </a:solidFill>
+              </a:rPr>
+              <a:t>36.7%</a:t>
+            </a:r>
+            <a:r>
+              <a:rPr lang="it-IT">
+                <a:solidFill>
+                  <a:schemeClr val="tx1"/>
+                </a:solidFill>
+              </a:rPr>
+              <a:t> of fraudolent</a:t>
+            </a:r>
+          </a:p>
+        </p:txBody>
+      </p:sp>
+    </p:spTree>
+    <p:extLst>
+      <p:ext uri="{BB962C8B-B14F-4D97-AF65-F5344CB8AC3E}">
+        <p14:creationId xmlns:p14="http://schemas.microsoft.com/office/powerpoint/2010/main" val="3464525255"/>
+      </p:ext>
+    </p:extLst>
+  </p:cSld>
+  <p:clrMapOvr>
+    <a:masterClrMapping/>
+  </p:clrMapOvr>
+</p:sld>
+</file>
+
+<file path=ppt/slides/slide12.xml><?xml version="1.0" encoding="utf-8"?>
+<p:sld xmlns:a="http://schemas.openxmlformats.org/drawingml/2006/main" xmlns:r="http://schemas.openxmlformats.org/officeDocument/2006/relationships" xmlns:p="http://schemas.openxmlformats.org/presentationml/2006/main">
+  <p:cSld>
+    <p:spTree>
+      <p:nvGrpSpPr>
+        <p:cNvPr id="1" name=""/>
+        <p:cNvGrpSpPr/>
+        <p:nvPr/>
+      </p:nvGrpSpPr>
+      <p:grpSpPr>
+        <a:xfrm>
+          <a:off x="0" y="0"/>
+          <a:ext cx="0" cy="0"/>
+          <a:chOff x="0" y="0"/>
+          <a:chExt cx="0" cy="0"/>
+        </a:xfrm>
+      </p:grpSpPr>
+      <p:sp>
+        <p:nvSpPr>
+          <p:cNvPr id="3" name="Rettangolo 2">
+            <a:extLst>
+              <a:ext uri="{FF2B5EF4-FFF2-40B4-BE49-F238E27FC236}">
+                <a16:creationId xmlns:a16="http://schemas.microsoft.com/office/drawing/2014/main" id="{E3F5E95F-DA22-4670-A8EC-03CBA1B02BF4}"/>
+              </a:ext>
+            </a:extLst>
+          </p:cNvPr>
+          <p:cNvSpPr/>
+          <p:nvPr/>
+        </p:nvSpPr>
+        <p:spPr>
+          <a:xfrm>
+            <a:off x="3431969" y="1377541"/>
+            <a:ext cx="2232560" cy="2927246"/>
+          </a:xfrm>
+          <a:prstGeom prst="rect">
+            <a:avLst/>
+          </a:prstGeom>
+          <a:solidFill>
+            <a:schemeClr val="accent1">
+              <a:lumMod val="20000"/>
+              <a:lumOff val="80000"/>
+            </a:schemeClr>
+          </a:solidFill>
+        </p:spPr>
+        <p:style>
+          <a:lnRef idx="2">
+            <a:schemeClr val="accent1">
+              <a:shade val="50000"/>
+            </a:schemeClr>
+          </a:lnRef>
+          <a:fillRef idx="1">
+            <a:schemeClr val="accent1"/>
+          </a:fillRef>
+          <a:effectRef idx="0">
+            <a:schemeClr val="accent1"/>
+          </a:effectRef>
+          <a:fontRef idx="minor">
+            <a:schemeClr val="lt1"/>
+          </a:fontRef>
+        </p:style>
+        <p:txBody>
+          <a:bodyPr rtlCol="0" anchor="ctr"/>
+          <a:lstStyle/>
+          <a:p>
+            <a:pPr algn="ctr"/>
+            <a:endParaRPr lang="it-IT"/>
+          </a:p>
+        </p:txBody>
+      </p:sp>
+      <p:sp>
+        <p:nvSpPr>
+          <p:cNvPr id="2" name="Titolo 1">
+            <a:extLst>
+              <a:ext uri="{FF2B5EF4-FFF2-40B4-BE49-F238E27FC236}">
                 <a16:creationId xmlns:a16="http://schemas.microsoft.com/office/drawing/2014/main" id="{5FEF2863-AA48-4673-8804-50CEE9FC5429}"/>
               </a:ext>
             </a:extLst>
@@ -31686,7 +32376,7 @@
                   <a:schemeClr val="bg1"/>
                 </a:solidFill>
               </a:rPr>
-              <a:t>.2 - EXPERIMENTS</a:t>
+              <a:t>.3 - EXPERIMENTS</a:t>
             </a:r>
             <a:endParaRPr lang="it-IT" sz="2800"/>
           </a:p>
@@ -31851,13 +32541,13 @@
           <p:nvPr>
             <p:extLst>
               <p:ext uri="{D42A27DB-BD31-4B8C-83A1-F6EECF244321}">
-                <p14:modId xmlns:p14="http://schemas.microsoft.com/office/powerpoint/2010/main" val="1037905414"/>
+                <p14:modId xmlns:p14="http://schemas.microsoft.com/office/powerpoint/2010/main" val="3195044803"/>
               </p:ext>
             </p:extLst>
           </p:nvPr>
         </p:nvGraphicFramePr>
         <p:xfrm>
-          <a:off x="2020129" y="1174319"/>
+          <a:off x="2020129" y="990253"/>
           <a:ext cx="4036290" cy="3219276"/>
         </p:xfrm>
         <a:graphic>
@@ -31880,7 +32570,7 @@
         </p:nvCxnSpPr>
         <p:spPr>
           <a:xfrm>
-            <a:off x="5563591" y="2006938"/>
+            <a:off x="5563591" y="1822872"/>
             <a:ext cx="216000" cy="0"/>
           </a:xfrm>
           <a:prstGeom prst="line">
@@ -31916,7 +32606,7 @@
         </p:nvCxnSpPr>
         <p:spPr>
           <a:xfrm>
-            <a:off x="5563591" y="2836230"/>
+            <a:off x="5563591" y="2652164"/>
             <a:ext cx="216000" cy="0"/>
           </a:xfrm>
           <a:prstGeom prst="line">
@@ -31952,7 +32642,7 @@
         </p:nvCxnSpPr>
         <p:spPr>
           <a:xfrm>
-            <a:off x="5574608" y="3625936"/>
+            <a:off x="5574608" y="3441870"/>
             <a:ext cx="216000" cy="0"/>
           </a:xfrm>
           <a:prstGeom prst="line">
@@ -31990,7 +32680,7 @@
         </p:nvCxnSpPr>
         <p:spPr>
           <a:xfrm>
-            <a:off x="5790608" y="2006938"/>
+            <a:off x="5790608" y="1822872"/>
             <a:ext cx="0" cy="1618998"/>
           </a:xfrm>
           <a:prstGeom prst="line">
@@ -32029,7 +32719,7 @@
         </p:nvCxnSpPr>
         <p:spPr>
           <a:xfrm flipV="1">
-            <a:off x="5790608" y="2008914"/>
+            <a:off x="5790608" y="1824848"/>
             <a:ext cx="1118854" cy="2"/>
           </a:xfrm>
           <a:prstGeom prst="line">
@@ -32065,7 +32755,7 @@
         </p:nvGrpSpPr>
         <p:grpSpPr>
           <a:xfrm rot="5400000">
-            <a:off x="8015058" y="597487"/>
+            <a:off x="8015058" y="413421"/>
             <a:ext cx="611663" cy="2822855"/>
             <a:chOff x="508562" y="198210"/>
             <a:chExt cx="611663" cy="2822855"/>
@@ -32202,7 +32892,7 @@
         </p:nvGrpSpPr>
         <p:grpSpPr>
           <a:xfrm rot="5400000">
-            <a:off x="8015058" y="1717941"/>
+            <a:off x="8015058" y="1533875"/>
             <a:ext cx="611662" cy="2822854"/>
             <a:chOff x="508563" y="198210"/>
             <a:chExt cx="611662" cy="2822854"/>
@@ -32341,7 +33031,7 @@
         </p:nvCxnSpPr>
         <p:spPr>
           <a:xfrm rot="16200000" flipH="1">
-            <a:off x="6069521" y="2289427"/>
+            <a:off x="6069521" y="2105361"/>
             <a:ext cx="1120454" cy="559427"/>
           </a:xfrm>
           <a:prstGeom prst="bentConnector2">
@@ -32363,10 +33053,207 @@
           </a:fontRef>
         </p:style>
       </p:cxnSp>
+      <p:sp>
+        <p:nvSpPr>
+          <p:cNvPr id="4" name="CasellaDiTesto 3">
+            <a:extLst>
+              <a:ext uri="{FF2B5EF4-FFF2-40B4-BE49-F238E27FC236}">
+                <a16:creationId xmlns:a16="http://schemas.microsoft.com/office/drawing/2014/main" id="{FC69B3F9-0932-459C-BE53-335C62A5A88E}"/>
+              </a:ext>
+            </a:extLst>
+          </p:cNvPr>
+          <p:cNvSpPr txBox="1"/>
+          <p:nvPr/>
+        </p:nvSpPr>
+        <p:spPr>
+          <a:xfrm>
+            <a:off x="3901048" y="3900667"/>
+            <a:ext cx="1246905" cy="338554"/>
+          </a:xfrm>
+          <a:prstGeom prst="rect">
+            <a:avLst/>
+          </a:prstGeom>
+          <a:noFill/>
+        </p:spPr>
+        <p:txBody>
+          <a:bodyPr wrap="square" rtlCol="0">
+            <a:spAutoFit/>
+          </a:bodyPr>
+          <a:lstStyle/>
+          <a:p>
+            <a:r>
+              <a:rPr lang="it-IT" sz="1600">
+                <a:solidFill>
+                  <a:schemeClr val="accent1"/>
+                </a:solidFill>
+              </a:rPr>
+              <a:t>oversampled</a:t>
+            </a:r>
+          </a:p>
+        </p:txBody>
+      </p:sp>
+      <p:cxnSp>
+        <p:nvCxnSpPr>
+          <p:cNvPr id="10" name="Connettore diritto 9">
+            <a:extLst>
+              <a:ext uri="{FF2B5EF4-FFF2-40B4-BE49-F238E27FC236}">
+                <a16:creationId xmlns:a16="http://schemas.microsoft.com/office/drawing/2014/main" id="{F3E6A89E-74BB-43BD-A4B3-47D1A1C60981}"/>
+              </a:ext>
+            </a:extLst>
+          </p:cNvPr>
+          <p:cNvCxnSpPr>
+            <a:cxnSpLocks/>
+          </p:cNvCxnSpPr>
+          <p:nvPr/>
+        </p:nvCxnSpPr>
+        <p:spPr>
+          <a:xfrm>
+            <a:off x="3340659" y="3429994"/>
+            <a:ext cx="0" cy="634012"/>
+          </a:xfrm>
+          <a:prstGeom prst="line">
+            <a:avLst/>
+          </a:prstGeom>
+          <a:ln>
+            <a:solidFill>
+              <a:schemeClr val="accent1"/>
+            </a:solidFill>
+          </a:ln>
+        </p:spPr>
+        <p:style>
+          <a:lnRef idx="2">
+            <a:schemeClr val="dk1"/>
+          </a:lnRef>
+          <a:fillRef idx="0">
+            <a:schemeClr val="dk1"/>
+          </a:fillRef>
+          <a:effectRef idx="1">
+            <a:schemeClr val="dk1"/>
+          </a:effectRef>
+          <a:fontRef idx="minor">
+            <a:schemeClr val="tx1"/>
+          </a:fontRef>
+        </p:style>
+      </p:cxnSp>
+      <p:cxnSp>
+        <p:nvCxnSpPr>
+          <p:cNvPr id="29" name="Connettore diritto 28">
+            <a:extLst>
+              <a:ext uri="{FF2B5EF4-FFF2-40B4-BE49-F238E27FC236}">
+                <a16:creationId xmlns:a16="http://schemas.microsoft.com/office/drawing/2014/main" id="{DADAD5F3-E443-49C7-8FC8-AFC79296B368}"/>
+              </a:ext>
+            </a:extLst>
+          </p:cNvPr>
+          <p:cNvCxnSpPr>
+            <a:cxnSpLocks/>
+            <a:endCxn id="4" idx="1"/>
+          </p:cNvCxnSpPr>
+          <p:nvPr/>
+        </p:nvCxnSpPr>
+        <p:spPr>
+          <a:xfrm>
+            <a:off x="3340659" y="4069944"/>
+            <a:ext cx="560389" cy="0"/>
+          </a:xfrm>
+          <a:prstGeom prst="line">
+            <a:avLst/>
+          </a:prstGeom>
+        </p:spPr>
+        <p:style>
+          <a:lnRef idx="2">
+            <a:schemeClr val="dk1"/>
+          </a:lnRef>
+          <a:fillRef idx="0">
+            <a:schemeClr val="dk1"/>
+          </a:fillRef>
+          <a:effectRef idx="1">
+            <a:schemeClr val="dk1"/>
+          </a:effectRef>
+          <a:fontRef idx="minor">
+            <a:schemeClr val="tx1"/>
+          </a:fontRef>
+        </p:style>
+      </p:cxnSp>
+      <p:cxnSp>
+        <p:nvCxnSpPr>
+          <p:cNvPr id="33" name="Connettore diritto 32">
+            <a:extLst>
+              <a:ext uri="{FF2B5EF4-FFF2-40B4-BE49-F238E27FC236}">
+                <a16:creationId xmlns:a16="http://schemas.microsoft.com/office/drawing/2014/main" id="{77495BA6-F60F-4D08-82D1-EC40E4BC39B1}"/>
+              </a:ext>
+            </a:extLst>
+          </p:cNvPr>
+          <p:cNvCxnSpPr>
+            <a:cxnSpLocks/>
+          </p:cNvCxnSpPr>
+          <p:nvPr/>
+        </p:nvCxnSpPr>
+        <p:spPr>
+          <a:xfrm>
+            <a:off x="5104140" y="4075882"/>
+            <a:ext cx="952279" cy="0"/>
+          </a:xfrm>
+          <a:prstGeom prst="line">
+            <a:avLst/>
+          </a:prstGeom>
+        </p:spPr>
+        <p:style>
+          <a:lnRef idx="2">
+            <a:schemeClr val="dk1"/>
+          </a:lnRef>
+          <a:fillRef idx="0">
+            <a:schemeClr val="dk1"/>
+          </a:fillRef>
+          <a:effectRef idx="1">
+            <a:schemeClr val="dk1"/>
+          </a:effectRef>
+          <a:fontRef idx="minor">
+            <a:schemeClr val="tx1"/>
+          </a:fontRef>
+        </p:style>
+      </p:cxnSp>
+      <p:cxnSp>
+        <p:nvCxnSpPr>
+          <p:cNvPr id="35" name="Connettore diritto 34">
+            <a:extLst>
+              <a:ext uri="{FF2B5EF4-FFF2-40B4-BE49-F238E27FC236}">
+                <a16:creationId xmlns:a16="http://schemas.microsoft.com/office/drawing/2014/main" id="{3D0F8175-9AAB-4EA7-8E55-5DDC943B10B1}"/>
+              </a:ext>
+            </a:extLst>
+          </p:cNvPr>
+          <p:cNvCxnSpPr>
+            <a:cxnSpLocks/>
+          </p:cNvCxnSpPr>
+          <p:nvPr/>
+        </p:nvCxnSpPr>
+        <p:spPr>
+          <a:xfrm>
+            <a:off x="6060372" y="1822872"/>
+            <a:ext cx="5345" cy="2247072"/>
+          </a:xfrm>
+          <a:prstGeom prst="line">
+            <a:avLst/>
+          </a:prstGeom>
+        </p:spPr>
+        <p:style>
+          <a:lnRef idx="2">
+            <a:schemeClr val="dk1"/>
+          </a:lnRef>
+          <a:fillRef idx="0">
+            <a:schemeClr val="dk1"/>
+          </a:fillRef>
+          <a:effectRef idx="1">
+            <a:schemeClr val="dk1"/>
+          </a:effectRef>
+          <a:fontRef idx="minor">
+            <a:schemeClr val="tx1"/>
+          </a:fontRef>
+        </p:style>
+      </p:cxnSp>
     </p:spTree>
     <p:extLst>
       <p:ext uri="{BB962C8B-B14F-4D97-AF65-F5344CB8AC3E}">
-        <p14:creationId xmlns:p14="http://schemas.microsoft.com/office/powerpoint/2010/main" val="1895510795"/>
+        <p14:creationId xmlns:p14="http://schemas.microsoft.com/office/powerpoint/2010/main" val="2228866435"/>
       </p:ext>
     </p:extLst>
   </p:cSld>
@@ -32376,7 +33263,7 @@
 </p:sld>
 </file>
 
-<file path=ppt/slides/slide12.xml><?xml version="1.0" encoding="utf-8"?>
+<file path=ppt/slides/slide13.xml><?xml version="1.0" encoding="utf-8"?>
 <p:sld xmlns:a="http://schemas.openxmlformats.org/drawingml/2006/main" xmlns:r="http://schemas.openxmlformats.org/officeDocument/2006/relationships" xmlns:p="http://schemas.openxmlformats.org/presentationml/2006/main">
   <p:cSld>
     <p:spTree>
@@ -34795,7 +35682,7 @@
 </p:sld>
 </file>
 
-<file path=ppt/slides/slide13.xml><?xml version="1.0" encoding="utf-8"?>
+<file path=ppt/slides/slide14.xml><?xml version="1.0" encoding="utf-8"?>
 <p:sld xmlns:a="http://schemas.openxmlformats.org/drawingml/2006/main" xmlns:r="http://schemas.openxmlformats.org/officeDocument/2006/relationships" xmlns:p="http://schemas.openxmlformats.org/presentationml/2006/main">
   <p:cSld>
     <p:spTree>

</xml_diff>

<commit_message>
Update Notebook, results and presentation
</commit_message>
<xml_diff>
--- a/presentation/fraudolent_transaction.pptx
+++ b/presentation/fraudolent_transaction.pptx
@@ -25962,7 +25962,7 @@
             <a:pPr rtl="0"/>
             <a:fld id="{C0FA3576-2E34-44A5-91FF-3C53AC3DA648}" type="datetime1">
               <a:rPr lang="it-IT" smtClean="0"/>
-              <a:t>22/06/2022</a:t>
+              <a:t>23/06/2022</a:t>
             </a:fld>
             <a:endParaRPr lang="it-IT"/>
           </a:p>
@@ -26144,7 +26144,7 @@
             <a:fld id="{F8F21FEC-DF32-4E90-A279-29D5C0BB0773}" type="datetime1">
               <a:rPr lang="it-IT" smtClean="0"/>
               <a:pPr/>
-              <a:t>22/06/2022</a:t>
+              <a:t>23/06/2022</a:t>
             </a:fld>
             <a:endParaRPr lang="it-IT" dirty="0"/>
           </a:p>
@@ -26922,7 +26922,7 @@
             <a:pPr rtl="0"/>
             <a:fld id="{87A23933-3F77-4C59-A775-45E2435C8368}" type="datetime1">
               <a:rPr lang="it-IT" noProof="0" smtClean="0"/>
-              <a:t>22/06/2022</a:t>
+              <a:t>23/06/2022</a:t>
             </a:fld>
             <a:endParaRPr lang="it-IT" noProof="0"/>
           </a:p>
@@ -27187,7 +27187,7 @@
             <a:pPr rtl="0"/>
             <a:fld id="{4B4ECE9F-4108-4829-8F23-DFA9C926965D}" type="datetime1">
               <a:rPr lang="it-IT" noProof="0" smtClean="0"/>
-              <a:t>22/06/2022</a:t>
+              <a:t>23/06/2022</a:t>
             </a:fld>
             <a:endParaRPr lang="it-IT" noProof="0"/>
           </a:p>
@@ -27425,7 +27425,7 @@
             <a:pPr rtl="0"/>
             <a:fld id="{2AB59B6B-A2EF-4B30-AEF7-A3091D0F5449}" type="datetime1">
               <a:rPr lang="it-IT" noProof="0" smtClean="0"/>
-              <a:t>22/06/2022</a:t>
+              <a:t>23/06/2022</a:t>
             </a:fld>
             <a:endParaRPr lang="it-IT" noProof="0" dirty="0"/>
           </a:p>
@@ -27668,7 +27668,7 @@
             <a:pPr rtl="0"/>
             <a:fld id="{7F3FB14C-AC96-42E5-BE0B-73EFAA1A7EA7}" type="datetime1">
               <a:rPr lang="it-IT" noProof="0" smtClean="0"/>
-              <a:t>22/06/2022</a:t>
+              <a:t>23/06/2022</a:t>
             </a:fld>
             <a:endParaRPr lang="it-IT" noProof="0"/>
           </a:p>
@@ -27979,7 +27979,7 @@
             <a:pPr rtl="0"/>
             <a:fld id="{76327E91-20FF-43F1-A337-75953C73E7D7}" type="datetime1">
               <a:rPr lang="it-IT" noProof="0" smtClean="0"/>
-              <a:t>22/06/2022</a:t>
+              <a:t>23/06/2022</a:t>
             </a:fld>
             <a:endParaRPr lang="it-IT" noProof="0"/>
           </a:p>
@@ -28283,7 +28283,7 @@
             <a:pPr rtl="0"/>
             <a:fld id="{9EDCB701-B7F2-4988-9CFB-241C1D412354}" type="datetime1">
               <a:rPr lang="it-IT" noProof="0" smtClean="0"/>
-              <a:t>22/06/2022</a:t>
+              <a:t>23/06/2022</a:t>
             </a:fld>
             <a:endParaRPr lang="it-IT" noProof="0"/>
           </a:p>
@@ -28707,7 +28707,7 @@
             <a:pPr rtl="0"/>
             <a:fld id="{4B9B0459-76CC-4B94-A6C6-908B17D42BC8}" type="datetime1">
               <a:rPr lang="it-IT" noProof="0" smtClean="0"/>
-              <a:t>22/06/2022</a:t>
+              <a:t>23/06/2022</a:t>
             </a:fld>
             <a:endParaRPr lang="it-IT" noProof="0"/>
           </a:p>
@@ -28806,7 +28806,7 @@
             <a:pPr rtl="0"/>
             <a:fld id="{62D572E4-8572-44CF-B6FA-B15ECB2B0691}" type="datetime1">
               <a:rPr lang="it-IT" noProof="0" smtClean="0"/>
-              <a:t>22/06/2022</a:t>
+              <a:t>23/06/2022</a:t>
             </a:fld>
             <a:endParaRPr lang="it-IT" noProof="0"/>
           </a:p>
@@ -28972,7 +28972,7 @@
             <a:pPr rtl="0"/>
             <a:fld id="{5F266B29-8DDF-40ED-AC5D-ED73AC5A6521}" type="datetime1">
               <a:rPr lang="it-IT" noProof="0" smtClean="0"/>
-              <a:t>22/06/2022</a:t>
+              <a:t>23/06/2022</a:t>
             </a:fld>
             <a:endParaRPr lang="it-IT" noProof="0"/>
           </a:p>
@@ -29353,7 +29353,7 @@
             <a:pPr rtl="0"/>
             <a:fld id="{4CFC7787-2DFD-4221-B49C-354C37128239}" type="datetime1">
               <a:rPr lang="it-IT" noProof="0" smtClean="0"/>
-              <a:t>22/06/2022</a:t>
+              <a:t>23/06/2022</a:t>
             </a:fld>
             <a:endParaRPr lang="it-IT" noProof="0"/>
           </a:p>
@@ -29646,7 +29646,7 @@
             <a:pPr rtl="0"/>
             <a:fld id="{D3F07A8F-C5D3-4128-B052-E864993A59CE}" type="datetime1">
               <a:rPr lang="it-IT" noProof="0" smtClean="0"/>
-              <a:t>22/06/2022</a:t>
+              <a:t>23/06/2022</a:t>
             </a:fld>
             <a:endParaRPr lang="it-IT" noProof="0"/>
           </a:p>
@@ -29860,7 +29860,7 @@
             <a:pPr rtl="0"/>
             <a:fld id="{A36BACEF-F5E2-445B-BCCF-A68C06C41D7B}" type="datetime1">
               <a:rPr lang="it-IT" noProof="0" smtClean="0"/>
-              <a:t>22/06/2022</a:t>
+              <a:t>23/06/2022</a:t>
             </a:fld>
             <a:endParaRPr lang="it-IT" noProof="0" dirty="0"/>
           </a:p>
@@ -33407,7 +33407,7 @@
           <p:nvPr>
             <p:extLst>
               <p:ext uri="{D42A27DB-BD31-4B8C-83A1-F6EECF244321}">
-                <p14:modId xmlns:p14="http://schemas.microsoft.com/office/powerpoint/2010/main" val="1702343322"/>
+                <p14:modId xmlns:p14="http://schemas.microsoft.com/office/powerpoint/2010/main" val="3219576348"/>
               </p:ext>
             </p:extLst>
           </p:nvPr>
@@ -34110,7 +34110,7 @@
                         <a:rPr lang="it-IT" sz="1200" b="0">
                           <a:latin typeface="Avenir Next LT Pro" panose="020B0504020202020204" pitchFamily="34" charset="0"/>
                         </a:rPr>
-                        <a:t>(?)</a:t>
+                        <a:t>(0.8586)</a:t>
                       </a:r>
                     </a:p>
                   </a:txBody>
@@ -34154,7 +34154,7 @@
                         <a:rPr lang="it-IT" sz="1200" b="0">
                           <a:latin typeface="Avenir Next LT Pro" panose="020B0504020202020204" pitchFamily="34" charset="0"/>
                         </a:rPr>
-                        <a:t>(?)</a:t>
+                        <a:t>(0.8586)</a:t>
                       </a:r>
                     </a:p>
                   </a:txBody>
@@ -34185,9 +34185,12 @@
                     <a:lstStyle/>
                     <a:p>
                       <a:pPr algn="ctr"/>
-                      <a:endParaRPr lang="it-IT" sz="1200">
-                        <a:latin typeface="Avenir Next LT Pro" panose="020B0504020202020204" pitchFamily="34" charset="0"/>
-                      </a:endParaRPr>
+                      <a:r>
+                        <a:rPr lang="it-IT" sz="1200" b="1">
+                          <a:latin typeface="Avenir Next LT Pro" panose="020B0504020202020204" pitchFamily="34" charset="0"/>
+                        </a:rPr>
+                        <a:t>0.9790</a:t>
+                      </a:r>
                     </a:p>
                     <a:p>
                       <a:pPr algn="ctr"/>
@@ -34330,7 +34333,7 @@
                         <a:rPr lang="it-IT" sz="1200">
                           <a:latin typeface="Avenir Next LT Pro" panose="020B0504020202020204" pitchFamily="34" charset="0"/>
                         </a:rPr>
-                        <a:t>(?)</a:t>
+                        <a:t>(0.9390)</a:t>
                       </a:r>
                     </a:p>
                   </a:txBody>
@@ -34362,7 +34365,7 @@
                     <a:p>
                       <a:pPr algn="ctr"/>
                       <a:r>
-                        <a:rPr lang="it-IT" sz="1200" b="1">
+                        <a:rPr lang="it-IT" sz="1200" b="0">
                           <a:latin typeface="Avenir Next LT Pro" panose="020B0504020202020204" pitchFamily="34" charset="0"/>
                         </a:rPr>
                         <a:t>0.9789</a:t>
@@ -34374,7 +34377,7 @@
                         <a:rPr lang="it-IT" sz="1200">
                           <a:latin typeface="Avenir Next LT Pro" panose="020B0504020202020204" pitchFamily="34" charset="0"/>
                         </a:rPr>
-                        <a:t>(?)</a:t>
+                        <a:t>(0.9397)</a:t>
                       </a:r>
                     </a:p>
                   </a:txBody>
@@ -34446,9 +34449,12 @@
                     <a:lstStyle/>
                     <a:p>
                       <a:pPr algn="ctr"/>
-                      <a:endParaRPr lang="it-IT" sz="1200">
-                        <a:latin typeface="Avenir Next LT Pro" panose="020B0504020202020204" pitchFamily="34" charset="0"/>
-                      </a:endParaRPr>
+                      <a:r>
+                        <a:rPr lang="it-IT" sz="1200">
+                          <a:latin typeface="Avenir Next LT Pro" panose="020B0504020202020204" pitchFamily="34" charset="0"/>
+                        </a:rPr>
+                        <a:t>0.9734</a:t>
+                      </a:r>
                     </a:p>
                     <a:p>
                       <a:pPr algn="ctr"/>
@@ -34456,7 +34462,7 @@
                         <a:rPr lang="it-IT" sz="1200">
                           <a:latin typeface="Avenir Next LT Pro" panose="020B0504020202020204" pitchFamily="34" charset="0"/>
                         </a:rPr>
-                        <a:t>(?)</a:t>
+                        <a:t>(0.8829)</a:t>
                       </a:r>
                     </a:p>
                   </a:txBody>
@@ -34549,7 +34555,7 @@
           <p:nvPr>
             <p:extLst>
               <p:ext uri="{D42A27DB-BD31-4B8C-83A1-F6EECF244321}">
-                <p14:modId xmlns:p14="http://schemas.microsoft.com/office/powerpoint/2010/main" val="3163269395"/>
+                <p14:modId xmlns:p14="http://schemas.microsoft.com/office/powerpoint/2010/main" val="3882724486"/>
               </p:ext>
             </p:extLst>
           </p:nvPr>
@@ -35237,7 +35243,7 @@
                         <a:rPr lang="it-IT" sz="1200">
                           <a:latin typeface="Avenir Next LT Pro" panose="020B0504020202020204" pitchFamily="34" charset="0"/>
                         </a:rPr>
-                        <a:t>(?)</a:t>
+                        <a:t>(0.535)</a:t>
                       </a:r>
                     </a:p>
                   </a:txBody>
@@ -35281,7 +35287,7 @@
                         <a:rPr lang="it-IT" sz="1200">
                           <a:latin typeface="Avenir Next LT Pro" panose="020B0504020202020204" pitchFamily="34" charset="0"/>
                         </a:rPr>
-                        <a:t>(?)</a:t>
+                        <a:t>(0.535)</a:t>
                       </a:r>
                     </a:p>
                   </a:txBody>
@@ -35312,9 +35318,12 @@
                     <a:lstStyle/>
                     <a:p>
                       <a:pPr algn="ctr"/>
-                      <a:endParaRPr lang="it-IT" sz="1200">
-                        <a:latin typeface="Avenir Next LT Pro" panose="020B0504020202020204" pitchFamily="34" charset="0"/>
-                      </a:endParaRPr>
+                      <a:r>
+                        <a:rPr lang="it-IT" sz="1200" b="1">
+                          <a:latin typeface="Avenir Next LT Pro" panose="020B0504020202020204" pitchFamily="34" charset="0"/>
+                        </a:rPr>
+                        <a:t>0.858</a:t>
+                      </a:r>
                     </a:p>
                     <a:p>
                       <a:pPr algn="ctr"/>
@@ -35363,7 +35372,7 @@
                           <a:ea typeface="+mn-ea"/>
                           <a:cs typeface="+mn-cs"/>
                         </a:rPr>
-                        <a:t>0.7074</a:t>
+                        <a:t>0.707</a:t>
                       </a:r>
                     </a:p>
                     <a:p>
@@ -35378,7 +35387,7 @@
                           <a:ea typeface="+mn-ea"/>
                           <a:cs typeface="+mn-cs"/>
                         </a:rPr>
-                        <a:t>(0.6795)</a:t>
+                        <a:t>(0.679)</a:t>
                       </a:r>
                       <a:endParaRPr lang="it-IT" sz="1200">
                         <a:latin typeface="Avenir Next LT Pro" panose="020B0504020202020204" pitchFamily="34" charset="0"/>
@@ -35457,7 +35466,7 @@
                         <a:rPr lang="it-IT" sz="1200">
                           <a:latin typeface="Avenir Next LT Pro" panose="020B0504020202020204" pitchFamily="34" charset="0"/>
                         </a:rPr>
-                        <a:t>(?)</a:t>
+                        <a:t>(0.864)</a:t>
                       </a:r>
                     </a:p>
                   </a:txBody>
@@ -35489,7 +35498,7 @@
                     <a:p>
                       <a:pPr algn="ctr"/>
                       <a:r>
-                        <a:rPr lang="it-IT" sz="1200" b="1">
+                        <a:rPr lang="it-IT" sz="1200" b="0">
                           <a:latin typeface="Avenir Next LT Pro" panose="020B0504020202020204" pitchFamily="34" charset="0"/>
                         </a:rPr>
                         <a:t>0.845</a:t>
@@ -35501,7 +35510,7 @@
                         <a:rPr lang="it-IT" sz="1200">
                           <a:latin typeface="Avenir Next LT Pro" panose="020B0504020202020204" pitchFamily="34" charset="0"/>
                         </a:rPr>
-                        <a:t>(?)</a:t>
+                        <a:t>(0.866)</a:t>
                       </a:r>
                     </a:p>
                   </a:txBody>
@@ -35573,9 +35582,12 @@
                     <a:lstStyle/>
                     <a:p>
                       <a:pPr algn="ctr"/>
-                      <a:endParaRPr lang="it-IT" sz="1200">
-                        <a:latin typeface="Avenir Next LT Pro" panose="020B0504020202020204" pitchFamily="34" charset="0"/>
-                      </a:endParaRPr>
+                      <a:r>
+                        <a:rPr lang="it-IT" sz="1200">
+                          <a:latin typeface="Avenir Next LT Pro" panose="020B0504020202020204" pitchFamily="34" charset="0"/>
+                        </a:rPr>
+                        <a:t>0.784</a:t>
+                      </a:r>
                     </a:p>
                     <a:p>
                       <a:pPr algn="ctr"/>
@@ -35583,7 +35595,7 @@
                         <a:rPr lang="it-IT" sz="1200">
                           <a:latin typeface="Avenir Next LT Pro" panose="020B0504020202020204" pitchFamily="34" charset="0"/>
                         </a:rPr>
-                        <a:t>(?)</a:t>
+                        <a:t>(0.810)</a:t>
                       </a:r>
                     </a:p>
                   </a:txBody>
@@ -35874,7 +35886,7 @@
           <p:nvPr>
             <p:extLst>
               <p:ext uri="{D42A27DB-BD31-4B8C-83A1-F6EECF244321}">
-                <p14:modId xmlns:p14="http://schemas.microsoft.com/office/powerpoint/2010/main" val="2646214282"/>
+                <p14:modId xmlns:p14="http://schemas.microsoft.com/office/powerpoint/2010/main" val="652038403"/>
               </p:ext>
             </p:extLst>
           </p:nvPr>
@@ -36577,7 +36589,7 @@
                         <a:rPr lang="it-IT" sz="1200" b="0">
                           <a:latin typeface="Avenir Next LT Pro" panose="020B0504020202020204" pitchFamily="34" charset="0"/>
                         </a:rPr>
-                        <a:t>(?)</a:t>
+                        <a:t>(0.6101)</a:t>
                       </a:r>
                     </a:p>
                   </a:txBody>
@@ -36621,7 +36633,7 @@
                         <a:rPr lang="it-IT" sz="1200" b="0">
                           <a:latin typeface="Avenir Next LT Pro" panose="020B0504020202020204" pitchFamily="34" charset="0"/>
                         </a:rPr>
-                        <a:t>(?)</a:t>
+                        <a:t>(0.6101)</a:t>
                       </a:r>
                     </a:p>
                   </a:txBody>
@@ -36652,9 +36664,12 @@
                     <a:lstStyle/>
                     <a:p>
                       <a:pPr algn="ctr"/>
-                      <a:endParaRPr lang="it-IT" sz="1200">
-                        <a:latin typeface="Avenir Next LT Pro" panose="020B0504020202020204" pitchFamily="34" charset="0"/>
-                      </a:endParaRPr>
+                      <a:r>
+                        <a:rPr lang="it-IT" sz="1200" b="1">
+                          <a:latin typeface="Avenir Next LT Pro" panose="020B0504020202020204" pitchFamily="34" charset="0"/>
+                        </a:rPr>
+                        <a:t>0.7472</a:t>
+                      </a:r>
                     </a:p>
                     <a:p>
                       <a:pPr algn="ctr"/>
@@ -36797,7 +36812,7 @@
                         <a:rPr lang="it-IT" sz="1200">
                           <a:latin typeface="Avenir Next LT Pro" panose="020B0504020202020204" pitchFamily="34" charset="0"/>
                         </a:rPr>
-                        <a:t>(?)</a:t>
+                        <a:t>(0.6787)</a:t>
                       </a:r>
                     </a:p>
                   </a:txBody>
@@ -36829,7 +36844,7 @@
                     <a:p>
                       <a:pPr algn="ctr"/>
                       <a:r>
-                        <a:rPr lang="it-IT" sz="1200" b="1">
+                        <a:rPr lang="it-IT" sz="1200" b="0">
                           <a:latin typeface="Avenir Next LT Pro" panose="020B0504020202020204" pitchFamily="34" charset="0"/>
                         </a:rPr>
                         <a:t>0.7438</a:t>
@@ -36841,7 +36856,7 @@
                         <a:rPr lang="it-IT" sz="1200">
                           <a:latin typeface="Avenir Next LT Pro" panose="020B0504020202020204" pitchFamily="34" charset="0"/>
                         </a:rPr>
-                        <a:t>(?)</a:t>
+                        <a:t>(0.6787)</a:t>
                       </a:r>
                     </a:p>
                   </a:txBody>
@@ -36913,9 +36928,12 @@
                     <a:lstStyle/>
                     <a:p>
                       <a:pPr algn="ctr"/>
-                      <a:endParaRPr lang="it-IT" sz="1200">
-                        <a:latin typeface="Avenir Next LT Pro" panose="020B0504020202020204" pitchFamily="34" charset="0"/>
-                      </a:endParaRPr>
+                      <a:r>
+                        <a:rPr lang="it-IT" sz="1200">
+                          <a:latin typeface="Avenir Next LT Pro" panose="020B0504020202020204" pitchFamily="34" charset="0"/>
+                        </a:rPr>
+                        <a:t>0.4932</a:t>
+                      </a:r>
                     </a:p>
                     <a:p>
                       <a:pPr algn="ctr"/>
@@ -36923,7 +36941,7 @@
                         <a:rPr lang="it-IT" sz="1200">
                           <a:latin typeface="Avenir Next LT Pro" panose="020B0504020202020204" pitchFamily="34" charset="0"/>
                         </a:rPr>
-                        <a:t>(?)</a:t>
+                        <a:t>(0.6165)</a:t>
                       </a:r>
                     </a:p>
                   </a:txBody>
@@ -37016,7 +37034,7 @@
           <p:nvPr>
             <p:extLst>
               <p:ext uri="{D42A27DB-BD31-4B8C-83A1-F6EECF244321}">
-                <p14:modId xmlns:p14="http://schemas.microsoft.com/office/powerpoint/2010/main" val="1117334840"/>
+                <p14:modId xmlns:p14="http://schemas.microsoft.com/office/powerpoint/2010/main" val="1470130295"/>
               </p:ext>
             </p:extLst>
           </p:nvPr>
@@ -37340,7 +37358,7 @@
                       </a:r>
                     </a:p>
                   </a:txBody>
-                  <a:tcPr>
+                  <a:tcPr anchor="ctr">
                     <a:lnR w="12700" cap="flat" cmpd="sng" algn="ctr">
                       <a:solidFill>
                         <a:schemeClr val="tx1"/>
@@ -37641,7 +37659,7 @@
                       </a:r>
                     </a:p>
                   </a:txBody>
-                  <a:tcPr>
+                  <a:tcPr anchor="ctr">
                     <a:lnR w="12700" cap="flat" cmpd="sng" algn="ctr">
                       <a:solidFill>
                         <a:schemeClr val="tx1"/>
@@ -37704,7 +37722,7 @@
                         <a:rPr lang="it-IT" sz="1200">
                           <a:latin typeface="Avenir Next LT Pro" panose="020B0504020202020204" pitchFamily="34" charset="0"/>
                         </a:rPr>
-                        <a:t>(?)</a:t>
+                        <a:t>(0.541/0.698)</a:t>
                       </a:r>
                     </a:p>
                   </a:txBody>
@@ -37748,7 +37766,7 @@
                         <a:rPr lang="it-IT" sz="1200">
                           <a:latin typeface="Avenir Next LT Pro" panose="020B0504020202020204" pitchFamily="34" charset="0"/>
                         </a:rPr>
-                        <a:t>(?)</a:t>
+                        <a:t>(0.541/0.698)</a:t>
                       </a:r>
                     </a:p>
                   </a:txBody>
@@ -37779,9 +37797,12 @@
                     <a:lstStyle/>
                     <a:p>
                       <a:pPr algn="ctr"/>
-                      <a:endParaRPr lang="it-IT" sz="1200">
-                        <a:latin typeface="Avenir Next LT Pro" panose="020B0504020202020204" pitchFamily="34" charset="0"/>
-                      </a:endParaRPr>
+                      <a:r>
+                        <a:rPr lang="it-IT" sz="1200" b="1">
+                          <a:latin typeface="Avenir Next LT Pro" panose="020B0504020202020204" pitchFamily="34" charset="0"/>
+                        </a:rPr>
+                        <a:t>0.869/0.654</a:t>
+                      </a:r>
                     </a:p>
                     <a:p>
                       <a:pPr algn="ctr"/>
@@ -37893,7 +37914,7 @@
                       </a:r>
                     </a:p>
                   </a:txBody>
-                  <a:tcPr>
+                  <a:tcPr anchor="ctr">
                     <a:lnR w="12700" cap="flat" cmpd="sng" algn="ctr">
                       <a:solidFill>
                         <a:schemeClr val="tx1"/>
@@ -37924,7 +37945,7 @@
                         <a:rPr lang="it-IT" sz="1200">
                           <a:latin typeface="Avenir Next LT Pro" panose="020B0504020202020204" pitchFamily="34" charset="0"/>
                         </a:rPr>
-                        <a:t>(?)</a:t>
+                        <a:t>(0.611/0.762)</a:t>
                       </a:r>
                     </a:p>
                   </a:txBody>
@@ -37956,7 +37977,7 @@
                     <a:p>
                       <a:pPr algn="ctr"/>
                       <a:r>
-                        <a:rPr lang="it-IT" sz="1200" b="1">
+                        <a:rPr lang="it-IT" sz="1200" b="0">
                           <a:latin typeface="Avenir Next LT Pro" panose="020B0504020202020204" pitchFamily="34" charset="0"/>
                         </a:rPr>
                         <a:t>0.937/0.616</a:t>
@@ -37968,7 +37989,7 @@
                         <a:rPr lang="it-IT" sz="1200">
                           <a:latin typeface="Avenir Next LT Pro" panose="020B0504020202020204" pitchFamily="34" charset="0"/>
                         </a:rPr>
-                        <a:t>(?)</a:t>
+                        <a:t>(0.612/0.761)</a:t>
                       </a:r>
                     </a:p>
                   </a:txBody>
@@ -38040,9 +38061,12 @@
                     <a:lstStyle/>
                     <a:p>
                       <a:pPr algn="ctr"/>
-                      <a:endParaRPr lang="it-IT" sz="1200">
-                        <a:latin typeface="Avenir Next LT Pro" panose="020B0504020202020204" pitchFamily="34" charset="0"/>
-                      </a:endParaRPr>
+                      <a:r>
+                        <a:rPr lang="it-IT" sz="1200">
+                          <a:latin typeface="Avenir Next LT Pro" panose="020B0504020202020204" pitchFamily="34" charset="0"/>
+                        </a:rPr>
+                        <a:t>0.486/0.5</a:t>
+                      </a:r>
                     </a:p>
                     <a:p>
                       <a:pPr algn="ctr"/>
@@ -38050,7 +38074,7 @@
                         <a:rPr lang="it-IT" sz="1200">
                           <a:latin typeface="Avenir Next LT Pro" panose="020B0504020202020204" pitchFamily="34" charset="0"/>
                         </a:rPr>
-                        <a:t>(?)</a:t>
+                        <a:t>(0.550/0.701)</a:t>
                       </a:r>
                     </a:p>
                   </a:txBody>

</xml_diff>

<commit_message>
Update models and results and presentation
</commit_message>
<xml_diff>
--- a/presentation/fraudolent_transaction.pptx
+++ b/presentation/fraudolent_transaction.pptx
@@ -33407,7 +33407,7 @@
           <p:nvPr>
             <p:extLst>
               <p:ext uri="{D42A27DB-BD31-4B8C-83A1-F6EECF244321}">
-                <p14:modId xmlns:p14="http://schemas.microsoft.com/office/powerpoint/2010/main" val="2662949846"/>
+                <p14:modId xmlns:p14="http://schemas.microsoft.com/office/powerpoint/2010/main" val="2789110329"/>
               </p:ext>
             </p:extLst>
           </p:nvPr>
@@ -33922,7 +33922,7 @@
                           <a:ea typeface="+mn-ea"/>
                           <a:cs typeface="+mn-cs"/>
                         </a:rPr>
-                        <a:t>(?)</a:t>
+                        <a:t>(0.9033)</a:t>
                       </a:r>
                       <a:endParaRPr lang="it-IT" sz="1200" b="0">
                         <a:latin typeface="Avenir Next LT Pro" panose="020B0504020202020204" pitchFamily="34" charset="0"/>
@@ -34558,7 +34558,7 @@
           <p:nvPr>
             <p:extLst>
               <p:ext uri="{D42A27DB-BD31-4B8C-83A1-F6EECF244321}">
-                <p14:modId xmlns:p14="http://schemas.microsoft.com/office/powerpoint/2010/main" val="2287019251"/>
+                <p14:modId xmlns:p14="http://schemas.microsoft.com/office/powerpoint/2010/main" val="3901396726"/>
               </p:ext>
             </p:extLst>
           </p:nvPr>
@@ -35061,7 +35061,7 @@
                         <a:rPr lang="it-IT" sz="1200" b="0">
                           <a:latin typeface="Avenir Next LT Pro" panose="020B0504020202020204" pitchFamily="34" charset="0"/>
                         </a:rPr>
-                        <a:t>(?)</a:t>
+                        <a:t>(0.862)</a:t>
                       </a:r>
                     </a:p>
                   </a:txBody>
@@ -35892,7 +35892,7 @@
           <p:nvPr>
             <p:extLst>
               <p:ext uri="{D42A27DB-BD31-4B8C-83A1-F6EECF244321}">
-                <p14:modId xmlns:p14="http://schemas.microsoft.com/office/powerpoint/2010/main" val="2356774293"/>
+                <p14:modId xmlns:p14="http://schemas.microsoft.com/office/powerpoint/2010/main" val="2494172858"/>
               </p:ext>
             </p:extLst>
           </p:nvPr>
@@ -36407,7 +36407,7 @@
                           <a:ea typeface="+mn-ea"/>
                           <a:cs typeface="+mn-cs"/>
                         </a:rPr>
-                        <a:t>(?)</a:t>
+                        <a:t>(0.6556)</a:t>
                       </a:r>
                       <a:endParaRPr lang="it-IT" sz="1200" b="0">
                         <a:latin typeface="Avenir Next LT Pro" panose="020B0504020202020204" pitchFamily="34" charset="0"/>
@@ -37055,7 +37055,7 @@
           <p:nvPr>
             <p:extLst>
               <p:ext uri="{D42A27DB-BD31-4B8C-83A1-F6EECF244321}">
-                <p14:modId xmlns:p14="http://schemas.microsoft.com/office/powerpoint/2010/main" val="3402175942"/>
+                <p14:modId xmlns:p14="http://schemas.microsoft.com/office/powerpoint/2010/main" val="450090207"/>
               </p:ext>
             </p:extLst>
           </p:nvPr>
@@ -37558,7 +37558,7 @@
                         <a:rPr lang="it-IT" sz="1200" b="0">
                           <a:latin typeface="Avenir Next LT Pro" panose="020B0504020202020204" pitchFamily="34" charset="0"/>
                         </a:rPr>
-                        <a:t>(?)</a:t>
+                        <a:t>(0.574/0.764)</a:t>
                       </a:r>
                     </a:p>
                   </a:txBody>

</xml_diff>